<commit_message>
Pit delta logic update
</commit_message>
<xml_diff>
--- a/Docs/UI Work.pptx
+++ b/Docs/UI Work.pptx
@@ -20,16 +20,21 @@
     <p:sldId id="268" r:id="rId14"/>
     <p:sldId id="269" r:id="rId15"/>
     <p:sldId id="270" r:id="rId16"/>
-    <p:sldId id="271" r:id="rId17"/>
-    <p:sldId id="272" r:id="rId18"/>
-    <p:sldId id="273" r:id="rId19"/>
-    <p:sldId id="274" r:id="rId20"/>
-    <p:sldId id="275" r:id="rId21"/>
-    <p:sldId id="276" r:id="rId22"/>
-    <p:sldId id="277" r:id="rId23"/>
-    <p:sldId id="278" r:id="rId24"/>
-    <p:sldId id="279" r:id="rId25"/>
-    <p:sldId id="280" r:id="rId26"/>
+    <p:sldId id="282" r:id="rId17"/>
+    <p:sldId id="284" r:id="rId18"/>
+    <p:sldId id="283" r:id="rId19"/>
+    <p:sldId id="285" r:id="rId20"/>
+    <p:sldId id="286" r:id="rId21"/>
+    <p:sldId id="271" r:id="rId22"/>
+    <p:sldId id="272" r:id="rId23"/>
+    <p:sldId id="273" r:id="rId24"/>
+    <p:sldId id="274" r:id="rId25"/>
+    <p:sldId id="275" r:id="rId26"/>
+    <p:sldId id="276" r:id="rId27"/>
+    <p:sldId id="277" r:id="rId28"/>
+    <p:sldId id="278" r:id="rId29"/>
+    <p:sldId id="279" r:id="rId30"/>
+    <p:sldId id="280" r:id="rId31"/>
   </p:sldIdLst>
   <p:sldSz cx="12192000" cy="6858000"/>
   <p:notesSz cx="6858000" cy="9144000"/>
@@ -138,6 +143,144 @@
 
 <file path=ppt/changesInfos/changesInfo1.xml><?xml version="1.0" encoding="utf-8"?>
 <pc:chgInfo xmlns:a="http://schemas.openxmlformats.org/drawingml/2006/main" xmlns:r="http://schemas.openxmlformats.org/officeDocument/2006/relationships" xmlns:ac="http://schemas.microsoft.com/office/drawing/2013/main/command" xmlns:pc="http://schemas.microsoft.com/office/powerpoint/2013/main/command">
+  <pc:docChgLst>
+    <pc:chgData name="Andy Larkman" userId="2da26f2e4321c6c2" providerId="LiveId" clId="{011D6294-EEDB-4A63-B2E0-7A95F87567C2}"/>
+    <pc:docChg chg="modSld">
+      <pc:chgData name="Andy Larkman" userId="2da26f2e4321c6c2" providerId="LiveId" clId="{011D6294-EEDB-4A63-B2E0-7A95F87567C2}" dt="2025-09-12T10:38:10.098" v="1" actId="22"/>
+      <pc:docMkLst>
+        <pc:docMk/>
+      </pc:docMkLst>
+      <pc:sldChg chg="addSp mod">
+        <pc:chgData name="Andy Larkman" userId="2da26f2e4321c6c2" providerId="LiveId" clId="{011D6294-EEDB-4A63-B2E0-7A95F87567C2}" dt="2025-09-12T10:37:52.568" v="0" actId="22"/>
+        <pc:sldMkLst>
+          <pc:docMk/>
+          <pc:sldMk cId="1739857644" sldId="265"/>
+        </pc:sldMkLst>
+        <pc:picChg chg="add">
+          <ac:chgData name="Andy Larkman" userId="2da26f2e4321c6c2" providerId="LiveId" clId="{011D6294-EEDB-4A63-B2E0-7A95F87567C2}" dt="2025-09-12T10:37:52.568" v="0" actId="22"/>
+          <ac:picMkLst>
+            <pc:docMk/>
+            <pc:sldMk cId="1739857644" sldId="265"/>
+            <ac:picMk id="3" creationId="{8E17ABA5-EB81-1B76-65F5-5771C5359A11}"/>
+          </ac:picMkLst>
+        </pc:picChg>
+      </pc:sldChg>
+      <pc:sldChg chg="addSp mod">
+        <pc:chgData name="Andy Larkman" userId="2da26f2e4321c6c2" providerId="LiveId" clId="{011D6294-EEDB-4A63-B2E0-7A95F87567C2}" dt="2025-09-12T10:38:10.098" v="1" actId="22"/>
+        <pc:sldMkLst>
+          <pc:docMk/>
+          <pc:sldMk cId="4049805621" sldId="266"/>
+        </pc:sldMkLst>
+        <pc:picChg chg="add">
+          <ac:chgData name="Andy Larkman" userId="2da26f2e4321c6c2" providerId="LiveId" clId="{011D6294-EEDB-4A63-B2E0-7A95F87567C2}" dt="2025-09-12T10:38:10.098" v="1" actId="22"/>
+          <ac:picMkLst>
+            <pc:docMk/>
+            <pc:sldMk cId="4049805621" sldId="266"/>
+            <ac:picMk id="3" creationId="{FBC7FE6D-CDAB-1AF2-7FB2-5B1392861C3B}"/>
+          </ac:picMkLst>
+        </pc:picChg>
+      </pc:sldChg>
+    </pc:docChg>
+  </pc:docChgLst>
+  <pc:docChgLst>
+    <pc:chgData name="Andy Larkman" userId="2da26f2e4321c6c2" providerId="LiveId" clId="{B71A7C82-798A-48DC-9B06-FCEE167E4A24}"/>
+    <pc:docChg chg="custSel addSld delSld modSld sldOrd">
+      <pc:chgData name="Andy Larkman" userId="2da26f2e4321c6c2" providerId="LiveId" clId="{B71A7C82-798A-48DC-9B06-FCEE167E4A24}" dt="2025-08-21T21:57:39.428" v="64" actId="22"/>
+      <pc:docMkLst>
+        <pc:docMk/>
+      </pc:docMkLst>
+      <pc:sldChg chg="addSp mod">
+        <pc:chgData name="Andy Larkman" userId="2da26f2e4321c6c2" providerId="LiveId" clId="{B71A7C82-798A-48DC-9B06-FCEE167E4A24}" dt="2025-08-21T08:37:32.906" v="0" actId="22"/>
+        <pc:sldMkLst>
+          <pc:docMk/>
+          <pc:sldMk cId="556942426" sldId="260"/>
+        </pc:sldMkLst>
+        <pc:picChg chg="add">
+          <ac:chgData name="Andy Larkman" userId="2da26f2e4321c6c2" providerId="LiveId" clId="{B71A7C82-798A-48DC-9B06-FCEE167E4A24}" dt="2025-08-21T08:37:32.906" v="0" actId="22"/>
+          <ac:picMkLst>
+            <pc:docMk/>
+            <pc:sldMk cId="556942426" sldId="260"/>
+            <ac:picMk id="3" creationId="{CA1E03BC-08FE-31EA-5D4D-0E59C916A405}"/>
+          </ac:picMkLst>
+        </pc:picChg>
+      </pc:sldChg>
+      <pc:sldChg chg="addSp delSp modSp del mod">
+        <pc:chgData name="Andy Larkman" userId="2da26f2e4321c6c2" providerId="LiveId" clId="{B71A7C82-798A-48DC-9B06-FCEE167E4A24}" dt="2025-08-21T21:19:30.191" v="58" actId="47"/>
+        <pc:sldMkLst>
+          <pc:docMk/>
+          <pc:sldMk cId="1082248428" sldId="261"/>
+        </pc:sldMkLst>
+      </pc:sldChg>
+      <pc:sldChg chg="addSp mod">
+        <pc:chgData name="Andy Larkman" userId="2da26f2e4321c6c2" providerId="LiveId" clId="{B71A7C82-798A-48DC-9B06-FCEE167E4A24}" dt="2025-08-21T09:01:21.602" v="57" actId="22"/>
+        <pc:sldMkLst>
+          <pc:docMk/>
+          <pc:sldMk cId="4134498953" sldId="262"/>
+        </pc:sldMkLst>
+        <pc:picChg chg="add">
+          <ac:chgData name="Andy Larkman" userId="2da26f2e4321c6c2" providerId="LiveId" clId="{B71A7C82-798A-48DC-9B06-FCEE167E4A24}" dt="2025-08-21T09:01:21.602" v="57" actId="22"/>
+          <ac:picMkLst>
+            <pc:docMk/>
+            <pc:sldMk cId="4134498953" sldId="262"/>
+            <ac:picMk id="3" creationId="{5BD3CFED-F21A-6217-629A-69CD13B0D64D}"/>
+          </ac:picMkLst>
+        </pc:picChg>
+      </pc:sldChg>
+      <pc:sldChg chg="addSp modSp mod ord">
+        <pc:chgData name="Andy Larkman" userId="2da26f2e4321c6c2" providerId="LiveId" clId="{B71A7C82-798A-48DC-9B06-FCEE167E4A24}" dt="2025-08-21T21:20:17.855" v="63"/>
+        <pc:sldMkLst>
+          <pc:docMk/>
+          <pc:sldMk cId="1306477680" sldId="263"/>
+        </pc:sldMkLst>
+        <pc:picChg chg="add mod">
+          <ac:chgData name="Andy Larkman" userId="2da26f2e4321c6c2" providerId="LiveId" clId="{B71A7C82-798A-48DC-9B06-FCEE167E4A24}" dt="2025-08-21T21:20:15.083" v="61" actId="14100"/>
+          <ac:picMkLst>
+            <pc:docMk/>
+            <pc:sldMk cId="1306477680" sldId="263"/>
+            <ac:picMk id="3" creationId="{7B0EEBC9-9BD7-352B-9A2B-D455C9CDFA58}"/>
+          </ac:picMkLst>
+        </pc:picChg>
+      </pc:sldChg>
+      <pc:sldChg chg="addSp mod">
+        <pc:chgData name="Andy Larkman" userId="2da26f2e4321c6c2" providerId="LiveId" clId="{B71A7C82-798A-48DC-9B06-FCEE167E4A24}" dt="2025-08-21T21:57:39.428" v="64" actId="22"/>
+        <pc:sldMkLst>
+          <pc:docMk/>
+          <pc:sldMk cId="464445035" sldId="264"/>
+        </pc:sldMkLst>
+        <pc:picChg chg="add">
+          <ac:chgData name="Andy Larkman" userId="2da26f2e4321c6c2" providerId="LiveId" clId="{B71A7C82-798A-48DC-9B06-FCEE167E4A24}" dt="2025-08-21T21:57:39.428" v="64" actId="22"/>
+          <ac:picMkLst>
+            <pc:docMk/>
+            <pc:sldMk cId="464445035" sldId="264"/>
+            <ac:picMk id="3" creationId="{749D5594-346D-9DC9-929D-674AE3738D8D}"/>
+          </ac:picMkLst>
+        </pc:picChg>
+      </pc:sldChg>
+      <pc:sldChg chg="add del">
+        <pc:chgData name="Andy Larkman" userId="2da26f2e4321c6c2" providerId="LiveId" clId="{B71A7C82-798A-48DC-9B06-FCEE167E4A24}" dt="2025-08-21T09:01:18.606" v="56" actId="47"/>
+        <pc:sldMkLst>
+          <pc:docMk/>
+          <pc:sldMk cId="2706599228" sldId="282"/>
+        </pc:sldMkLst>
+      </pc:sldChg>
+    </pc:docChg>
+  </pc:docChgLst>
+  <pc:docChgLst>
+    <pc:chgData name="Andy Larkman" userId="2da26f2e4321c6c2" providerId="LiveId" clId="{AE5B54F1-C8F5-448A-ADA0-38ECB62D068A}"/>
+    <pc:docChg chg="addSld modSld">
+      <pc:chgData name="Andy Larkman" userId="2da26f2e4321c6c2" providerId="LiveId" clId="{AE5B54F1-C8F5-448A-ADA0-38ECB62D068A}" dt="2025-06-12T08:02:17.164" v="1" actId="22"/>
+      <pc:docMkLst>
+        <pc:docMk/>
+      </pc:docMkLst>
+      <pc:sldChg chg="addSp new mod">
+        <pc:chgData name="Andy Larkman" userId="2da26f2e4321c6c2" providerId="LiveId" clId="{AE5B54F1-C8F5-448A-ADA0-38ECB62D068A}" dt="2025-06-12T08:02:17.164" v="1" actId="22"/>
+        <pc:sldMkLst>
+          <pc:docMk/>
+          <pc:sldMk cId="2385937515" sldId="256"/>
+        </pc:sldMkLst>
+      </pc:sldChg>
+    </pc:docChg>
+  </pc:docChgLst>
   <pc:docChgLst>
     <pc:chgData name="Andy Larkman" userId="2da26f2e4321c6c2" providerId="LiveId" clId="{DD57E241-0078-4AE8-9E57-FF82578EE339}"/>
     <pc:docChg chg="custSel addSld delSld modSld sldOrd">
@@ -390,144 +533,6 @@
       </pc:sldChg>
     </pc:docChg>
   </pc:docChgLst>
-  <pc:docChgLst>
-    <pc:chgData name="Andy Larkman" userId="2da26f2e4321c6c2" providerId="LiveId" clId="{011D6294-EEDB-4A63-B2E0-7A95F87567C2}"/>
-    <pc:docChg chg="modSld">
-      <pc:chgData name="Andy Larkman" userId="2da26f2e4321c6c2" providerId="LiveId" clId="{011D6294-EEDB-4A63-B2E0-7A95F87567C2}" dt="2025-09-12T10:38:10.098" v="1" actId="22"/>
-      <pc:docMkLst>
-        <pc:docMk/>
-      </pc:docMkLst>
-      <pc:sldChg chg="addSp mod">
-        <pc:chgData name="Andy Larkman" userId="2da26f2e4321c6c2" providerId="LiveId" clId="{011D6294-EEDB-4A63-B2E0-7A95F87567C2}" dt="2025-09-12T10:37:52.568" v="0" actId="22"/>
-        <pc:sldMkLst>
-          <pc:docMk/>
-          <pc:sldMk cId="1739857644" sldId="265"/>
-        </pc:sldMkLst>
-        <pc:picChg chg="add">
-          <ac:chgData name="Andy Larkman" userId="2da26f2e4321c6c2" providerId="LiveId" clId="{011D6294-EEDB-4A63-B2E0-7A95F87567C2}" dt="2025-09-12T10:37:52.568" v="0" actId="22"/>
-          <ac:picMkLst>
-            <pc:docMk/>
-            <pc:sldMk cId="1739857644" sldId="265"/>
-            <ac:picMk id="3" creationId="{8E17ABA5-EB81-1B76-65F5-5771C5359A11}"/>
-          </ac:picMkLst>
-        </pc:picChg>
-      </pc:sldChg>
-      <pc:sldChg chg="addSp mod">
-        <pc:chgData name="Andy Larkman" userId="2da26f2e4321c6c2" providerId="LiveId" clId="{011D6294-EEDB-4A63-B2E0-7A95F87567C2}" dt="2025-09-12T10:38:10.098" v="1" actId="22"/>
-        <pc:sldMkLst>
-          <pc:docMk/>
-          <pc:sldMk cId="4049805621" sldId="266"/>
-        </pc:sldMkLst>
-        <pc:picChg chg="add">
-          <ac:chgData name="Andy Larkman" userId="2da26f2e4321c6c2" providerId="LiveId" clId="{011D6294-EEDB-4A63-B2E0-7A95F87567C2}" dt="2025-09-12T10:38:10.098" v="1" actId="22"/>
-          <ac:picMkLst>
-            <pc:docMk/>
-            <pc:sldMk cId="4049805621" sldId="266"/>
-            <ac:picMk id="3" creationId="{FBC7FE6D-CDAB-1AF2-7FB2-5B1392861C3B}"/>
-          </ac:picMkLst>
-        </pc:picChg>
-      </pc:sldChg>
-    </pc:docChg>
-  </pc:docChgLst>
-  <pc:docChgLst>
-    <pc:chgData name="Andy Larkman" userId="2da26f2e4321c6c2" providerId="LiveId" clId="{B71A7C82-798A-48DC-9B06-FCEE167E4A24}"/>
-    <pc:docChg chg="custSel addSld delSld modSld sldOrd">
-      <pc:chgData name="Andy Larkman" userId="2da26f2e4321c6c2" providerId="LiveId" clId="{B71A7C82-798A-48DC-9B06-FCEE167E4A24}" dt="2025-08-21T21:57:39.428" v="64" actId="22"/>
-      <pc:docMkLst>
-        <pc:docMk/>
-      </pc:docMkLst>
-      <pc:sldChg chg="addSp mod">
-        <pc:chgData name="Andy Larkman" userId="2da26f2e4321c6c2" providerId="LiveId" clId="{B71A7C82-798A-48DC-9B06-FCEE167E4A24}" dt="2025-08-21T08:37:32.906" v="0" actId="22"/>
-        <pc:sldMkLst>
-          <pc:docMk/>
-          <pc:sldMk cId="556942426" sldId="260"/>
-        </pc:sldMkLst>
-        <pc:picChg chg="add">
-          <ac:chgData name="Andy Larkman" userId="2da26f2e4321c6c2" providerId="LiveId" clId="{B71A7C82-798A-48DC-9B06-FCEE167E4A24}" dt="2025-08-21T08:37:32.906" v="0" actId="22"/>
-          <ac:picMkLst>
-            <pc:docMk/>
-            <pc:sldMk cId="556942426" sldId="260"/>
-            <ac:picMk id="3" creationId="{CA1E03BC-08FE-31EA-5D4D-0E59C916A405}"/>
-          </ac:picMkLst>
-        </pc:picChg>
-      </pc:sldChg>
-      <pc:sldChg chg="addSp delSp modSp del mod">
-        <pc:chgData name="Andy Larkman" userId="2da26f2e4321c6c2" providerId="LiveId" clId="{B71A7C82-798A-48DC-9B06-FCEE167E4A24}" dt="2025-08-21T21:19:30.191" v="58" actId="47"/>
-        <pc:sldMkLst>
-          <pc:docMk/>
-          <pc:sldMk cId="1082248428" sldId="261"/>
-        </pc:sldMkLst>
-      </pc:sldChg>
-      <pc:sldChg chg="addSp mod">
-        <pc:chgData name="Andy Larkman" userId="2da26f2e4321c6c2" providerId="LiveId" clId="{B71A7C82-798A-48DC-9B06-FCEE167E4A24}" dt="2025-08-21T09:01:21.602" v="57" actId="22"/>
-        <pc:sldMkLst>
-          <pc:docMk/>
-          <pc:sldMk cId="4134498953" sldId="262"/>
-        </pc:sldMkLst>
-        <pc:picChg chg="add">
-          <ac:chgData name="Andy Larkman" userId="2da26f2e4321c6c2" providerId="LiveId" clId="{B71A7C82-798A-48DC-9B06-FCEE167E4A24}" dt="2025-08-21T09:01:21.602" v="57" actId="22"/>
-          <ac:picMkLst>
-            <pc:docMk/>
-            <pc:sldMk cId="4134498953" sldId="262"/>
-            <ac:picMk id="3" creationId="{5BD3CFED-F21A-6217-629A-69CD13B0D64D}"/>
-          </ac:picMkLst>
-        </pc:picChg>
-      </pc:sldChg>
-      <pc:sldChg chg="addSp modSp mod ord">
-        <pc:chgData name="Andy Larkman" userId="2da26f2e4321c6c2" providerId="LiveId" clId="{B71A7C82-798A-48DC-9B06-FCEE167E4A24}" dt="2025-08-21T21:20:17.855" v="63"/>
-        <pc:sldMkLst>
-          <pc:docMk/>
-          <pc:sldMk cId="1306477680" sldId="263"/>
-        </pc:sldMkLst>
-        <pc:picChg chg="add mod">
-          <ac:chgData name="Andy Larkman" userId="2da26f2e4321c6c2" providerId="LiveId" clId="{B71A7C82-798A-48DC-9B06-FCEE167E4A24}" dt="2025-08-21T21:20:15.083" v="61" actId="14100"/>
-          <ac:picMkLst>
-            <pc:docMk/>
-            <pc:sldMk cId="1306477680" sldId="263"/>
-            <ac:picMk id="3" creationId="{7B0EEBC9-9BD7-352B-9A2B-D455C9CDFA58}"/>
-          </ac:picMkLst>
-        </pc:picChg>
-      </pc:sldChg>
-      <pc:sldChg chg="addSp mod">
-        <pc:chgData name="Andy Larkman" userId="2da26f2e4321c6c2" providerId="LiveId" clId="{B71A7C82-798A-48DC-9B06-FCEE167E4A24}" dt="2025-08-21T21:57:39.428" v="64" actId="22"/>
-        <pc:sldMkLst>
-          <pc:docMk/>
-          <pc:sldMk cId="464445035" sldId="264"/>
-        </pc:sldMkLst>
-        <pc:picChg chg="add">
-          <ac:chgData name="Andy Larkman" userId="2da26f2e4321c6c2" providerId="LiveId" clId="{B71A7C82-798A-48DC-9B06-FCEE167E4A24}" dt="2025-08-21T21:57:39.428" v="64" actId="22"/>
-          <ac:picMkLst>
-            <pc:docMk/>
-            <pc:sldMk cId="464445035" sldId="264"/>
-            <ac:picMk id="3" creationId="{749D5594-346D-9DC9-929D-674AE3738D8D}"/>
-          </ac:picMkLst>
-        </pc:picChg>
-      </pc:sldChg>
-      <pc:sldChg chg="add del">
-        <pc:chgData name="Andy Larkman" userId="2da26f2e4321c6c2" providerId="LiveId" clId="{B71A7C82-798A-48DC-9B06-FCEE167E4A24}" dt="2025-08-21T09:01:18.606" v="56" actId="47"/>
-        <pc:sldMkLst>
-          <pc:docMk/>
-          <pc:sldMk cId="2706599228" sldId="282"/>
-        </pc:sldMkLst>
-      </pc:sldChg>
-    </pc:docChg>
-  </pc:docChgLst>
-  <pc:docChgLst>
-    <pc:chgData name="Andy Larkman" userId="2da26f2e4321c6c2" providerId="LiveId" clId="{AE5B54F1-C8F5-448A-ADA0-38ECB62D068A}"/>
-    <pc:docChg chg="addSld modSld">
-      <pc:chgData name="Andy Larkman" userId="2da26f2e4321c6c2" providerId="LiveId" clId="{AE5B54F1-C8F5-448A-ADA0-38ECB62D068A}" dt="2025-06-12T08:02:17.164" v="1" actId="22"/>
-      <pc:docMkLst>
-        <pc:docMk/>
-      </pc:docMkLst>
-      <pc:sldChg chg="addSp new mod">
-        <pc:chgData name="Andy Larkman" userId="2da26f2e4321c6c2" providerId="LiveId" clId="{AE5B54F1-C8F5-448A-ADA0-38ECB62D068A}" dt="2025-06-12T08:02:17.164" v="1" actId="22"/>
-        <pc:sldMkLst>
-          <pc:docMk/>
-          <pc:sldMk cId="2385937515" sldId="256"/>
-        </pc:sldMkLst>
-      </pc:sldChg>
-    </pc:docChg>
-  </pc:docChgLst>
 </pc:chgInfo>
 </file>
 
@@ -680,7 +685,7 @@
           <a:p>
             <a:fld id="{55FA135A-769C-438D-9AC0-5CFB87EA78F4}" type="datetimeFigureOut">
               <a:rPr lang="en-GB" smtClean="0"/>
-              <a:t>14/09/2025</a:t>
+              <a:t>17/09/2025</a:t>
             </a:fld>
             <a:endParaRPr lang="en-GB"/>
           </a:p>
@@ -880,7 +885,7 @@
           <a:p>
             <a:fld id="{55FA135A-769C-438D-9AC0-5CFB87EA78F4}" type="datetimeFigureOut">
               <a:rPr lang="en-GB" smtClean="0"/>
-              <a:t>14/09/2025</a:t>
+              <a:t>17/09/2025</a:t>
             </a:fld>
             <a:endParaRPr lang="en-GB"/>
           </a:p>
@@ -1090,7 +1095,7 @@
           <a:p>
             <a:fld id="{55FA135A-769C-438D-9AC0-5CFB87EA78F4}" type="datetimeFigureOut">
               <a:rPr lang="en-GB" smtClean="0"/>
-              <a:t>14/09/2025</a:t>
+              <a:t>17/09/2025</a:t>
             </a:fld>
             <a:endParaRPr lang="en-GB"/>
           </a:p>
@@ -1290,7 +1295,7 @@
           <a:p>
             <a:fld id="{55FA135A-769C-438D-9AC0-5CFB87EA78F4}" type="datetimeFigureOut">
               <a:rPr lang="en-GB" smtClean="0"/>
-              <a:t>14/09/2025</a:t>
+              <a:t>17/09/2025</a:t>
             </a:fld>
             <a:endParaRPr lang="en-GB"/>
           </a:p>
@@ -1566,7 +1571,7 @@
           <a:p>
             <a:fld id="{55FA135A-769C-438D-9AC0-5CFB87EA78F4}" type="datetimeFigureOut">
               <a:rPr lang="en-GB" smtClean="0"/>
-              <a:t>14/09/2025</a:t>
+              <a:t>17/09/2025</a:t>
             </a:fld>
             <a:endParaRPr lang="en-GB"/>
           </a:p>
@@ -1834,7 +1839,7 @@
           <a:p>
             <a:fld id="{55FA135A-769C-438D-9AC0-5CFB87EA78F4}" type="datetimeFigureOut">
               <a:rPr lang="en-GB" smtClean="0"/>
-              <a:t>14/09/2025</a:t>
+              <a:t>17/09/2025</a:t>
             </a:fld>
             <a:endParaRPr lang="en-GB"/>
           </a:p>
@@ -2249,7 +2254,7 @@
           <a:p>
             <a:fld id="{55FA135A-769C-438D-9AC0-5CFB87EA78F4}" type="datetimeFigureOut">
               <a:rPr lang="en-GB" smtClean="0"/>
-              <a:t>14/09/2025</a:t>
+              <a:t>17/09/2025</a:t>
             </a:fld>
             <a:endParaRPr lang="en-GB"/>
           </a:p>
@@ -2391,7 +2396,7 @@
           <a:p>
             <a:fld id="{55FA135A-769C-438D-9AC0-5CFB87EA78F4}" type="datetimeFigureOut">
               <a:rPr lang="en-GB" smtClean="0"/>
-              <a:t>14/09/2025</a:t>
+              <a:t>17/09/2025</a:t>
             </a:fld>
             <a:endParaRPr lang="en-GB"/>
           </a:p>
@@ -2504,7 +2509,7 @@
           <a:p>
             <a:fld id="{55FA135A-769C-438D-9AC0-5CFB87EA78F4}" type="datetimeFigureOut">
               <a:rPr lang="en-GB" smtClean="0"/>
-              <a:t>14/09/2025</a:t>
+              <a:t>17/09/2025</a:t>
             </a:fld>
             <a:endParaRPr lang="en-GB"/>
           </a:p>
@@ -2817,7 +2822,7 @@
           <a:p>
             <a:fld id="{55FA135A-769C-438D-9AC0-5CFB87EA78F4}" type="datetimeFigureOut">
               <a:rPr lang="en-GB" smtClean="0"/>
-              <a:t>14/09/2025</a:t>
+              <a:t>17/09/2025</a:t>
             </a:fld>
             <a:endParaRPr lang="en-GB"/>
           </a:p>
@@ -3106,7 +3111,7 @@
           <a:p>
             <a:fld id="{55FA135A-769C-438D-9AC0-5CFB87EA78F4}" type="datetimeFigureOut">
               <a:rPr lang="en-GB" smtClean="0"/>
-              <a:t>14/09/2025</a:t>
+              <a:t>17/09/2025</a:t>
             </a:fld>
             <a:endParaRPr lang="en-GB"/>
           </a:p>
@@ -3349,7 +3354,7 @@
           <a:p>
             <a:fld id="{55FA135A-769C-438D-9AC0-5CFB87EA78F4}" type="datetimeFigureOut">
               <a:rPr lang="en-GB" smtClean="0"/>
-              <a:t>14/09/2025</a:t>
+              <a:t>17/09/2025</a:t>
             </a:fld>
             <a:endParaRPr lang="en-GB"/>
           </a:p>
@@ -4168,6 +4173,46 @@
           <a:chExt cx="0" cy="0"/>
         </a:xfrm>
       </p:grpSpPr>
+      <p:sp>
+        <p:nvSpPr>
+          <p:cNvPr id="2" name="TextBox 1">
+            <a:extLst>
+              <a:ext uri="{FF2B5EF4-FFF2-40B4-BE49-F238E27FC236}">
+                <a16:creationId xmlns:a16="http://schemas.microsoft.com/office/drawing/2014/main" id="{830CC778-07BB-FC2D-8599-18550EFEC9D5}"/>
+              </a:ext>
+            </a:extLst>
+          </p:cNvPr>
+          <p:cNvSpPr txBox="1"/>
+          <p:nvPr/>
+        </p:nvSpPr>
+        <p:spPr>
+          <a:xfrm>
+            <a:off x="0" y="0"/>
+            <a:ext cx="2907206" cy="523220"/>
+          </a:xfrm>
+          <a:prstGeom prst="rect">
+            <a:avLst/>
+          </a:prstGeom>
+          <a:noFill/>
+        </p:spPr>
+        <p:txBody>
+          <a:bodyPr wrap="none" rtlCol="0">
+            <a:spAutoFit/>
+          </a:bodyPr>
+          <a:lstStyle/>
+          <a:p>
+            <a:r>
+              <a:rPr lang="en-GB" sz="2800" b="1" u="sng" dirty="0"/>
+              <a:t>Lap before </a:t>
+            </a:r>
+            <a:r>
+              <a:rPr lang="en-GB" sz="2800" b="1" u="sng" dirty="0" err="1"/>
+              <a:t>InLap</a:t>
+            </a:r>
+            <a:endParaRPr lang="en-GB" sz="2800" b="1" u="sng" dirty="0"/>
+          </a:p>
+        </p:txBody>
+      </p:sp>
     </p:spTree>
     <p:extLst>
       <p:ext uri="{BB962C8B-B14F-4D97-AF65-F5344CB8AC3E}">
@@ -4189,7 +4234,7 @@
         <p:cNvPr id="1" name="">
           <a:extLst>
             <a:ext uri="{FF2B5EF4-FFF2-40B4-BE49-F238E27FC236}">
-              <a16:creationId xmlns:a16="http://schemas.microsoft.com/office/drawing/2014/main" id="{43C6F10C-A12A-B1A5-758D-05A204FCE0AE}"/>
+              <a16:creationId xmlns:a16="http://schemas.microsoft.com/office/drawing/2014/main" id="{C4BCAFC0-5B20-C004-A59A-D7EAE7438595}"/>
             </a:ext>
           </a:extLst>
         </p:cNvPr>
@@ -4204,10 +4249,50 @@
           <a:chExt cx="0" cy="0"/>
         </a:xfrm>
       </p:grpSpPr>
+      <p:sp>
+        <p:nvSpPr>
+          <p:cNvPr id="2" name="TextBox 1">
+            <a:extLst>
+              <a:ext uri="{FF2B5EF4-FFF2-40B4-BE49-F238E27FC236}">
+                <a16:creationId xmlns:a16="http://schemas.microsoft.com/office/drawing/2014/main" id="{BEFC1F69-B8FB-2AE9-B5D3-49C8274218AE}"/>
+              </a:ext>
+            </a:extLst>
+          </p:cNvPr>
+          <p:cNvSpPr txBox="1"/>
+          <p:nvPr/>
+        </p:nvSpPr>
+        <p:spPr>
+          <a:xfrm>
+            <a:off x="0" y="0"/>
+            <a:ext cx="1874103" cy="523220"/>
+          </a:xfrm>
+          <a:prstGeom prst="rect">
+            <a:avLst/>
+          </a:prstGeom>
+          <a:noFill/>
+        </p:spPr>
+        <p:txBody>
+          <a:bodyPr wrap="none" rtlCol="0">
+            <a:spAutoFit/>
+          </a:bodyPr>
+          <a:lstStyle/>
+          <a:p>
+            <a:r>
+              <a:rPr lang="en-GB" sz="2800" b="1" u="sng" dirty="0"/>
+              <a:t>Raw </a:t>
+            </a:r>
+            <a:r>
+              <a:rPr lang="en-GB" sz="2800" b="1" u="sng" dirty="0" err="1"/>
+              <a:t>InLap</a:t>
+            </a:r>
+            <a:endParaRPr lang="en-GB" sz="2800" b="1" u="sng" dirty="0"/>
+          </a:p>
+        </p:txBody>
+      </p:sp>
     </p:spTree>
     <p:extLst>
       <p:ext uri="{BB962C8B-B14F-4D97-AF65-F5344CB8AC3E}">
-        <p14:creationId xmlns:p14="http://schemas.microsoft.com/office/powerpoint/2010/main" val="721931620"/>
+        <p14:creationId xmlns:p14="http://schemas.microsoft.com/office/powerpoint/2010/main" val="2698483766"/>
       </p:ext>
     </p:extLst>
   </p:cSld>
@@ -4225,7 +4310,7 @@
         <p:cNvPr id="1" name="">
           <a:extLst>
             <a:ext uri="{FF2B5EF4-FFF2-40B4-BE49-F238E27FC236}">
-              <a16:creationId xmlns:a16="http://schemas.microsoft.com/office/drawing/2014/main" id="{394644AC-7511-120B-8BE8-A9DC6D434AD5}"/>
+              <a16:creationId xmlns:a16="http://schemas.microsoft.com/office/drawing/2014/main" id="{96EA0D79-D925-2BC4-4F1E-88C6C577F92D}"/>
             </a:ext>
           </a:extLst>
         </p:cNvPr>
@@ -4240,10 +4325,45 @@
           <a:chExt cx="0" cy="0"/>
         </a:xfrm>
       </p:grpSpPr>
+      <p:sp>
+        <p:nvSpPr>
+          <p:cNvPr id="2" name="TextBox 1">
+            <a:extLst>
+              <a:ext uri="{FF2B5EF4-FFF2-40B4-BE49-F238E27FC236}">
+                <a16:creationId xmlns:a16="http://schemas.microsoft.com/office/drawing/2014/main" id="{799DEBB5-F391-950E-0EF3-56FB6FE0FC8F}"/>
+              </a:ext>
+            </a:extLst>
+          </p:cNvPr>
+          <p:cNvSpPr txBox="1"/>
+          <p:nvPr/>
+        </p:nvSpPr>
+        <p:spPr>
+          <a:xfrm>
+            <a:off x="0" y="0"/>
+            <a:ext cx="4541051" cy="523220"/>
+          </a:xfrm>
+          <a:prstGeom prst="rect">
+            <a:avLst/>
+          </a:prstGeom>
+          <a:noFill/>
+        </p:spPr>
+        <p:txBody>
+          <a:bodyPr wrap="none" rtlCol="0">
+            <a:spAutoFit/>
+          </a:bodyPr>
+          <a:lstStyle/>
+          <a:p>
+            <a:r>
+              <a:rPr lang="en-GB" sz="2800" b="1" u="sng" dirty="0"/>
+              <a:t>While Stationary in Pit Box</a:t>
+            </a:r>
+          </a:p>
+        </p:txBody>
+      </p:sp>
     </p:spTree>
     <p:extLst>
       <p:ext uri="{BB962C8B-B14F-4D97-AF65-F5344CB8AC3E}">
-        <p14:creationId xmlns:p14="http://schemas.microsoft.com/office/powerpoint/2010/main" val="1888056661"/>
+        <p14:creationId xmlns:p14="http://schemas.microsoft.com/office/powerpoint/2010/main" val="1877618256"/>
       </p:ext>
     </p:extLst>
   </p:cSld>
@@ -4261,7 +4381,7 @@
         <p:cNvPr id="1" name="">
           <a:extLst>
             <a:ext uri="{FF2B5EF4-FFF2-40B4-BE49-F238E27FC236}">
-              <a16:creationId xmlns:a16="http://schemas.microsoft.com/office/drawing/2014/main" id="{FD0E3163-8848-84D7-641F-8C03AE4627BD}"/>
+              <a16:creationId xmlns:a16="http://schemas.microsoft.com/office/drawing/2014/main" id="{B22860BD-F9E5-DFC4-25DC-D567912EAB31}"/>
             </a:ext>
           </a:extLst>
         </p:cNvPr>
@@ -4276,10 +4396,50 @@
           <a:chExt cx="0" cy="0"/>
         </a:xfrm>
       </p:grpSpPr>
+      <p:sp>
+        <p:nvSpPr>
+          <p:cNvPr id="2" name="TextBox 1">
+            <a:extLst>
+              <a:ext uri="{FF2B5EF4-FFF2-40B4-BE49-F238E27FC236}">
+                <a16:creationId xmlns:a16="http://schemas.microsoft.com/office/drawing/2014/main" id="{423FC964-8024-BED4-431B-48FFFBDACA27}"/>
+              </a:ext>
+            </a:extLst>
+          </p:cNvPr>
+          <p:cNvSpPr txBox="1"/>
+          <p:nvPr/>
+        </p:nvSpPr>
+        <p:spPr>
+          <a:xfrm>
+            <a:off x="0" y="0"/>
+            <a:ext cx="2161041" cy="523220"/>
+          </a:xfrm>
+          <a:prstGeom prst="rect">
+            <a:avLst/>
+          </a:prstGeom>
+          <a:noFill/>
+        </p:spPr>
+        <p:txBody>
+          <a:bodyPr wrap="none" rtlCol="0">
+            <a:spAutoFit/>
+          </a:bodyPr>
+          <a:lstStyle/>
+          <a:p>
+            <a:r>
+              <a:rPr lang="en-GB" sz="2800" b="1" u="sng" dirty="0"/>
+              <a:t>Raw </a:t>
+            </a:r>
+            <a:r>
+              <a:rPr lang="en-GB" sz="2800" b="1" u="sng" dirty="0" err="1"/>
+              <a:t>OutLap</a:t>
+            </a:r>
+            <a:endParaRPr lang="en-GB" sz="2800" b="1" u="sng" dirty="0"/>
+          </a:p>
+        </p:txBody>
+      </p:sp>
     </p:spTree>
     <p:extLst>
       <p:ext uri="{BB962C8B-B14F-4D97-AF65-F5344CB8AC3E}">
-        <p14:creationId xmlns:p14="http://schemas.microsoft.com/office/powerpoint/2010/main" val="1796743994"/>
+        <p14:creationId xmlns:p14="http://schemas.microsoft.com/office/powerpoint/2010/main" val="3038862163"/>
       </p:ext>
     </p:extLst>
   </p:cSld>
@@ -4297,7 +4457,7 @@
         <p:cNvPr id="1" name="">
           <a:extLst>
             <a:ext uri="{FF2B5EF4-FFF2-40B4-BE49-F238E27FC236}">
-              <a16:creationId xmlns:a16="http://schemas.microsoft.com/office/drawing/2014/main" id="{9C6BEE9D-CC8D-383A-F8D5-4C2D26C204F3}"/>
+              <a16:creationId xmlns:a16="http://schemas.microsoft.com/office/drawing/2014/main" id="{D3786FF8-9437-2B4A-9D7B-B76C442291F6}"/>
             </a:ext>
           </a:extLst>
         </p:cNvPr>
@@ -4312,10 +4472,50 @@
           <a:chExt cx="0" cy="0"/>
         </a:xfrm>
       </p:grpSpPr>
+      <p:sp>
+        <p:nvSpPr>
+          <p:cNvPr id="2" name="TextBox 1">
+            <a:extLst>
+              <a:ext uri="{FF2B5EF4-FFF2-40B4-BE49-F238E27FC236}">
+                <a16:creationId xmlns:a16="http://schemas.microsoft.com/office/drawing/2014/main" id="{A460A949-39DF-CC9F-8623-8DBB770EF784}"/>
+              </a:ext>
+            </a:extLst>
+          </p:cNvPr>
+          <p:cNvSpPr txBox="1"/>
+          <p:nvPr/>
+        </p:nvSpPr>
+        <p:spPr>
+          <a:xfrm>
+            <a:off x="0" y="0"/>
+            <a:ext cx="2853025" cy="523220"/>
+          </a:xfrm>
+          <a:prstGeom prst="rect">
+            <a:avLst/>
+          </a:prstGeom>
+          <a:noFill/>
+        </p:spPr>
+        <p:txBody>
+          <a:bodyPr wrap="none" rtlCol="0">
+            <a:spAutoFit/>
+          </a:bodyPr>
+          <a:lstStyle/>
+          <a:p>
+            <a:r>
+              <a:rPr lang="en-GB" sz="2800" b="1" u="sng" dirty="0"/>
+              <a:t>Lap After </a:t>
+            </a:r>
+            <a:r>
+              <a:rPr lang="en-GB" sz="2800" b="1" u="sng" dirty="0" err="1"/>
+              <a:t>Outlap</a:t>
+            </a:r>
+            <a:endParaRPr lang="en-GB" sz="2800" b="1" u="sng" dirty="0"/>
+          </a:p>
+        </p:txBody>
+      </p:sp>
     </p:spTree>
     <p:extLst>
       <p:ext uri="{BB962C8B-B14F-4D97-AF65-F5344CB8AC3E}">
-        <p14:creationId xmlns:p14="http://schemas.microsoft.com/office/powerpoint/2010/main" val="3309312321"/>
+        <p14:creationId xmlns:p14="http://schemas.microsoft.com/office/powerpoint/2010/main" val="1156879548"/>
       </p:ext>
     </p:extLst>
   </p:cSld>
@@ -4393,6 +4593,226 @@
         <p:cNvPr id="1" name="">
           <a:extLst>
             <a:ext uri="{FF2B5EF4-FFF2-40B4-BE49-F238E27FC236}">
+              <a16:creationId xmlns:a16="http://schemas.microsoft.com/office/drawing/2014/main" id="{D0CAFE3F-C208-E75D-8F56-576EF905A56B}"/>
+            </a:ext>
+          </a:extLst>
+        </p:cNvPr>
+        <p:cNvGrpSpPr/>
+        <p:nvPr/>
+      </p:nvGrpSpPr>
+      <p:grpSpPr>
+        <a:xfrm>
+          <a:off x="0" y="0"/>
+          <a:ext cx="0" cy="0"/>
+          <a:chOff x="0" y="0"/>
+          <a:chExt cx="0" cy="0"/>
+        </a:xfrm>
+      </p:grpSpPr>
+      <p:sp>
+        <p:nvSpPr>
+          <p:cNvPr id="2" name="TextBox 1">
+            <a:extLst>
+              <a:ext uri="{FF2B5EF4-FFF2-40B4-BE49-F238E27FC236}">
+                <a16:creationId xmlns:a16="http://schemas.microsoft.com/office/drawing/2014/main" id="{64B7C699-D5F1-F2D1-849A-9C40988FEF7D}"/>
+              </a:ext>
+            </a:extLst>
+          </p:cNvPr>
+          <p:cNvSpPr txBox="1"/>
+          <p:nvPr/>
+        </p:nvSpPr>
+        <p:spPr>
+          <a:xfrm>
+            <a:off x="0" y="0"/>
+            <a:ext cx="3389774" cy="523220"/>
+          </a:xfrm>
+          <a:prstGeom prst="rect">
+            <a:avLst/>
+          </a:prstGeom>
+          <a:noFill/>
+        </p:spPr>
+        <p:txBody>
+          <a:bodyPr wrap="none" rtlCol="0">
+            <a:spAutoFit/>
+          </a:bodyPr>
+          <a:lstStyle/>
+          <a:p>
+            <a:r>
+              <a:rPr lang="en-GB" sz="2800" b="1" u="sng" dirty="0"/>
+              <a:t>2 Laps After </a:t>
+            </a:r>
+            <a:r>
+              <a:rPr lang="en-GB" sz="2800" b="1" u="sng" dirty="0" err="1"/>
+              <a:t>OutLap</a:t>
+            </a:r>
+            <a:endParaRPr lang="en-GB" sz="2800" b="1" u="sng" dirty="0"/>
+          </a:p>
+        </p:txBody>
+      </p:sp>
+    </p:spTree>
+    <p:extLst>
+      <p:ext uri="{BB962C8B-B14F-4D97-AF65-F5344CB8AC3E}">
+        <p14:creationId xmlns:p14="http://schemas.microsoft.com/office/powerpoint/2010/main" val="1310302009"/>
+      </p:ext>
+    </p:extLst>
+  </p:cSld>
+  <p:clrMapOvr>
+    <a:masterClrMapping/>
+  </p:clrMapOvr>
+</p:sld>
+</file>
+
+<file path=ppt/slides/slide21.xml><?xml version="1.0" encoding="utf-8"?>
+<p:sld xmlns:a="http://schemas.openxmlformats.org/drawingml/2006/main" xmlns:r="http://schemas.openxmlformats.org/officeDocument/2006/relationships" xmlns:p="http://schemas.openxmlformats.org/presentationml/2006/main">
+  <p:cSld>
+    <p:spTree>
+      <p:nvGrpSpPr>
+        <p:cNvPr id="1" name="">
+          <a:extLst>
+            <a:ext uri="{FF2B5EF4-FFF2-40B4-BE49-F238E27FC236}">
+              <a16:creationId xmlns:a16="http://schemas.microsoft.com/office/drawing/2014/main" id="{43C6F10C-A12A-B1A5-758D-05A204FCE0AE}"/>
+            </a:ext>
+          </a:extLst>
+        </p:cNvPr>
+        <p:cNvGrpSpPr/>
+        <p:nvPr/>
+      </p:nvGrpSpPr>
+      <p:grpSpPr>
+        <a:xfrm>
+          <a:off x="0" y="0"/>
+          <a:ext cx="0" cy="0"/>
+          <a:chOff x="0" y="0"/>
+          <a:chExt cx="0" cy="0"/>
+        </a:xfrm>
+      </p:grpSpPr>
+    </p:spTree>
+    <p:extLst>
+      <p:ext uri="{BB962C8B-B14F-4D97-AF65-F5344CB8AC3E}">
+        <p14:creationId xmlns:p14="http://schemas.microsoft.com/office/powerpoint/2010/main" val="721931620"/>
+      </p:ext>
+    </p:extLst>
+  </p:cSld>
+  <p:clrMapOvr>
+    <a:masterClrMapping/>
+  </p:clrMapOvr>
+</p:sld>
+</file>
+
+<file path=ppt/slides/slide22.xml><?xml version="1.0" encoding="utf-8"?>
+<p:sld xmlns:a="http://schemas.openxmlformats.org/drawingml/2006/main" xmlns:r="http://schemas.openxmlformats.org/officeDocument/2006/relationships" xmlns:p="http://schemas.openxmlformats.org/presentationml/2006/main">
+  <p:cSld>
+    <p:spTree>
+      <p:nvGrpSpPr>
+        <p:cNvPr id="1" name="">
+          <a:extLst>
+            <a:ext uri="{FF2B5EF4-FFF2-40B4-BE49-F238E27FC236}">
+              <a16:creationId xmlns:a16="http://schemas.microsoft.com/office/drawing/2014/main" id="{394644AC-7511-120B-8BE8-A9DC6D434AD5}"/>
+            </a:ext>
+          </a:extLst>
+        </p:cNvPr>
+        <p:cNvGrpSpPr/>
+        <p:nvPr/>
+      </p:nvGrpSpPr>
+      <p:grpSpPr>
+        <a:xfrm>
+          <a:off x="0" y="0"/>
+          <a:ext cx="0" cy="0"/>
+          <a:chOff x="0" y="0"/>
+          <a:chExt cx="0" cy="0"/>
+        </a:xfrm>
+      </p:grpSpPr>
+    </p:spTree>
+    <p:extLst>
+      <p:ext uri="{BB962C8B-B14F-4D97-AF65-F5344CB8AC3E}">
+        <p14:creationId xmlns:p14="http://schemas.microsoft.com/office/powerpoint/2010/main" val="1888056661"/>
+      </p:ext>
+    </p:extLst>
+  </p:cSld>
+  <p:clrMapOvr>
+    <a:masterClrMapping/>
+  </p:clrMapOvr>
+</p:sld>
+</file>
+
+<file path=ppt/slides/slide23.xml><?xml version="1.0" encoding="utf-8"?>
+<p:sld xmlns:a="http://schemas.openxmlformats.org/drawingml/2006/main" xmlns:r="http://schemas.openxmlformats.org/officeDocument/2006/relationships" xmlns:p="http://schemas.openxmlformats.org/presentationml/2006/main">
+  <p:cSld>
+    <p:spTree>
+      <p:nvGrpSpPr>
+        <p:cNvPr id="1" name="">
+          <a:extLst>
+            <a:ext uri="{FF2B5EF4-FFF2-40B4-BE49-F238E27FC236}">
+              <a16:creationId xmlns:a16="http://schemas.microsoft.com/office/drawing/2014/main" id="{FD0E3163-8848-84D7-641F-8C03AE4627BD}"/>
+            </a:ext>
+          </a:extLst>
+        </p:cNvPr>
+        <p:cNvGrpSpPr/>
+        <p:nvPr/>
+      </p:nvGrpSpPr>
+      <p:grpSpPr>
+        <a:xfrm>
+          <a:off x="0" y="0"/>
+          <a:ext cx="0" cy="0"/>
+          <a:chOff x="0" y="0"/>
+          <a:chExt cx="0" cy="0"/>
+        </a:xfrm>
+      </p:grpSpPr>
+    </p:spTree>
+    <p:extLst>
+      <p:ext uri="{BB962C8B-B14F-4D97-AF65-F5344CB8AC3E}">
+        <p14:creationId xmlns:p14="http://schemas.microsoft.com/office/powerpoint/2010/main" val="1796743994"/>
+      </p:ext>
+    </p:extLst>
+  </p:cSld>
+  <p:clrMapOvr>
+    <a:masterClrMapping/>
+  </p:clrMapOvr>
+</p:sld>
+</file>
+
+<file path=ppt/slides/slide24.xml><?xml version="1.0" encoding="utf-8"?>
+<p:sld xmlns:a="http://schemas.openxmlformats.org/drawingml/2006/main" xmlns:r="http://schemas.openxmlformats.org/officeDocument/2006/relationships" xmlns:p="http://schemas.openxmlformats.org/presentationml/2006/main">
+  <p:cSld>
+    <p:spTree>
+      <p:nvGrpSpPr>
+        <p:cNvPr id="1" name="">
+          <a:extLst>
+            <a:ext uri="{FF2B5EF4-FFF2-40B4-BE49-F238E27FC236}">
+              <a16:creationId xmlns:a16="http://schemas.microsoft.com/office/drawing/2014/main" id="{9C6BEE9D-CC8D-383A-F8D5-4C2D26C204F3}"/>
+            </a:ext>
+          </a:extLst>
+        </p:cNvPr>
+        <p:cNvGrpSpPr/>
+        <p:nvPr/>
+      </p:nvGrpSpPr>
+      <p:grpSpPr>
+        <a:xfrm>
+          <a:off x="0" y="0"/>
+          <a:ext cx="0" cy="0"/>
+          <a:chOff x="0" y="0"/>
+          <a:chExt cx="0" cy="0"/>
+        </a:xfrm>
+      </p:grpSpPr>
+    </p:spTree>
+    <p:extLst>
+      <p:ext uri="{BB962C8B-B14F-4D97-AF65-F5344CB8AC3E}">
+        <p14:creationId xmlns:p14="http://schemas.microsoft.com/office/powerpoint/2010/main" val="3309312321"/>
+      </p:ext>
+    </p:extLst>
+  </p:cSld>
+  <p:clrMapOvr>
+    <a:masterClrMapping/>
+  </p:clrMapOvr>
+</p:sld>
+</file>
+
+<file path=ppt/slides/slide25.xml><?xml version="1.0" encoding="utf-8"?>
+<p:sld xmlns:a="http://schemas.openxmlformats.org/drawingml/2006/main" xmlns:r="http://schemas.openxmlformats.org/officeDocument/2006/relationships" xmlns:p="http://schemas.openxmlformats.org/presentationml/2006/main">
+  <p:cSld>
+    <p:spTree>
+      <p:nvGrpSpPr>
+        <p:cNvPr id="1" name="">
+          <a:extLst>
+            <a:ext uri="{FF2B5EF4-FFF2-40B4-BE49-F238E27FC236}">
               <a16:creationId xmlns:a16="http://schemas.microsoft.com/office/drawing/2014/main" id="{272F221C-1FED-A921-993F-77037A53DBC6}"/>
             </a:ext>
           </a:extLst>
@@ -4421,7 +4841,7 @@
 </p:sld>
 </file>
 
-<file path=ppt/slides/slide21.xml><?xml version="1.0" encoding="utf-8"?>
+<file path=ppt/slides/slide26.xml><?xml version="1.0" encoding="utf-8"?>
 <p:sld xmlns:a="http://schemas.openxmlformats.org/drawingml/2006/main" xmlns:r="http://schemas.openxmlformats.org/officeDocument/2006/relationships" xmlns:p="http://schemas.openxmlformats.org/presentationml/2006/main">
   <p:cSld>
     <p:spTree>
@@ -4457,7 +4877,7 @@
 </p:sld>
 </file>
 
-<file path=ppt/slides/slide22.xml><?xml version="1.0" encoding="utf-8"?>
+<file path=ppt/slides/slide27.xml><?xml version="1.0" encoding="utf-8"?>
 <p:sld xmlns:a="http://schemas.openxmlformats.org/drawingml/2006/main" xmlns:r="http://schemas.openxmlformats.org/officeDocument/2006/relationships" xmlns:p="http://schemas.openxmlformats.org/presentationml/2006/main">
   <p:cSld>
     <p:spTree>
@@ -4493,7 +4913,7 @@
 </p:sld>
 </file>
 
-<file path=ppt/slides/slide23.xml><?xml version="1.0" encoding="utf-8"?>
+<file path=ppt/slides/slide28.xml><?xml version="1.0" encoding="utf-8"?>
 <p:sld xmlns:a="http://schemas.openxmlformats.org/drawingml/2006/main" xmlns:r="http://schemas.openxmlformats.org/officeDocument/2006/relationships" xmlns:p="http://schemas.openxmlformats.org/presentationml/2006/main">
   <p:cSld>
     <p:spTree>
@@ -4529,7 +4949,7 @@
 </p:sld>
 </file>
 
-<file path=ppt/slides/slide24.xml><?xml version="1.0" encoding="utf-8"?>
+<file path=ppt/slides/slide29.xml><?xml version="1.0" encoding="utf-8"?>
 <p:sld xmlns:a="http://schemas.openxmlformats.org/drawingml/2006/main" xmlns:r="http://schemas.openxmlformats.org/officeDocument/2006/relationships" xmlns:p="http://schemas.openxmlformats.org/presentationml/2006/main">
   <p:cSld>
     <p:spTree>
@@ -4565,7 +4985,73 @@
 </p:sld>
 </file>
 
-<file path=ppt/slides/slide25.xml><?xml version="1.0" encoding="utf-8"?>
+<file path=ppt/slides/slide3.xml><?xml version="1.0" encoding="utf-8"?>
+<p:sld xmlns:a="http://schemas.openxmlformats.org/drawingml/2006/main" xmlns:r="http://schemas.openxmlformats.org/officeDocument/2006/relationships" xmlns:p="http://schemas.openxmlformats.org/presentationml/2006/main">
+  <p:cSld>
+    <p:spTree>
+      <p:nvGrpSpPr>
+        <p:cNvPr id="1" name="">
+          <a:extLst>
+            <a:ext uri="{FF2B5EF4-FFF2-40B4-BE49-F238E27FC236}">
+              <a16:creationId xmlns:a16="http://schemas.microsoft.com/office/drawing/2014/main" id="{F4AC0AA2-7E56-A0AB-4A2F-6B8D015C4B8A}"/>
+            </a:ext>
+          </a:extLst>
+        </p:cNvPr>
+        <p:cNvGrpSpPr/>
+        <p:nvPr/>
+      </p:nvGrpSpPr>
+      <p:grpSpPr>
+        <a:xfrm>
+          <a:off x="0" y="0"/>
+          <a:ext cx="0" cy="0"/>
+          <a:chOff x="0" y="0"/>
+          <a:chExt cx="0" cy="0"/>
+        </a:xfrm>
+      </p:grpSpPr>
+      <p:pic>
+        <p:nvPicPr>
+          <p:cNvPr id="4" name="Picture 3">
+            <a:extLst>
+              <a:ext uri="{FF2B5EF4-FFF2-40B4-BE49-F238E27FC236}">
+                <a16:creationId xmlns:a16="http://schemas.microsoft.com/office/drawing/2014/main" id="{A7054FC2-341F-695C-3769-53718D087C25}"/>
+              </a:ext>
+            </a:extLst>
+          </p:cNvPr>
+          <p:cNvPicPr>
+            <a:picLocks noChangeAspect="1"/>
+          </p:cNvPicPr>
+          <p:nvPr/>
+        </p:nvPicPr>
+        <p:blipFill>
+          <a:blip r:embed="rId2"/>
+          <a:stretch>
+            <a:fillRect/>
+          </a:stretch>
+        </p:blipFill>
+        <p:spPr>
+          <a:xfrm>
+            <a:off x="733985" y="0"/>
+            <a:ext cx="10724029" cy="6858000"/>
+          </a:xfrm>
+          <a:prstGeom prst="rect">
+            <a:avLst/>
+          </a:prstGeom>
+        </p:spPr>
+      </p:pic>
+    </p:spTree>
+    <p:extLst>
+      <p:ext uri="{BB962C8B-B14F-4D97-AF65-F5344CB8AC3E}">
+        <p14:creationId xmlns:p14="http://schemas.microsoft.com/office/powerpoint/2010/main" val="277392067"/>
+      </p:ext>
+    </p:extLst>
+  </p:cSld>
+  <p:clrMapOvr>
+    <a:masterClrMapping/>
+  </p:clrMapOvr>
+</p:sld>
+</file>
+
+<file path=ppt/slides/slide30.xml><?xml version="1.0" encoding="utf-8"?>
 <p:sld xmlns:a="http://schemas.openxmlformats.org/drawingml/2006/main" xmlns:r="http://schemas.openxmlformats.org/officeDocument/2006/relationships" xmlns:p="http://schemas.openxmlformats.org/presentationml/2006/main">
   <p:cSld>
     <p:spTree>
@@ -4592,72 +5078,6 @@
     <p:extLst>
       <p:ext uri="{BB962C8B-B14F-4D97-AF65-F5344CB8AC3E}">
         <p14:creationId xmlns:p14="http://schemas.microsoft.com/office/powerpoint/2010/main" val="1087879137"/>
-      </p:ext>
-    </p:extLst>
-  </p:cSld>
-  <p:clrMapOvr>
-    <a:masterClrMapping/>
-  </p:clrMapOvr>
-</p:sld>
-</file>
-
-<file path=ppt/slides/slide3.xml><?xml version="1.0" encoding="utf-8"?>
-<p:sld xmlns:a="http://schemas.openxmlformats.org/drawingml/2006/main" xmlns:r="http://schemas.openxmlformats.org/officeDocument/2006/relationships" xmlns:p="http://schemas.openxmlformats.org/presentationml/2006/main">
-  <p:cSld>
-    <p:spTree>
-      <p:nvGrpSpPr>
-        <p:cNvPr id="1" name="">
-          <a:extLst>
-            <a:ext uri="{FF2B5EF4-FFF2-40B4-BE49-F238E27FC236}">
-              <a16:creationId xmlns:a16="http://schemas.microsoft.com/office/drawing/2014/main" id="{F4AC0AA2-7E56-A0AB-4A2F-6B8D015C4B8A}"/>
-            </a:ext>
-          </a:extLst>
-        </p:cNvPr>
-        <p:cNvGrpSpPr/>
-        <p:nvPr/>
-      </p:nvGrpSpPr>
-      <p:grpSpPr>
-        <a:xfrm>
-          <a:off x="0" y="0"/>
-          <a:ext cx="0" cy="0"/>
-          <a:chOff x="0" y="0"/>
-          <a:chExt cx="0" cy="0"/>
-        </a:xfrm>
-      </p:grpSpPr>
-      <p:pic>
-        <p:nvPicPr>
-          <p:cNvPr id="4" name="Picture 3">
-            <a:extLst>
-              <a:ext uri="{FF2B5EF4-FFF2-40B4-BE49-F238E27FC236}">
-                <a16:creationId xmlns:a16="http://schemas.microsoft.com/office/drawing/2014/main" id="{A7054FC2-341F-695C-3769-53718D087C25}"/>
-              </a:ext>
-            </a:extLst>
-          </p:cNvPr>
-          <p:cNvPicPr>
-            <a:picLocks noChangeAspect="1"/>
-          </p:cNvPicPr>
-          <p:nvPr/>
-        </p:nvPicPr>
-        <p:blipFill>
-          <a:blip r:embed="rId2"/>
-          <a:stretch>
-            <a:fillRect/>
-          </a:stretch>
-        </p:blipFill>
-        <p:spPr>
-          <a:xfrm>
-            <a:off x="733985" y="0"/>
-            <a:ext cx="10724029" cy="6858000"/>
-          </a:xfrm>
-          <a:prstGeom prst="rect">
-            <a:avLst/>
-          </a:prstGeom>
-        </p:spPr>
-      </p:pic>
-    </p:spTree>
-    <p:extLst>
-      <p:ext uri="{BB962C8B-B14F-4D97-AF65-F5344CB8AC3E}">
-        <p14:creationId xmlns:p14="http://schemas.microsoft.com/office/powerpoint/2010/main" val="277392067"/>
       </p:ext>
     </p:extLst>
   </p:cSld>

</xml_diff>

<commit_message>
fix/Pit stops timing and data mining
</commit_message>
<xml_diff>
--- a/Docs/UI Work.pptx
+++ b/Docs/UI Work.pptx
@@ -19,22 +19,23 @@
     <p:sldId id="267" r:id="rId13"/>
     <p:sldId id="268" r:id="rId14"/>
     <p:sldId id="269" r:id="rId15"/>
-    <p:sldId id="270" r:id="rId16"/>
-    <p:sldId id="282" r:id="rId17"/>
-    <p:sldId id="284" r:id="rId18"/>
-    <p:sldId id="283" r:id="rId19"/>
-    <p:sldId id="285" r:id="rId20"/>
-    <p:sldId id="286" r:id="rId21"/>
-    <p:sldId id="271" r:id="rId22"/>
-    <p:sldId id="272" r:id="rId23"/>
-    <p:sldId id="273" r:id="rId24"/>
-    <p:sldId id="274" r:id="rId25"/>
-    <p:sldId id="275" r:id="rId26"/>
-    <p:sldId id="276" r:id="rId27"/>
-    <p:sldId id="277" r:id="rId28"/>
-    <p:sldId id="278" r:id="rId29"/>
-    <p:sldId id="279" r:id="rId30"/>
-    <p:sldId id="280" r:id="rId31"/>
+    <p:sldId id="271" r:id="rId16"/>
+    <p:sldId id="289" r:id="rId17"/>
+    <p:sldId id="287" r:id="rId18"/>
+    <p:sldId id="284" r:id="rId19"/>
+    <p:sldId id="283" r:id="rId20"/>
+    <p:sldId id="285" r:id="rId21"/>
+    <p:sldId id="286" r:id="rId22"/>
+    <p:sldId id="288" r:id="rId23"/>
+    <p:sldId id="272" r:id="rId24"/>
+    <p:sldId id="273" r:id="rId25"/>
+    <p:sldId id="274" r:id="rId26"/>
+    <p:sldId id="275" r:id="rId27"/>
+    <p:sldId id="276" r:id="rId28"/>
+    <p:sldId id="277" r:id="rId29"/>
+    <p:sldId id="278" r:id="rId30"/>
+    <p:sldId id="279" r:id="rId31"/>
+    <p:sldId id="280" r:id="rId32"/>
   </p:sldIdLst>
   <p:sldSz cx="12192000" cy="6858000"/>
   <p:notesSz cx="6858000" cy="9144000"/>
@@ -4158,7 +4159,73 @@
         <p:cNvPr id="1" name="">
           <a:extLst>
             <a:ext uri="{FF2B5EF4-FFF2-40B4-BE49-F238E27FC236}">
-              <a16:creationId xmlns:a16="http://schemas.microsoft.com/office/drawing/2014/main" id="{EEBF4915-19AB-A39D-7AA1-35E9F99E1C96}"/>
+              <a16:creationId xmlns:a16="http://schemas.microsoft.com/office/drawing/2014/main" id="{43C6F10C-A12A-B1A5-758D-05A204FCE0AE}"/>
+            </a:ext>
+          </a:extLst>
+        </p:cNvPr>
+        <p:cNvGrpSpPr/>
+        <p:nvPr/>
+      </p:nvGrpSpPr>
+      <p:grpSpPr>
+        <a:xfrm>
+          <a:off x="0" y="0"/>
+          <a:ext cx="0" cy="0"/>
+          <a:chOff x="0" y="0"/>
+          <a:chExt cx="0" cy="0"/>
+        </a:xfrm>
+      </p:grpSpPr>
+      <p:pic>
+        <p:nvPicPr>
+          <p:cNvPr id="3" name="Picture 2">
+            <a:extLst>
+              <a:ext uri="{FF2B5EF4-FFF2-40B4-BE49-F238E27FC236}">
+                <a16:creationId xmlns:a16="http://schemas.microsoft.com/office/drawing/2014/main" id="{9488D317-B420-5474-5429-269352E154D8}"/>
+              </a:ext>
+            </a:extLst>
+          </p:cNvPr>
+          <p:cNvPicPr>
+            <a:picLocks noChangeAspect="1"/>
+          </p:cNvPicPr>
+          <p:nvPr/>
+        </p:nvPicPr>
+        <p:blipFill>
+          <a:blip r:embed="rId2"/>
+          <a:stretch>
+            <a:fillRect/>
+          </a:stretch>
+        </p:blipFill>
+        <p:spPr>
+          <a:xfrm>
+            <a:off x="70881" y="1485900"/>
+            <a:ext cx="11746447" cy="3788229"/>
+          </a:xfrm>
+          <a:prstGeom prst="rect">
+            <a:avLst/>
+          </a:prstGeom>
+        </p:spPr>
+      </p:pic>
+    </p:spTree>
+    <p:extLst>
+      <p:ext uri="{BB962C8B-B14F-4D97-AF65-F5344CB8AC3E}">
+        <p14:creationId xmlns:p14="http://schemas.microsoft.com/office/powerpoint/2010/main" val="721931620"/>
+      </p:ext>
+    </p:extLst>
+  </p:cSld>
+  <p:clrMapOvr>
+    <a:masterClrMapping/>
+  </p:clrMapOvr>
+</p:sld>
+</file>
+
+<file path=ppt/slides/slide16.xml><?xml version="1.0" encoding="utf-8"?>
+<p:sld xmlns:a="http://schemas.openxmlformats.org/drawingml/2006/main" xmlns:r="http://schemas.openxmlformats.org/officeDocument/2006/relationships" xmlns:p="http://schemas.openxmlformats.org/presentationml/2006/main">
+  <p:cSld>
+    <p:spTree>
+      <p:nvGrpSpPr>
+        <p:cNvPr id="1" name="">
+          <a:extLst>
+            <a:ext uri="{FF2B5EF4-FFF2-40B4-BE49-F238E27FC236}">
+              <a16:creationId xmlns:a16="http://schemas.microsoft.com/office/drawing/2014/main" id="{2707DED9-6E80-D922-8AD2-A0FB7B4F6AA1}"/>
             </a:ext>
           </a:extLst>
         </p:cNvPr>
@@ -4178,7 +4245,7 @@
           <p:cNvPr id="2" name="TextBox 1">
             <a:extLst>
               <a:ext uri="{FF2B5EF4-FFF2-40B4-BE49-F238E27FC236}">
-                <a16:creationId xmlns:a16="http://schemas.microsoft.com/office/drawing/2014/main" id="{830CC778-07BB-FC2D-8599-18550EFEC9D5}"/>
+                <a16:creationId xmlns:a16="http://schemas.microsoft.com/office/drawing/2014/main" id="{7983BC26-E3A5-84FE-7723-30156DCC71F8}"/>
               </a:ext>
             </a:extLst>
           </p:cNvPr>
@@ -4188,7 +4255,7 @@
         <p:spPr>
           <a:xfrm>
             <a:off x="0" y="0"/>
-            <a:ext cx="2907206" cy="523220"/>
+            <a:ext cx="8131650" cy="523220"/>
           </a:xfrm>
           <a:prstGeom prst="rect">
             <a:avLst/>
@@ -4203,20 +4270,53 @@
           <a:p>
             <a:r>
               <a:rPr lang="en-GB" sz="2800" b="1" u="sng" dirty="0"/>
-              <a:t>Lap before </a:t>
+              <a:t>Start of Lap before </a:t>
             </a:r>
             <a:r>
               <a:rPr lang="en-GB" sz="2800" b="1" u="sng" dirty="0" err="1"/>
-              <a:t>InLap</a:t>
-            </a:r>
-            <a:endParaRPr lang="en-GB" sz="2800" b="1" u="sng" dirty="0"/>
+              <a:t>Inlap</a:t>
+            </a:r>
+            <a:r>
+              <a:rPr lang="en-GB" sz="2800" b="1" u="sng" dirty="0"/>
+              <a:t> – first S/F cross in replay</a:t>
+            </a:r>
           </a:p>
         </p:txBody>
       </p:sp>
+      <p:pic>
+        <p:nvPicPr>
+          <p:cNvPr id="4" name="Picture 3">
+            <a:extLst>
+              <a:ext uri="{FF2B5EF4-FFF2-40B4-BE49-F238E27FC236}">
+                <a16:creationId xmlns:a16="http://schemas.microsoft.com/office/drawing/2014/main" id="{2F0C7CC2-7010-866F-1FF3-BD5BBD567785}"/>
+              </a:ext>
+            </a:extLst>
+          </p:cNvPr>
+          <p:cNvPicPr>
+            <a:picLocks noChangeAspect="1"/>
+          </p:cNvPicPr>
+          <p:nvPr/>
+        </p:nvPicPr>
+        <p:blipFill>
+          <a:blip r:embed="rId2"/>
+          <a:stretch>
+            <a:fillRect/>
+          </a:stretch>
+        </p:blipFill>
+        <p:spPr>
+          <a:xfrm>
+            <a:off x="172287" y="661945"/>
+            <a:ext cx="9270514" cy="5800848"/>
+          </a:xfrm>
+          <a:prstGeom prst="rect">
+            <a:avLst/>
+          </a:prstGeom>
+        </p:spPr>
+      </p:pic>
     </p:spTree>
     <p:extLst>
       <p:ext uri="{BB962C8B-B14F-4D97-AF65-F5344CB8AC3E}">
-        <p14:creationId xmlns:p14="http://schemas.microsoft.com/office/powerpoint/2010/main" val="1248257113"/>
+        <p14:creationId xmlns:p14="http://schemas.microsoft.com/office/powerpoint/2010/main" val="578375070"/>
       </p:ext>
     </p:extLst>
   </p:cSld>
@@ -4226,7 +4326,7 @@
 </p:sld>
 </file>
 
-<file path=ppt/slides/slide16.xml><?xml version="1.0" encoding="utf-8"?>
+<file path=ppt/slides/slide17.xml><?xml version="1.0" encoding="utf-8"?>
 <p:sld xmlns:a="http://schemas.openxmlformats.org/drawingml/2006/main" xmlns:r="http://schemas.openxmlformats.org/officeDocument/2006/relationships" xmlns:p="http://schemas.openxmlformats.org/presentationml/2006/main">
   <p:cSld>
     <p:spTree>
@@ -4234,7 +4334,7 @@
         <p:cNvPr id="1" name="">
           <a:extLst>
             <a:ext uri="{FF2B5EF4-FFF2-40B4-BE49-F238E27FC236}">
-              <a16:creationId xmlns:a16="http://schemas.microsoft.com/office/drawing/2014/main" id="{C4BCAFC0-5B20-C004-A59A-D7EAE7438595}"/>
+              <a16:creationId xmlns:a16="http://schemas.microsoft.com/office/drawing/2014/main" id="{C71CC5C7-6493-8638-7D25-EDA6D512B4BF}"/>
             </a:ext>
           </a:extLst>
         </p:cNvPr>
@@ -4254,7 +4354,7 @@
           <p:cNvPr id="2" name="TextBox 1">
             <a:extLst>
               <a:ext uri="{FF2B5EF4-FFF2-40B4-BE49-F238E27FC236}">
-                <a16:creationId xmlns:a16="http://schemas.microsoft.com/office/drawing/2014/main" id="{BEFC1F69-B8FB-2AE9-B5D3-49C8274218AE}"/>
+                <a16:creationId xmlns:a16="http://schemas.microsoft.com/office/drawing/2014/main" id="{A13EA575-2F54-734C-113E-4E79F2975592}"/>
               </a:ext>
             </a:extLst>
           </p:cNvPr>
@@ -4264,7 +4364,7 @@
         <p:spPr>
           <a:xfrm>
             <a:off x="0" y="0"/>
-            <a:ext cx="1874103" cy="523220"/>
+            <a:ext cx="5989909" cy="523220"/>
           </a:xfrm>
           <a:prstGeom prst="rect">
             <a:avLst/>
@@ -4279,20 +4379,53 @@
           <a:p>
             <a:r>
               <a:rPr lang="en-GB" sz="2800" b="1" u="sng" dirty="0"/>
-              <a:t>Raw </a:t>
+              <a:t>Start of </a:t>
             </a:r>
             <a:r>
               <a:rPr lang="en-GB" sz="2800" b="1" u="sng" dirty="0" err="1"/>
-              <a:t>InLap</a:t>
-            </a:r>
-            <a:endParaRPr lang="en-GB" sz="2800" b="1" u="sng" dirty="0"/>
+              <a:t>Inlap</a:t>
+            </a:r>
+            <a:r>
+              <a:rPr lang="en-GB" sz="2800" b="1" u="sng" dirty="0"/>
+              <a:t> (Just crossed S/F Line)</a:t>
+            </a:r>
           </a:p>
         </p:txBody>
       </p:sp>
+      <p:pic>
+        <p:nvPicPr>
+          <p:cNvPr id="7" name="Picture 6">
+            <a:extLst>
+              <a:ext uri="{FF2B5EF4-FFF2-40B4-BE49-F238E27FC236}">
+                <a16:creationId xmlns:a16="http://schemas.microsoft.com/office/drawing/2014/main" id="{65DCFA99-6FDA-0B64-87D7-5F4BA789429B}"/>
+              </a:ext>
+            </a:extLst>
+          </p:cNvPr>
+          <p:cNvPicPr>
+            <a:picLocks noChangeAspect="1"/>
+          </p:cNvPicPr>
+          <p:nvPr/>
+        </p:nvPicPr>
+        <p:blipFill>
+          <a:blip r:embed="rId2"/>
+          <a:stretch>
+            <a:fillRect/>
+          </a:stretch>
+        </p:blipFill>
+        <p:spPr>
+          <a:xfrm>
+            <a:off x="144916" y="651066"/>
+            <a:ext cx="10124060" cy="5858222"/>
+          </a:xfrm>
+          <a:prstGeom prst="rect">
+            <a:avLst/>
+          </a:prstGeom>
+        </p:spPr>
+      </p:pic>
     </p:spTree>
     <p:extLst>
       <p:ext uri="{BB962C8B-B14F-4D97-AF65-F5344CB8AC3E}">
-        <p14:creationId xmlns:p14="http://schemas.microsoft.com/office/powerpoint/2010/main" val="2698483766"/>
+        <p14:creationId xmlns:p14="http://schemas.microsoft.com/office/powerpoint/2010/main" val="4114993816"/>
       </p:ext>
     </p:extLst>
   </p:cSld>
@@ -4302,7 +4435,7 @@
 </p:sld>
 </file>
 
-<file path=ppt/slides/slide17.xml><?xml version="1.0" encoding="utf-8"?>
+<file path=ppt/slides/slide18.xml><?xml version="1.0" encoding="utf-8"?>
 <p:sld xmlns:a="http://schemas.openxmlformats.org/drawingml/2006/main" xmlns:r="http://schemas.openxmlformats.org/officeDocument/2006/relationships" xmlns:p="http://schemas.openxmlformats.org/presentationml/2006/main">
   <p:cSld>
     <p:spTree>
@@ -4360,6 +4493,36 @@
           </a:p>
         </p:txBody>
       </p:sp>
+      <p:pic>
+        <p:nvPicPr>
+          <p:cNvPr id="6" name="Picture 5">
+            <a:extLst>
+              <a:ext uri="{FF2B5EF4-FFF2-40B4-BE49-F238E27FC236}">
+                <a16:creationId xmlns:a16="http://schemas.microsoft.com/office/drawing/2014/main" id="{396C5FD2-4C6B-0DFF-77F4-3CF13BB27561}"/>
+              </a:ext>
+            </a:extLst>
+          </p:cNvPr>
+          <p:cNvPicPr>
+            <a:picLocks noChangeAspect="1"/>
+          </p:cNvPicPr>
+          <p:nvPr/>
+        </p:nvPicPr>
+        <p:blipFill>
+          <a:blip r:embed="rId2"/>
+          <a:stretch>
+            <a:fillRect/>
+          </a:stretch>
+        </p:blipFill>
+        <p:spPr>
+          <a:xfrm>
+            <a:off x="108488" y="689412"/>
+            <a:ext cx="9385952" cy="5897368"/>
+          </a:xfrm>
+          <a:prstGeom prst="rect">
+            <a:avLst/>
+          </a:prstGeom>
+        </p:spPr>
+      </p:pic>
     </p:spTree>
     <p:extLst>
       <p:ext uri="{BB962C8B-B14F-4D97-AF65-F5344CB8AC3E}">
@@ -4373,7 +4536,7 @@
 </p:sld>
 </file>
 
-<file path=ppt/slides/slide18.xml><?xml version="1.0" encoding="utf-8"?>
+<file path=ppt/slides/slide19.xml><?xml version="1.0" encoding="utf-8"?>
 <p:sld xmlns:a="http://schemas.openxmlformats.org/drawingml/2006/main" xmlns:r="http://schemas.openxmlformats.org/officeDocument/2006/relationships" xmlns:p="http://schemas.openxmlformats.org/presentationml/2006/main">
   <p:cSld>
     <p:spTree>
@@ -4411,7 +4574,7 @@
         <p:spPr>
           <a:xfrm>
             <a:off x="0" y="0"/>
-            <a:ext cx="2161041" cy="523220"/>
+            <a:ext cx="5690340" cy="523220"/>
           </a:xfrm>
           <a:prstGeom prst="rect">
             <a:avLst/>
@@ -4426,96 +4589,53 @@
           <a:p>
             <a:r>
               <a:rPr lang="en-GB" sz="2800" b="1" u="sng" dirty="0"/>
-              <a:t>Raw </a:t>
+              <a:t>Start of </a:t>
             </a:r>
             <a:r>
               <a:rPr lang="en-GB" sz="2800" b="1" u="sng" dirty="0" err="1"/>
               <a:t>OutLap</a:t>
             </a:r>
-            <a:endParaRPr lang="en-GB" sz="2800" b="1" u="sng" dirty="0"/>
+            <a:r>
+              <a:rPr lang="en-GB" sz="2800" b="1" u="sng" dirty="0"/>
+              <a:t> just after S/F line</a:t>
+            </a:r>
           </a:p>
         </p:txBody>
       </p:sp>
+      <p:pic>
+        <p:nvPicPr>
+          <p:cNvPr id="6" name="Picture 5">
+            <a:extLst>
+              <a:ext uri="{FF2B5EF4-FFF2-40B4-BE49-F238E27FC236}">
+                <a16:creationId xmlns:a16="http://schemas.microsoft.com/office/drawing/2014/main" id="{FBC30DF7-64B2-1DD9-7AE2-1F4EE916C10B}"/>
+              </a:ext>
+            </a:extLst>
+          </p:cNvPr>
+          <p:cNvPicPr>
+            <a:picLocks noChangeAspect="1"/>
+          </p:cNvPicPr>
+          <p:nvPr/>
+        </p:nvPicPr>
+        <p:blipFill>
+          <a:blip r:embed="rId2"/>
+          <a:stretch>
+            <a:fillRect/>
+          </a:stretch>
+        </p:blipFill>
+        <p:spPr>
+          <a:xfrm>
+            <a:off x="202002" y="690524"/>
+            <a:ext cx="9382475" cy="5927252"/>
+          </a:xfrm>
+          <a:prstGeom prst="rect">
+            <a:avLst/>
+          </a:prstGeom>
+        </p:spPr>
+      </p:pic>
     </p:spTree>
     <p:extLst>
       <p:ext uri="{BB962C8B-B14F-4D97-AF65-F5344CB8AC3E}">
         <p14:creationId xmlns:p14="http://schemas.microsoft.com/office/powerpoint/2010/main" val="3038862163"/>
-      </p:ext>
-    </p:extLst>
-  </p:cSld>
-  <p:clrMapOvr>
-    <a:masterClrMapping/>
-  </p:clrMapOvr>
-</p:sld>
-</file>
-
-<file path=ppt/slides/slide19.xml><?xml version="1.0" encoding="utf-8"?>
-<p:sld xmlns:a="http://schemas.openxmlformats.org/drawingml/2006/main" xmlns:r="http://schemas.openxmlformats.org/officeDocument/2006/relationships" xmlns:p="http://schemas.openxmlformats.org/presentationml/2006/main">
-  <p:cSld>
-    <p:spTree>
-      <p:nvGrpSpPr>
-        <p:cNvPr id="1" name="">
-          <a:extLst>
-            <a:ext uri="{FF2B5EF4-FFF2-40B4-BE49-F238E27FC236}">
-              <a16:creationId xmlns:a16="http://schemas.microsoft.com/office/drawing/2014/main" id="{D3786FF8-9437-2B4A-9D7B-B76C442291F6}"/>
-            </a:ext>
-          </a:extLst>
-        </p:cNvPr>
-        <p:cNvGrpSpPr/>
-        <p:nvPr/>
-      </p:nvGrpSpPr>
-      <p:grpSpPr>
-        <a:xfrm>
-          <a:off x="0" y="0"/>
-          <a:ext cx="0" cy="0"/>
-          <a:chOff x="0" y="0"/>
-          <a:chExt cx="0" cy="0"/>
-        </a:xfrm>
-      </p:grpSpPr>
-      <p:sp>
-        <p:nvSpPr>
-          <p:cNvPr id="2" name="TextBox 1">
-            <a:extLst>
-              <a:ext uri="{FF2B5EF4-FFF2-40B4-BE49-F238E27FC236}">
-                <a16:creationId xmlns:a16="http://schemas.microsoft.com/office/drawing/2014/main" id="{A460A949-39DF-CC9F-8623-8DBB770EF784}"/>
-              </a:ext>
-            </a:extLst>
-          </p:cNvPr>
-          <p:cNvSpPr txBox="1"/>
-          <p:nvPr/>
-        </p:nvSpPr>
-        <p:spPr>
-          <a:xfrm>
-            <a:off x="0" y="0"/>
-            <a:ext cx="2853025" cy="523220"/>
-          </a:xfrm>
-          <a:prstGeom prst="rect">
-            <a:avLst/>
-          </a:prstGeom>
-          <a:noFill/>
-        </p:spPr>
-        <p:txBody>
-          <a:bodyPr wrap="none" rtlCol="0">
-            <a:spAutoFit/>
-          </a:bodyPr>
-          <a:lstStyle/>
-          <a:p>
-            <a:r>
-              <a:rPr lang="en-GB" sz="2800" b="1" u="sng" dirty="0"/>
-              <a:t>Lap After </a:t>
-            </a:r>
-            <a:r>
-              <a:rPr lang="en-GB" sz="2800" b="1" u="sng" dirty="0" err="1"/>
-              <a:t>Outlap</a:t>
-            </a:r>
-            <a:endParaRPr lang="en-GB" sz="2800" b="1" u="sng" dirty="0"/>
-          </a:p>
-        </p:txBody>
-      </p:sp>
-    </p:spTree>
-    <p:extLst>
-      <p:ext uri="{BB962C8B-B14F-4D97-AF65-F5344CB8AC3E}">
-        <p14:creationId xmlns:p14="http://schemas.microsoft.com/office/powerpoint/2010/main" val="1156879548"/>
       </p:ext>
     </p:extLst>
   </p:cSld>
@@ -4593,6 +4713,131 @@
         <p:cNvPr id="1" name="">
           <a:extLst>
             <a:ext uri="{FF2B5EF4-FFF2-40B4-BE49-F238E27FC236}">
+              <a16:creationId xmlns:a16="http://schemas.microsoft.com/office/drawing/2014/main" id="{D3786FF8-9437-2B4A-9D7B-B76C442291F6}"/>
+            </a:ext>
+          </a:extLst>
+        </p:cNvPr>
+        <p:cNvGrpSpPr/>
+        <p:nvPr/>
+      </p:nvGrpSpPr>
+      <p:grpSpPr>
+        <a:xfrm>
+          <a:off x="0" y="0"/>
+          <a:ext cx="0" cy="0"/>
+          <a:chOff x="0" y="0"/>
+          <a:chExt cx="0" cy="0"/>
+        </a:xfrm>
+      </p:grpSpPr>
+      <p:sp>
+        <p:nvSpPr>
+          <p:cNvPr id="2" name="TextBox 1">
+            <a:extLst>
+              <a:ext uri="{FF2B5EF4-FFF2-40B4-BE49-F238E27FC236}">
+                <a16:creationId xmlns:a16="http://schemas.microsoft.com/office/drawing/2014/main" id="{A460A949-39DF-CC9F-8623-8DBB770EF784}"/>
+              </a:ext>
+            </a:extLst>
+          </p:cNvPr>
+          <p:cNvSpPr txBox="1"/>
+          <p:nvPr/>
+        </p:nvSpPr>
+        <p:spPr>
+          <a:xfrm>
+            <a:off x="0" y="0"/>
+            <a:ext cx="11353800" cy="1384995"/>
+          </a:xfrm>
+          <a:prstGeom prst="rect">
+            <a:avLst/>
+          </a:prstGeom>
+          <a:noFill/>
+        </p:spPr>
+        <p:txBody>
+          <a:bodyPr wrap="square" rtlCol="0">
+            <a:spAutoFit/>
+          </a:bodyPr>
+          <a:lstStyle/>
+          <a:p>
+            <a:r>
+              <a:rPr lang="en-GB" sz="2800" b="1" u="sng" dirty="0"/>
+              <a:t>Start of Lap After </a:t>
+            </a:r>
+            <a:r>
+              <a:rPr lang="en-GB" sz="2800" b="1" u="sng" dirty="0" err="1"/>
+              <a:t>Outlap</a:t>
+            </a:r>
+            <a:r>
+              <a:rPr lang="en-GB" sz="2800" b="1" u="sng" dirty="0"/>
+              <a:t> (just after S/F line and </a:t>
+            </a:r>
+            <a:r>
+              <a:rPr lang="en-GB" sz="2800" b="1" u="sng" dirty="0" err="1"/>
+              <a:t>outlap</a:t>
+            </a:r>
+            <a:r>
+              <a:rPr lang="en-GB" sz="2800" b="1" u="sng" dirty="0"/>
+              <a:t> time known) – </a:t>
+            </a:r>
+            <a:r>
+              <a:rPr lang="en-GB" sz="2800" b="1" u="sng" dirty="0">
+                <a:highlight>
+                  <a:srgbClr val="FFFF00"/>
+                </a:highlight>
+              </a:rPr>
+              <a:t>THIS IS WHEN WE WANT THE DATA CAPTURED AND FROZEN UNTIL NEXT EVENT</a:t>
+            </a:r>
+          </a:p>
+        </p:txBody>
+      </p:sp>
+      <p:pic>
+        <p:nvPicPr>
+          <p:cNvPr id="6" name="Picture 5">
+            <a:extLst>
+              <a:ext uri="{FF2B5EF4-FFF2-40B4-BE49-F238E27FC236}">
+                <a16:creationId xmlns:a16="http://schemas.microsoft.com/office/drawing/2014/main" id="{2EBFDDE1-08C7-A251-7FE8-45F2F9859BFD}"/>
+              </a:ext>
+            </a:extLst>
+          </p:cNvPr>
+          <p:cNvPicPr>
+            <a:picLocks noChangeAspect="1"/>
+          </p:cNvPicPr>
+          <p:nvPr/>
+        </p:nvPicPr>
+        <p:blipFill>
+          <a:blip r:embed="rId2"/>
+          <a:stretch>
+            <a:fillRect/>
+          </a:stretch>
+        </p:blipFill>
+        <p:spPr>
+          <a:xfrm>
+            <a:off x="214883" y="1388871"/>
+            <a:ext cx="8290497" cy="5244404"/>
+          </a:xfrm>
+          <a:prstGeom prst="rect">
+            <a:avLst/>
+          </a:prstGeom>
+        </p:spPr>
+      </p:pic>
+    </p:spTree>
+    <p:extLst>
+      <p:ext uri="{BB962C8B-B14F-4D97-AF65-F5344CB8AC3E}">
+        <p14:creationId xmlns:p14="http://schemas.microsoft.com/office/powerpoint/2010/main" val="1156879548"/>
+      </p:ext>
+    </p:extLst>
+  </p:cSld>
+  <p:clrMapOvr>
+    <a:masterClrMapping/>
+  </p:clrMapOvr>
+</p:sld>
+</file>
+
+<file path=ppt/slides/slide21.xml><?xml version="1.0" encoding="utf-8"?>
+<p:sld xmlns:a="http://schemas.openxmlformats.org/drawingml/2006/main" xmlns:r="http://schemas.openxmlformats.org/officeDocument/2006/relationships" xmlns:p="http://schemas.openxmlformats.org/presentationml/2006/main">
+  <p:cSld>
+    <p:spTree>
+      <p:nvGrpSpPr>
+        <p:cNvPr id="1" name="">
+          <a:extLst>
+            <a:ext uri="{FF2B5EF4-FFF2-40B4-BE49-F238E27FC236}">
               <a16:creationId xmlns:a16="http://schemas.microsoft.com/office/drawing/2014/main" id="{D0CAFE3F-C208-E75D-8F56-576EF905A56B}"/>
             </a:ext>
           </a:extLst>
@@ -4623,7 +4868,7 @@
         <p:spPr>
           <a:xfrm>
             <a:off x="0" y="0"/>
-            <a:ext cx="3389774" cy="523220"/>
+            <a:ext cx="11077135" cy="523220"/>
           </a:xfrm>
           <a:prstGeom prst="rect">
             <a:avLst/>
@@ -4644,10 +4889,51 @@
               <a:rPr lang="en-GB" sz="2800" b="1" u="sng" dirty="0" err="1"/>
               <a:t>OutLap</a:t>
             </a:r>
-            <a:endParaRPr lang="en-GB" sz="2800" b="1" u="sng" dirty="0"/>
+            <a:r>
+              <a:rPr lang="en-GB" sz="2800" b="1" u="sng" dirty="0"/>
+              <a:t> (just after S/F line) – 1</a:t>
+            </a:r>
+            <a:r>
+              <a:rPr lang="en-GB" sz="2800" b="1" u="sng" baseline="30000" dirty="0"/>
+              <a:t>st</a:t>
+            </a:r>
+            <a:r>
+              <a:rPr lang="en-GB" sz="2800" b="1" u="sng" dirty="0"/>
+              <a:t> normal lap after pitting.</a:t>
+            </a:r>
           </a:p>
         </p:txBody>
       </p:sp>
+      <p:pic>
+        <p:nvPicPr>
+          <p:cNvPr id="6" name="Picture 5">
+            <a:extLst>
+              <a:ext uri="{FF2B5EF4-FFF2-40B4-BE49-F238E27FC236}">
+                <a16:creationId xmlns:a16="http://schemas.microsoft.com/office/drawing/2014/main" id="{A27AE94F-8060-1DD6-A63C-65C9596D4DBF}"/>
+              </a:ext>
+            </a:extLst>
+          </p:cNvPr>
+          <p:cNvPicPr>
+            <a:picLocks noChangeAspect="1"/>
+          </p:cNvPicPr>
+          <p:nvPr/>
+        </p:nvPicPr>
+        <p:blipFill>
+          <a:blip r:embed="rId2"/>
+          <a:stretch>
+            <a:fillRect/>
+          </a:stretch>
+        </p:blipFill>
+        <p:spPr>
+          <a:xfrm>
+            <a:off x="189787" y="660103"/>
+            <a:ext cx="9131881" cy="5787192"/>
+          </a:xfrm>
+          <a:prstGeom prst="rect">
+            <a:avLst/>
+          </a:prstGeom>
+        </p:spPr>
+      </p:pic>
     </p:spTree>
     <p:extLst>
       <p:ext uri="{BB962C8B-B14F-4D97-AF65-F5344CB8AC3E}">
@@ -4661,7 +4947,7 @@
 </p:sld>
 </file>
 
-<file path=ppt/slides/slide21.xml><?xml version="1.0" encoding="utf-8"?>
+<file path=ppt/slides/slide22.xml><?xml version="1.0" encoding="utf-8"?>
 <p:sld xmlns:a="http://schemas.openxmlformats.org/drawingml/2006/main" xmlns:r="http://schemas.openxmlformats.org/officeDocument/2006/relationships" xmlns:p="http://schemas.openxmlformats.org/presentationml/2006/main">
   <p:cSld>
     <p:spTree>
@@ -4669,7 +4955,7 @@
         <p:cNvPr id="1" name="">
           <a:extLst>
             <a:ext uri="{FF2B5EF4-FFF2-40B4-BE49-F238E27FC236}">
-              <a16:creationId xmlns:a16="http://schemas.microsoft.com/office/drawing/2014/main" id="{43C6F10C-A12A-B1A5-758D-05A204FCE0AE}"/>
+              <a16:creationId xmlns:a16="http://schemas.microsoft.com/office/drawing/2014/main" id="{402CDFA7-7562-3C0A-8003-DFA4087B06C8}"/>
             </a:ext>
           </a:extLst>
         </p:cNvPr>
@@ -4684,10 +4970,91 @@
           <a:chExt cx="0" cy="0"/>
         </a:xfrm>
       </p:grpSpPr>
+      <p:sp>
+        <p:nvSpPr>
+          <p:cNvPr id="2" name="TextBox 1">
+            <a:extLst>
+              <a:ext uri="{FF2B5EF4-FFF2-40B4-BE49-F238E27FC236}">
+                <a16:creationId xmlns:a16="http://schemas.microsoft.com/office/drawing/2014/main" id="{D9D74C5A-51DC-A668-6D7F-A14B317EC4E2}"/>
+              </a:ext>
+            </a:extLst>
+          </p:cNvPr>
+          <p:cNvSpPr txBox="1"/>
+          <p:nvPr/>
+        </p:nvSpPr>
+        <p:spPr>
+          <a:xfrm>
+            <a:off x="0" y="0"/>
+            <a:ext cx="11077135" cy="523220"/>
+          </a:xfrm>
+          <a:prstGeom prst="rect">
+            <a:avLst/>
+          </a:prstGeom>
+          <a:noFill/>
+        </p:spPr>
+        <p:txBody>
+          <a:bodyPr wrap="none" rtlCol="0">
+            <a:spAutoFit/>
+          </a:bodyPr>
+          <a:lstStyle/>
+          <a:p>
+            <a:r>
+              <a:rPr lang="en-GB" sz="2800" b="1" u="sng" dirty="0"/>
+              <a:t>3 Laps After </a:t>
+            </a:r>
+            <a:r>
+              <a:rPr lang="en-GB" sz="2800" b="1" u="sng" dirty="0" err="1"/>
+              <a:t>OutLap</a:t>
+            </a:r>
+            <a:r>
+              <a:rPr lang="en-GB" sz="2800" b="1" u="sng" dirty="0"/>
+              <a:t> (just after S/F line) – 2</a:t>
+            </a:r>
+            <a:r>
+              <a:rPr lang="en-GB" sz="2800" b="1" u="sng" baseline="30000" dirty="0"/>
+              <a:t>st</a:t>
+            </a:r>
+            <a:r>
+              <a:rPr lang="en-GB" sz="2800" b="1" u="sng" dirty="0"/>
+              <a:t> normal lap after pitting.</a:t>
+            </a:r>
+          </a:p>
+        </p:txBody>
+      </p:sp>
+      <p:pic>
+        <p:nvPicPr>
+          <p:cNvPr id="4" name="Picture 3">
+            <a:extLst>
+              <a:ext uri="{FF2B5EF4-FFF2-40B4-BE49-F238E27FC236}">
+                <a16:creationId xmlns:a16="http://schemas.microsoft.com/office/drawing/2014/main" id="{BD91BB67-C668-C70B-8073-F2669978D39B}"/>
+              </a:ext>
+            </a:extLst>
+          </p:cNvPr>
+          <p:cNvPicPr>
+            <a:picLocks noChangeAspect="1"/>
+          </p:cNvPicPr>
+          <p:nvPr/>
+        </p:nvPicPr>
+        <p:blipFill>
+          <a:blip r:embed="rId2"/>
+          <a:stretch>
+            <a:fillRect/>
+          </a:stretch>
+        </p:blipFill>
+        <p:spPr>
+          <a:xfrm>
+            <a:off x="248225" y="675603"/>
+            <a:ext cx="9274181" cy="5849183"/>
+          </a:xfrm>
+          <a:prstGeom prst="rect">
+            <a:avLst/>
+          </a:prstGeom>
+        </p:spPr>
+      </p:pic>
     </p:spTree>
     <p:extLst>
       <p:ext uri="{BB962C8B-B14F-4D97-AF65-F5344CB8AC3E}">
-        <p14:creationId xmlns:p14="http://schemas.microsoft.com/office/powerpoint/2010/main" val="721931620"/>
+        <p14:creationId xmlns:p14="http://schemas.microsoft.com/office/powerpoint/2010/main" val="3492940712"/>
       </p:ext>
     </p:extLst>
   </p:cSld>
@@ -4697,7 +5064,7 @@
 </p:sld>
 </file>
 
-<file path=ppt/slides/slide22.xml><?xml version="1.0" encoding="utf-8"?>
+<file path=ppt/slides/slide23.xml><?xml version="1.0" encoding="utf-8"?>
 <p:sld xmlns:a="http://schemas.openxmlformats.org/drawingml/2006/main" xmlns:r="http://schemas.openxmlformats.org/officeDocument/2006/relationships" xmlns:p="http://schemas.openxmlformats.org/presentationml/2006/main">
   <p:cSld>
     <p:spTree>
@@ -4720,6 +5087,87 @@
           <a:chExt cx="0" cy="0"/>
         </a:xfrm>
       </p:grpSpPr>
+      <p:pic>
+        <p:nvPicPr>
+          <p:cNvPr id="2" name="Picture 1">
+            <a:extLst>
+              <a:ext uri="{FF2B5EF4-FFF2-40B4-BE49-F238E27FC236}">
+                <a16:creationId xmlns:a16="http://schemas.microsoft.com/office/drawing/2014/main" id="{3BCA8FA2-75DC-E8EA-3987-A891BE204D6B}"/>
+              </a:ext>
+            </a:extLst>
+          </p:cNvPr>
+          <p:cNvPicPr>
+            <a:picLocks noChangeAspect="1"/>
+          </p:cNvPicPr>
+          <p:nvPr/>
+        </p:nvPicPr>
+        <p:blipFill>
+          <a:blip r:embed="rId2"/>
+          <a:stretch>
+            <a:fillRect/>
+          </a:stretch>
+        </p:blipFill>
+        <p:spPr>
+          <a:xfrm>
+            <a:off x="1309940" y="670956"/>
+            <a:ext cx="9924525" cy="6187044"/>
+          </a:xfrm>
+          <a:prstGeom prst="rect">
+            <a:avLst/>
+          </a:prstGeom>
+        </p:spPr>
+      </p:pic>
+      <p:sp>
+        <p:nvSpPr>
+          <p:cNvPr id="3" name="TextBox 2">
+            <a:extLst>
+              <a:ext uri="{FF2B5EF4-FFF2-40B4-BE49-F238E27FC236}">
+                <a16:creationId xmlns:a16="http://schemas.microsoft.com/office/drawing/2014/main" id="{B5B0FE8C-56BF-F699-E21B-6A511764742A}"/>
+              </a:ext>
+            </a:extLst>
+          </p:cNvPr>
+          <p:cNvSpPr txBox="1"/>
+          <p:nvPr/>
+        </p:nvSpPr>
+        <p:spPr>
+          <a:xfrm>
+            <a:off x="0" y="0"/>
+            <a:ext cx="8806322" cy="523220"/>
+          </a:xfrm>
+          <a:prstGeom prst="rect">
+            <a:avLst/>
+          </a:prstGeom>
+          <a:noFill/>
+        </p:spPr>
+        <p:txBody>
+          <a:bodyPr wrap="none" rtlCol="0">
+            <a:spAutoFit/>
+          </a:bodyPr>
+          <a:lstStyle/>
+          <a:p>
+            <a:r>
+              <a:rPr lang="en-GB" sz="2800" b="1" u="sng" dirty="0"/>
+              <a:t>Lap After </a:t>
+            </a:r>
+            <a:r>
+              <a:rPr lang="en-GB" sz="2800" b="1" u="sng" dirty="0" err="1"/>
+              <a:t>Outlap</a:t>
+            </a:r>
+            <a:r>
+              <a:rPr lang="en-GB" sz="2800" b="1" u="sng" dirty="0"/>
+              <a:t> (just after S/F line) – </a:t>
+            </a:r>
+            <a:r>
+              <a:rPr lang="en-GB" sz="2800" b="1" u="sng" dirty="0">
+                <a:highlight>
+                  <a:srgbClr val="FFFF00"/>
+                </a:highlight>
+              </a:rPr>
+              <a:t>Pit Box after S/F</a:t>
+            </a:r>
+          </a:p>
+        </p:txBody>
+      </p:sp>
     </p:spTree>
     <p:extLst>
       <p:ext uri="{BB962C8B-B14F-4D97-AF65-F5344CB8AC3E}">
@@ -4733,7 +5181,7 @@
 </p:sld>
 </file>
 
-<file path=ppt/slides/slide23.xml><?xml version="1.0" encoding="utf-8"?>
+<file path=ppt/slides/slide24.xml><?xml version="1.0" encoding="utf-8"?>
 <p:sld xmlns:a="http://schemas.openxmlformats.org/drawingml/2006/main" xmlns:r="http://schemas.openxmlformats.org/officeDocument/2006/relationships" xmlns:p="http://schemas.openxmlformats.org/presentationml/2006/main">
   <p:cSld>
     <p:spTree>
@@ -4756,6 +5204,144 @@
           <a:chExt cx="0" cy="0"/>
         </a:xfrm>
       </p:grpSpPr>
+      <p:pic>
+        <p:nvPicPr>
+          <p:cNvPr id="2" name="Picture 1">
+            <a:extLst>
+              <a:ext uri="{FF2B5EF4-FFF2-40B4-BE49-F238E27FC236}">
+                <a16:creationId xmlns:a16="http://schemas.microsoft.com/office/drawing/2014/main" id="{941ECA30-D55A-9281-E477-241FEFC2F4DD}"/>
+              </a:ext>
+            </a:extLst>
+          </p:cNvPr>
+          <p:cNvPicPr>
+            <a:picLocks noChangeAspect="1"/>
+          </p:cNvPicPr>
+          <p:nvPr/>
+        </p:nvPicPr>
+        <p:blipFill>
+          <a:blip r:embed="rId2"/>
+          <a:stretch>
+            <a:fillRect/>
+          </a:stretch>
+        </p:blipFill>
+        <p:spPr>
+          <a:xfrm>
+            <a:off x="0" y="624372"/>
+            <a:ext cx="6639819" cy="4043019"/>
+          </a:xfrm>
+          <a:prstGeom prst="rect">
+            <a:avLst/>
+          </a:prstGeom>
+        </p:spPr>
+      </p:pic>
+      <p:pic>
+        <p:nvPicPr>
+          <p:cNvPr id="3" name="Picture 2">
+            <a:extLst>
+              <a:ext uri="{FF2B5EF4-FFF2-40B4-BE49-F238E27FC236}">
+                <a16:creationId xmlns:a16="http://schemas.microsoft.com/office/drawing/2014/main" id="{B77739D6-CD7E-33CD-6822-3AE129C0E1E5}"/>
+              </a:ext>
+            </a:extLst>
+          </p:cNvPr>
+          <p:cNvPicPr>
+            <a:picLocks noChangeAspect="1"/>
+          </p:cNvPicPr>
+          <p:nvPr/>
+        </p:nvPicPr>
+        <p:blipFill>
+          <a:blip r:embed="rId3"/>
+          <a:stretch>
+            <a:fillRect/>
+          </a:stretch>
+        </p:blipFill>
+        <p:spPr>
+          <a:xfrm>
+            <a:off x="5552180" y="2597728"/>
+            <a:ext cx="6639820" cy="4139327"/>
+          </a:xfrm>
+          <a:prstGeom prst="rect">
+            <a:avLst/>
+          </a:prstGeom>
+        </p:spPr>
+      </p:pic>
+      <p:sp>
+        <p:nvSpPr>
+          <p:cNvPr id="4" name="TextBox 3">
+            <a:extLst>
+              <a:ext uri="{FF2B5EF4-FFF2-40B4-BE49-F238E27FC236}">
+                <a16:creationId xmlns:a16="http://schemas.microsoft.com/office/drawing/2014/main" id="{4AB3F684-C19E-0133-810A-DADEC90FECB4}"/>
+              </a:ext>
+            </a:extLst>
+          </p:cNvPr>
+          <p:cNvSpPr txBox="1"/>
+          <p:nvPr/>
+        </p:nvSpPr>
+        <p:spPr>
+          <a:xfrm>
+            <a:off x="0" y="0"/>
+            <a:ext cx="3303981" cy="523220"/>
+          </a:xfrm>
+          <a:prstGeom prst="rect">
+            <a:avLst/>
+          </a:prstGeom>
+          <a:noFill/>
+        </p:spPr>
+        <p:txBody>
+          <a:bodyPr wrap="none" rtlCol="0">
+            <a:spAutoFit/>
+          </a:bodyPr>
+          <a:lstStyle/>
+          <a:p>
+            <a:r>
+              <a:rPr lang="en-GB" sz="2800" b="1" u="sng" dirty="0">
+                <a:highlight>
+                  <a:srgbClr val="FFFF00"/>
+                </a:highlight>
+              </a:rPr>
+              <a:t>Pit Box BEFORE S/F</a:t>
+            </a:r>
+          </a:p>
+        </p:txBody>
+      </p:sp>
+      <p:sp>
+        <p:nvSpPr>
+          <p:cNvPr id="5" name="TextBox 4">
+            <a:extLst>
+              <a:ext uri="{FF2B5EF4-FFF2-40B4-BE49-F238E27FC236}">
+                <a16:creationId xmlns:a16="http://schemas.microsoft.com/office/drawing/2014/main" id="{B899CF93-007F-AA20-8445-0DA4ED9F8952}"/>
+              </a:ext>
+            </a:extLst>
+          </p:cNvPr>
+          <p:cNvSpPr txBox="1"/>
+          <p:nvPr/>
+        </p:nvSpPr>
+        <p:spPr>
+          <a:xfrm>
+            <a:off x="9171878" y="1974980"/>
+            <a:ext cx="3020122" cy="523220"/>
+          </a:xfrm>
+          <a:prstGeom prst="rect">
+            <a:avLst/>
+          </a:prstGeom>
+          <a:noFill/>
+        </p:spPr>
+        <p:txBody>
+          <a:bodyPr wrap="none" rtlCol="0">
+            <a:spAutoFit/>
+          </a:bodyPr>
+          <a:lstStyle/>
+          <a:p>
+            <a:r>
+              <a:rPr lang="en-GB" sz="2800" b="1" u="sng" dirty="0">
+                <a:highlight>
+                  <a:srgbClr val="FFFF00"/>
+                </a:highlight>
+              </a:rPr>
+              <a:t>Pit Box AFTER S/F</a:t>
+            </a:r>
+          </a:p>
+        </p:txBody>
+      </p:sp>
     </p:spTree>
     <p:extLst>
       <p:ext uri="{BB962C8B-B14F-4D97-AF65-F5344CB8AC3E}">
@@ -4769,7 +5355,7 @@
 </p:sld>
 </file>
 
-<file path=ppt/slides/slide24.xml><?xml version="1.0" encoding="utf-8"?>
+<file path=ppt/slides/slide25.xml><?xml version="1.0" encoding="utf-8"?>
 <p:sld xmlns:a="http://schemas.openxmlformats.org/drawingml/2006/main" xmlns:r="http://schemas.openxmlformats.org/officeDocument/2006/relationships" xmlns:p="http://schemas.openxmlformats.org/presentationml/2006/main">
   <p:cSld>
     <p:spTree>
@@ -4792,6 +5378,2166 @@
           <a:chExt cx="0" cy="0"/>
         </a:xfrm>
       </p:grpSpPr>
+      <p:graphicFrame>
+        <p:nvGraphicFramePr>
+          <p:cNvPr id="2" name="Table 1">
+            <a:extLst>
+              <a:ext uri="{FF2B5EF4-FFF2-40B4-BE49-F238E27FC236}">
+                <a16:creationId xmlns:a16="http://schemas.microsoft.com/office/drawing/2014/main" id="{FDBA22C4-3E7B-4DBE-11B2-F58A3400F500}"/>
+              </a:ext>
+            </a:extLst>
+          </p:cNvPr>
+          <p:cNvGraphicFramePr>
+            <a:graphicFrameLocks noGrp="1"/>
+          </p:cNvGraphicFramePr>
+          <p:nvPr>
+            <p:extLst>
+              <p:ext uri="{D42A27DB-BD31-4B8C-83A1-F6EECF244321}">
+                <p14:modId xmlns:p14="http://schemas.microsoft.com/office/powerpoint/2010/main" val="1438268141"/>
+              </p:ext>
+            </p:extLst>
+          </p:nvPr>
+        </p:nvGraphicFramePr>
+        <p:xfrm>
+          <a:off x="1959428" y="179614"/>
+          <a:ext cx="9209316" cy="6678381"/>
+        </p:xfrm>
+        <a:graphic>
+          <a:graphicData uri="http://schemas.openxmlformats.org/drawingml/2006/table">
+            <a:tbl>
+              <a:tblPr/>
+              <a:tblGrid>
+                <a:gridCol w="3069772">
+                  <a:extLst>
+                    <a:ext uri="{9D8B030D-6E8A-4147-A177-3AD203B41FA5}">
+                      <a16:colId xmlns:a16="http://schemas.microsoft.com/office/drawing/2014/main" val="2730666903"/>
+                    </a:ext>
+                  </a:extLst>
+                </a:gridCol>
+                <a:gridCol w="3069772">
+                  <a:extLst>
+                    <a:ext uri="{9D8B030D-6E8A-4147-A177-3AD203B41FA5}">
+                      <a16:colId xmlns:a16="http://schemas.microsoft.com/office/drawing/2014/main" val="3335558599"/>
+                    </a:ext>
+                  </a:extLst>
+                </a:gridCol>
+                <a:gridCol w="3069772">
+                  <a:extLst>
+                    <a:ext uri="{9D8B030D-6E8A-4147-A177-3AD203B41FA5}">
+                      <a16:colId xmlns:a16="http://schemas.microsoft.com/office/drawing/2014/main" val="3862510514"/>
+                    </a:ext>
+                  </a:extLst>
+                </a:gridCol>
+              </a:tblGrid>
+              <a:tr h="326912">
+                <a:tc>
+                  <a:txBody>
+                    <a:bodyPr/>
+                    <a:lstStyle/>
+                    <a:p>
+                      <a:pPr>
+                        <a:buNone/>
+                      </a:pPr>
+                      <a:r>
+                        <a:rPr lang="en-GB" sz="600"/>
+                        <a:t>Old property (still supported)</a:t>
+                      </a:r>
+                    </a:p>
+                  </a:txBody>
+                  <a:tcPr marL="30429" marR="30429" marT="15214" marB="15214" anchor="ctr">
+                    <a:lnL>
+                      <a:noFill/>
+                    </a:lnL>
+                    <a:lnR>
+                      <a:noFill/>
+                    </a:lnR>
+                    <a:lnT>
+                      <a:noFill/>
+                    </a:lnT>
+                    <a:lnB>
+                      <a:noFill/>
+                    </a:lnB>
+                    <a:noFill/>
+                  </a:tcPr>
+                </a:tc>
+                <a:tc>
+                  <a:txBody>
+                    <a:bodyPr/>
+                    <a:lstStyle/>
+                    <a:p>
+                      <a:pPr>
+                        <a:buNone/>
+                      </a:pPr>
+                      <a:r>
+                        <a:rPr lang="en-US" sz="600"/>
+                        <a:t>New canonical (use this going forward)</a:t>
+                      </a:r>
+                    </a:p>
+                  </a:txBody>
+                  <a:tcPr marL="30429" marR="30429" marT="15214" marB="15214" anchor="ctr">
+                    <a:lnL>
+                      <a:noFill/>
+                    </a:lnL>
+                    <a:lnR>
+                      <a:noFill/>
+                    </a:lnR>
+                    <a:lnT>
+                      <a:noFill/>
+                    </a:lnT>
+                    <a:lnB>
+                      <a:noFill/>
+                    </a:lnB>
+                    <a:noFill/>
+                  </a:tcPr>
+                </a:tc>
+                <a:tc>
+                  <a:txBody>
+                    <a:bodyPr/>
+                    <a:lstStyle/>
+                    <a:p>
+                      <a:pPr>
+                        <a:buNone/>
+                      </a:pPr>
+                      <a:r>
+                        <a:rPr lang="en-GB" sz="600"/>
+                        <a:t>Notes</a:t>
+                      </a:r>
+                    </a:p>
+                  </a:txBody>
+                  <a:tcPr marL="30429" marR="30429" marT="15214" marB="15214" anchor="ctr">
+                    <a:lnL>
+                      <a:noFill/>
+                    </a:lnL>
+                    <a:lnR>
+                      <a:noFill/>
+                    </a:lnR>
+                    <a:lnT>
+                      <a:noFill/>
+                    </a:lnT>
+                    <a:lnB>
+                      <a:noFill/>
+                    </a:lnB>
+                    <a:noFill/>
+                  </a:tcPr>
+                </a:tc>
+                <a:extLst>
+                  <a:ext uri="{0D108BD9-81ED-4DB2-BD59-A6C34878D82A}">
+                    <a16:rowId xmlns:a16="http://schemas.microsoft.com/office/drawing/2014/main" val="3502610967"/>
+                  </a:ext>
+                </a:extLst>
+              </a:tr>
+              <a:tr h="326912">
+                <a:tc>
+                  <a:txBody>
+                    <a:bodyPr/>
+                    <a:lstStyle/>
+                    <a:p>
+                      <a:pPr>
+                        <a:buNone/>
+                      </a:pPr>
+                      <a:r>
+                        <a:rPr lang="en-GB" sz="600">
+                          <a:latin typeface="Courier New" panose="02070309020205020404" pitchFamily="49" charset="0"/>
+                        </a:rPr>
+                        <a:t>LalaLaunch.Lala.Pit.AvgPaceUsedSec</a:t>
+                      </a:r>
+                      <a:endParaRPr lang="en-GB" sz="600"/>
+                    </a:p>
+                  </a:txBody>
+                  <a:tcPr marL="30429" marR="30429" marT="15214" marB="15214" anchor="ctr">
+                    <a:lnL>
+                      <a:noFill/>
+                    </a:lnL>
+                    <a:lnR>
+                      <a:noFill/>
+                    </a:lnR>
+                    <a:lnT>
+                      <a:noFill/>
+                    </a:lnT>
+                    <a:lnB>
+                      <a:noFill/>
+                    </a:lnB>
+                    <a:noFill/>
+                  </a:tcPr>
+                </a:tc>
+                <a:tc>
+                  <a:txBody>
+                    <a:bodyPr/>
+                    <a:lstStyle/>
+                    <a:p>
+                      <a:pPr>
+                        <a:buNone/>
+                      </a:pPr>
+                      <a:r>
+                        <a:rPr lang="en-GB" sz="600">
+                          <a:latin typeface="Courier New" panose="02070309020205020404" pitchFamily="49" charset="0"/>
+                        </a:rPr>
+                        <a:t>LalaLaunch.Pit.AvgPaceUsedSec</a:t>
+                      </a:r>
+                      <a:endParaRPr lang="en-GB" sz="600"/>
+                    </a:p>
+                  </a:txBody>
+                  <a:tcPr marL="30429" marR="30429" marT="15214" marB="15214" anchor="ctr">
+                    <a:lnL>
+                      <a:noFill/>
+                    </a:lnL>
+                    <a:lnR>
+                      <a:noFill/>
+                    </a:lnR>
+                    <a:lnT>
+                      <a:noFill/>
+                    </a:lnT>
+                    <a:lnB>
+                      <a:noFill/>
+                    </a:lnB>
+                    <a:noFill/>
+                  </a:tcPr>
+                </a:tc>
+                <a:tc>
+                  <a:txBody>
+                    <a:bodyPr/>
+                    <a:lstStyle/>
+                    <a:p>
+                      <a:pPr>
+                        <a:buNone/>
+                      </a:pPr>
+                      <a:r>
+                        <a:rPr lang="en-GB" sz="600"/>
+                        <a:t>Seconds</a:t>
+                      </a:r>
+                    </a:p>
+                  </a:txBody>
+                  <a:tcPr marL="30429" marR="30429" marT="15214" marB="15214" anchor="ctr">
+                    <a:lnL>
+                      <a:noFill/>
+                    </a:lnL>
+                    <a:lnR>
+                      <a:noFill/>
+                    </a:lnR>
+                    <a:lnT>
+                      <a:noFill/>
+                    </a:lnT>
+                    <a:lnB>
+                      <a:noFill/>
+                    </a:lnB>
+                    <a:noFill/>
+                  </a:tcPr>
+                </a:tc>
+                <a:extLst>
+                  <a:ext uri="{0D108BD9-81ED-4DB2-BD59-A6C34878D82A}">
+                    <a16:rowId xmlns:a16="http://schemas.microsoft.com/office/drawing/2014/main" val="3146108172"/>
+                  </a:ext>
+                </a:extLst>
+              </a:tr>
+              <a:tr h="326912">
+                <a:tc>
+                  <a:txBody>
+                    <a:bodyPr/>
+                    <a:lstStyle/>
+                    <a:p>
+                      <a:pPr>
+                        <a:buNone/>
+                      </a:pPr>
+                      <a:r>
+                        <a:rPr lang="en-GB" sz="600">
+                          <a:latin typeface="Courier New" panose="02070309020205020404" pitchFamily="49" charset="0"/>
+                        </a:rPr>
+                        <a:t>LalaLaunch.Lala.Pit.AvgPaceSource</a:t>
+                      </a:r>
+                      <a:endParaRPr lang="en-GB" sz="600"/>
+                    </a:p>
+                  </a:txBody>
+                  <a:tcPr marL="30429" marR="30429" marT="15214" marB="15214" anchor="ctr">
+                    <a:lnL>
+                      <a:noFill/>
+                    </a:lnL>
+                    <a:lnR>
+                      <a:noFill/>
+                    </a:lnR>
+                    <a:lnT>
+                      <a:noFill/>
+                    </a:lnT>
+                    <a:lnB>
+                      <a:noFill/>
+                    </a:lnB>
+                    <a:noFill/>
+                  </a:tcPr>
+                </a:tc>
+                <a:tc>
+                  <a:txBody>
+                    <a:bodyPr/>
+                    <a:lstStyle/>
+                    <a:p>
+                      <a:pPr>
+                        <a:buNone/>
+                      </a:pPr>
+                      <a:r>
+                        <a:rPr lang="en-GB" sz="600">
+                          <a:latin typeface="Courier New" panose="02070309020205020404" pitchFamily="49" charset="0"/>
+                        </a:rPr>
+                        <a:t>LalaLaunch.Pit.AvgPaceSource</a:t>
+                      </a:r>
+                      <a:endParaRPr lang="en-GB" sz="600"/>
+                    </a:p>
+                  </a:txBody>
+                  <a:tcPr marL="30429" marR="30429" marT="15214" marB="15214" anchor="ctr">
+                    <a:lnL>
+                      <a:noFill/>
+                    </a:lnL>
+                    <a:lnR>
+                      <a:noFill/>
+                    </a:lnR>
+                    <a:lnT>
+                      <a:noFill/>
+                    </a:lnT>
+                    <a:lnB>
+                      <a:noFill/>
+                    </a:lnB>
+                    <a:noFill/>
+                  </a:tcPr>
+                </a:tc>
+                <a:tc>
+                  <a:txBody>
+                    <a:bodyPr/>
+                    <a:lstStyle/>
+                    <a:p>
+                      <a:pPr>
+                        <a:buNone/>
+                      </a:pPr>
+                      <a:r>
+                        <a:rPr lang="en-GB" sz="600">
+                          <a:latin typeface="Courier New" panose="02070309020205020404" pitchFamily="49" charset="0"/>
+                        </a:rPr>
+                        <a:t>"profile-avg"</a:t>
+                      </a:r>
+                      <a:r>
+                        <a:rPr lang="en-GB" sz="600"/>
+                        <a:t>, </a:t>
+                      </a:r>
+                      <a:r>
+                        <a:rPr lang="en-GB" sz="600">
+                          <a:latin typeface="Courier New" panose="02070309020205020404" pitchFamily="49" charset="0"/>
+                        </a:rPr>
+                        <a:t>"live-median"</a:t>
+                      </a:r>
+                      <a:r>
+                        <a:rPr lang="en-GB" sz="600"/>
+                        <a:t>, </a:t>
+                      </a:r>
+                      <a:r>
+                        <a:rPr lang="en-GB" sz="600">
+                          <a:latin typeface="Courier New" panose="02070309020205020404" pitchFamily="49" charset="0"/>
+                        </a:rPr>
+                        <a:t>"session-pb"</a:t>
+                      </a:r>
+                      <a:r>
+                        <a:rPr lang="en-GB" sz="600"/>
+                        <a:t>, etc.</a:t>
+                      </a:r>
+                    </a:p>
+                  </a:txBody>
+                  <a:tcPr marL="30429" marR="30429" marT="15214" marB="15214" anchor="ctr">
+                    <a:lnL>
+                      <a:noFill/>
+                    </a:lnL>
+                    <a:lnR>
+                      <a:noFill/>
+                    </a:lnR>
+                    <a:lnT>
+                      <a:noFill/>
+                    </a:lnT>
+                    <a:lnB>
+                      <a:noFill/>
+                    </a:lnB>
+                    <a:noFill/>
+                  </a:tcPr>
+                </a:tc>
+                <a:extLst>
+                  <a:ext uri="{0D108BD9-81ED-4DB2-BD59-A6C34878D82A}">
+                    <a16:rowId xmlns:a16="http://schemas.microsoft.com/office/drawing/2014/main" val="343751056"/>
+                  </a:ext>
+                </a:extLst>
+              </a:tr>
+              <a:tr h="326912">
+                <a:tc>
+                  <a:txBody>
+                    <a:bodyPr/>
+                    <a:lstStyle/>
+                    <a:p>
+                      <a:pPr>
+                        <a:buNone/>
+                      </a:pPr>
+                      <a:r>
+                        <a:rPr lang="en-GB" sz="600">
+                          <a:latin typeface="Courier New" panose="02070309020205020404" pitchFamily="49" charset="0"/>
+                        </a:rPr>
+                        <a:t>LalaLaunch.Lala.Pit.InLapSec</a:t>
+                      </a:r>
+                      <a:endParaRPr lang="en-GB" sz="600"/>
+                    </a:p>
+                  </a:txBody>
+                  <a:tcPr marL="30429" marR="30429" marT="15214" marB="15214" anchor="ctr">
+                    <a:lnL>
+                      <a:noFill/>
+                    </a:lnL>
+                    <a:lnR>
+                      <a:noFill/>
+                    </a:lnR>
+                    <a:lnT>
+                      <a:noFill/>
+                    </a:lnT>
+                    <a:lnB>
+                      <a:noFill/>
+                    </a:lnB>
+                    <a:noFill/>
+                  </a:tcPr>
+                </a:tc>
+                <a:tc>
+                  <a:txBody>
+                    <a:bodyPr/>
+                    <a:lstStyle/>
+                    <a:p>
+                      <a:pPr>
+                        <a:buNone/>
+                      </a:pPr>
+                      <a:r>
+                        <a:rPr lang="en-GB" sz="600">
+                          <a:latin typeface="Courier New" panose="02070309020205020404" pitchFamily="49" charset="0"/>
+                        </a:rPr>
+                        <a:t>LalaLaunch.Pit.InLapSec</a:t>
+                      </a:r>
+                      <a:endParaRPr lang="en-GB" sz="600"/>
+                    </a:p>
+                  </a:txBody>
+                  <a:tcPr marL="30429" marR="30429" marT="15214" marB="15214" anchor="ctr">
+                    <a:lnL>
+                      <a:noFill/>
+                    </a:lnL>
+                    <a:lnR>
+                      <a:noFill/>
+                    </a:lnR>
+                    <a:lnT>
+                      <a:noFill/>
+                    </a:lnT>
+                    <a:lnB>
+                      <a:noFill/>
+                    </a:lnB>
+                    <a:noFill/>
+                  </a:tcPr>
+                </a:tc>
+                <a:tc>
+                  <a:txBody>
+                    <a:bodyPr/>
+                    <a:lstStyle/>
+                    <a:p>
+                      <a:pPr>
+                        <a:buNone/>
+                      </a:pPr>
+                      <a:r>
+                        <a:rPr lang="en-US" sz="600"/>
+                        <a:t>Published at S/F when pit-lap completes</a:t>
+                      </a:r>
+                    </a:p>
+                  </a:txBody>
+                  <a:tcPr marL="30429" marR="30429" marT="15214" marB="15214" anchor="ctr">
+                    <a:lnL>
+                      <a:noFill/>
+                    </a:lnL>
+                    <a:lnR>
+                      <a:noFill/>
+                    </a:lnR>
+                    <a:lnT>
+                      <a:noFill/>
+                    </a:lnT>
+                    <a:lnB>
+                      <a:noFill/>
+                    </a:lnB>
+                    <a:noFill/>
+                  </a:tcPr>
+                </a:tc>
+                <a:extLst>
+                  <a:ext uri="{0D108BD9-81ED-4DB2-BD59-A6C34878D82A}">
+                    <a16:rowId xmlns:a16="http://schemas.microsoft.com/office/drawing/2014/main" val="42629223"/>
+                  </a:ext>
+                </a:extLst>
+              </a:tr>
+              <a:tr h="326912">
+                <a:tc>
+                  <a:txBody>
+                    <a:bodyPr/>
+                    <a:lstStyle/>
+                    <a:p>
+                      <a:pPr>
+                        <a:buNone/>
+                      </a:pPr>
+                      <a:r>
+                        <a:rPr lang="en-GB" sz="600">
+                          <a:latin typeface="Courier New" panose="02070309020205020404" pitchFamily="49" charset="0"/>
+                        </a:rPr>
+                        <a:t>LalaLaunch.Lala.Pit.OutLapSec</a:t>
+                      </a:r>
+                      <a:endParaRPr lang="en-GB" sz="600"/>
+                    </a:p>
+                  </a:txBody>
+                  <a:tcPr marL="30429" marR="30429" marT="15214" marB="15214" anchor="ctr">
+                    <a:lnL>
+                      <a:noFill/>
+                    </a:lnL>
+                    <a:lnR>
+                      <a:noFill/>
+                    </a:lnR>
+                    <a:lnT>
+                      <a:noFill/>
+                    </a:lnT>
+                    <a:lnB>
+                      <a:noFill/>
+                    </a:lnB>
+                    <a:noFill/>
+                  </a:tcPr>
+                </a:tc>
+                <a:tc>
+                  <a:txBody>
+                    <a:bodyPr/>
+                    <a:lstStyle/>
+                    <a:p>
+                      <a:pPr>
+                        <a:buNone/>
+                      </a:pPr>
+                      <a:r>
+                        <a:rPr lang="en-GB" sz="600">
+                          <a:latin typeface="Courier New" panose="02070309020205020404" pitchFamily="49" charset="0"/>
+                        </a:rPr>
+                        <a:t>LalaLaunch.Pit.OutLapSec</a:t>
+                      </a:r>
+                      <a:endParaRPr lang="en-GB" sz="600"/>
+                    </a:p>
+                  </a:txBody>
+                  <a:tcPr marL="30429" marR="30429" marT="15214" marB="15214" anchor="ctr">
+                    <a:lnL>
+                      <a:noFill/>
+                    </a:lnL>
+                    <a:lnR>
+                      <a:noFill/>
+                    </a:lnR>
+                    <a:lnT>
+                      <a:noFill/>
+                    </a:lnT>
+                    <a:lnB>
+                      <a:noFill/>
+                    </a:lnB>
+                    <a:noFill/>
+                  </a:tcPr>
+                </a:tc>
+                <a:tc>
+                  <a:txBody>
+                    <a:bodyPr/>
+                    <a:lstStyle/>
+                    <a:p>
+                      <a:pPr>
+                        <a:buNone/>
+                      </a:pPr>
+                      <a:r>
+                        <a:rPr lang="en-US" sz="600"/>
+                        <a:t>Published at S/F when out-lap completes</a:t>
+                      </a:r>
+                    </a:p>
+                  </a:txBody>
+                  <a:tcPr marL="30429" marR="30429" marT="15214" marB="15214" anchor="ctr">
+                    <a:lnL>
+                      <a:noFill/>
+                    </a:lnL>
+                    <a:lnR>
+                      <a:noFill/>
+                    </a:lnR>
+                    <a:lnT>
+                      <a:noFill/>
+                    </a:lnT>
+                    <a:lnB>
+                      <a:noFill/>
+                    </a:lnB>
+                    <a:noFill/>
+                  </a:tcPr>
+                </a:tc>
+                <a:extLst>
+                  <a:ext uri="{0D108BD9-81ED-4DB2-BD59-A6C34878D82A}">
+                    <a16:rowId xmlns:a16="http://schemas.microsoft.com/office/drawing/2014/main" val="3140584031"/>
+                  </a:ext>
+                </a:extLst>
+              </a:tr>
+              <a:tr h="326912">
+                <a:tc>
+                  <a:txBody>
+                    <a:bodyPr/>
+                    <a:lstStyle/>
+                    <a:p>
+                      <a:pPr>
+                        <a:buNone/>
+                      </a:pPr>
+                      <a:r>
+                        <a:rPr lang="en-GB" sz="600">
+                          <a:latin typeface="Courier New" panose="02070309020205020404" pitchFamily="49" charset="0"/>
+                        </a:rPr>
+                        <a:t>LalaLaunch.Lala.Pit.DeltaInSec</a:t>
+                      </a:r>
+                      <a:endParaRPr lang="en-GB" sz="600"/>
+                    </a:p>
+                  </a:txBody>
+                  <a:tcPr marL="30429" marR="30429" marT="15214" marB="15214" anchor="ctr">
+                    <a:lnL>
+                      <a:noFill/>
+                    </a:lnL>
+                    <a:lnR>
+                      <a:noFill/>
+                    </a:lnR>
+                    <a:lnT>
+                      <a:noFill/>
+                    </a:lnT>
+                    <a:lnB>
+                      <a:noFill/>
+                    </a:lnB>
+                    <a:noFill/>
+                  </a:tcPr>
+                </a:tc>
+                <a:tc>
+                  <a:txBody>
+                    <a:bodyPr/>
+                    <a:lstStyle/>
+                    <a:p>
+                      <a:pPr>
+                        <a:buNone/>
+                      </a:pPr>
+                      <a:r>
+                        <a:rPr lang="en-GB" sz="600">
+                          <a:latin typeface="Courier New" panose="02070309020205020404" pitchFamily="49" charset="0"/>
+                        </a:rPr>
+                        <a:t>LalaLaunch.Pit.DeltaInSec</a:t>
+                      </a:r>
+                      <a:endParaRPr lang="en-GB" sz="600"/>
+                    </a:p>
+                  </a:txBody>
+                  <a:tcPr marL="30429" marR="30429" marT="15214" marB="15214" anchor="ctr">
+                    <a:lnL>
+                      <a:noFill/>
+                    </a:lnL>
+                    <a:lnR>
+                      <a:noFill/>
+                    </a:lnR>
+                    <a:lnT>
+                      <a:noFill/>
+                    </a:lnT>
+                    <a:lnB>
+                      <a:noFill/>
+                    </a:lnB>
+                    <a:noFill/>
+                  </a:tcPr>
+                </a:tc>
+                <a:tc>
+                  <a:txBody>
+                    <a:bodyPr/>
+                    <a:lstStyle/>
+                    <a:p>
+                      <a:pPr>
+                        <a:buNone/>
+                      </a:pPr>
+                      <a:r>
+                        <a:rPr lang="en-GB" sz="600"/>
+                        <a:t>InLap − Avg</a:t>
+                      </a:r>
+                    </a:p>
+                  </a:txBody>
+                  <a:tcPr marL="30429" marR="30429" marT="15214" marB="15214" anchor="ctr">
+                    <a:lnL>
+                      <a:noFill/>
+                    </a:lnL>
+                    <a:lnR>
+                      <a:noFill/>
+                    </a:lnR>
+                    <a:lnT>
+                      <a:noFill/>
+                    </a:lnT>
+                    <a:lnB>
+                      <a:noFill/>
+                    </a:lnB>
+                    <a:noFill/>
+                  </a:tcPr>
+                </a:tc>
+                <a:extLst>
+                  <a:ext uri="{0D108BD9-81ED-4DB2-BD59-A6C34878D82A}">
+                    <a16:rowId xmlns:a16="http://schemas.microsoft.com/office/drawing/2014/main" val="3892119186"/>
+                  </a:ext>
+                </a:extLst>
+              </a:tr>
+              <a:tr h="326912">
+                <a:tc>
+                  <a:txBody>
+                    <a:bodyPr/>
+                    <a:lstStyle/>
+                    <a:p>
+                      <a:pPr>
+                        <a:buNone/>
+                      </a:pPr>
+                      <a:r>
+                        <a:rPr lang="en-GB" sz="600">
+                          <a:latin typeface="Courier New" panose="02070309020205020404" pitchFamily="49" charset="0"/>
+                        </a:rPr>
+                        <a:t>LalaLaunch.Lala.Pit.DeltaOutSec</a:t>
+                      </a:r>
+                      <a:endParaRPr lang="en-GB" sz="600"/>
+                    </a:p>
+                  </a:txBody>
+                  <a:tcPr marL="30429" marR="30429" marT="15214" marB="15214" anchor="ctr">
+                    <a:lnL>
+                      <a:noFill/>
+                    </a:lnL>
+                    <a:lnR>
+                      <a:noFill/>
+                    </a:lnR>
+                    <a:lnT>
+                      <a:noFill/>
+                    </a:lnT>
+                    <a:lnB>
+                      <a:noFill/>
+                    </a:lnB>
+                    <a:noFill/>
+                  </a:tcPr>
+                </a:tc>
+                <a:tc>
+                  <a:txBody>
+                    <a:bodyPr/>
+                    <a:lstStyle/>
+                    <a:p>
+                      <a:pPr>
+                        <a:buNone/>
+                      </a:pPr>
+                      <a:r>
+                        <a:rPr lang="en-GB" sz="600">
+                          <a:latin typeface="Courier New" panose="02070309020205020404" pitchFamily="49" charset="0"/>
+                        </a:rPr>
+                        <a:t>LalaLaunch.Pit.DeltaOutSec</a:t>
+                      </a:r>
+                      <a:endParaRPr lang="en-GB" sz="600"/>
+                    </a:p>
+                  </a:txBody>
+                  <a:tcPr marL="30429" marR="30429" marT="15214" marB="15214" anchor="ctr">
+                    <a:lnL>
+                      <a:noFill/>
+                    </a:lnL>
+                    <a:lnR>
+                      <a:noFill/>
+                    </a:lnR>
+                    <a:lnT>
+                      <a:noFill/>
+                    </a:lnT>
+                    <a:lnB>
+                      <a:noFill/>
+                    </a:lnB>
+                    <a:noFill/>
+                  </a:tcPr>
+                </a:tc>
+                <a:tc>
+                  <a:txBody>
+                    <a:bodyPr/>
+                    <a:lstStyle/>
+                    <a:p>
+                      <a:pPr>
+                        <a:buNone/>
+                      </a:pPr>
+                      <a:r>
+                        <a:rPr lang="en-GB" sz="600"/>
+                        <a:t>OutLap − Avg</a:t>
+                      </a:r>
+                    </a:p>
+                  </a:txBody>
+                  <a:tcPr marL="30429" marR="30429" marT="15214" marB="15214" anchor="ctr">
+                    <a:lnL>
+                      <a:noFill/>
+                    </a:lnL>
+                    <a:lnR>
+                      <a:noFill/>
+                    </a:lnR>
+                    <a:lnT>
+                      <a:noFill/>
+                    </a:lnT>
+                    <a:lnB>
+                      <a:noFill/>
+                    </a:lnB>
+                    <a:noFill/>
+                  </a:tcPr>
+                </a:tc>
+                <a:extLst>
+                  <a:ext uri="{0D108BD9-81ED-4DB2-BD59-A6C34878D82A}">
+                    <a16:rowId xmlns:a16="http://schemas.microsoft.com/office/drawing/2014/main" val="2304092834"/>
+                  </a:ext>
+                </a:extLst>
+              </a:tr>
+              <a:tr h="326912">
+                <a:tc>
+                  <a:txBody>
+                    <a:bodyPr/>
+                    <a:lstStyle/>
+                    <a:p>
+                      <a:pPr>
+                        <a:buNone/>
+                      </a:pPr>
+                      <a:r>
+                        <a:rPr lang="en-GB" sz="600">
+                          <a:latin typeface="Courier New" panose="02070309020205020404" pitchFamily="49" charset="0"/>
+                        </a:rPr>
+                        <a:t>LalaLaunch.Lala.Pit.DirectTravelSec</a:t>
+                      </a:r>
+                      <a:endParaRPr lang="en-GB" sz="600"/>
+                    </a:p>
+                  </a:txBody>
+                  <a:tcPr marL="30429" marR="30429" marT="15214" marB="15214" anchor="ctr">
+                    <a:lnL>
+                      <a:noFill/>
+                    </a:lnL>
+                    <a:lnR>
+                      <a:noFill/>
+                    </a:lnR>
+                    <a:lnT>
+                      <a:noFill/>
+                    </a:lnT>
+                    <a:lnB>
+                      <a:noFill/>
+                    </a:lnB>
+                    <a:noFill/>
+                  </a:tcPr>
+                </a:tc>
+                <a:tc>
+                  <a:txBody>
+                    <a:bodyPr/>
+                    <a:lstStyle/>
+                    <a:p>
+                      <a:pPr>
+                        <a:buNone/>
+                      </a:pPr>
+                      <a:r>
+                        <a:rPr lang="en-GB" sz="600">
+                          <a:latin typeface="Courier New" panose="02070309020205020404" pitchFamily="49" charset="0"/>
+                        </a:rPr>
+                        <a:t>LalaLaunch.Pit.DirectTravelSec</a:t>
+                      </a:r>
+                      <a:endParaRPr lang="en-GB" sz="600"/>
+                    </a:p>
+                  </a:txBody>
+                  <a:tcPr marL="30429" marR="30429" marT="15214" marB="15214" anchor="ctr">
+                    <a:lnL>
+                      <a:noFill/>
+                    </a:lnL>
+                    <a:lnR>
+                      <a:noFill/>
+                    </a:lnR>
+                    <a:lnT>
+                      <a:noFill/>
+                    </a:lnT>
+                    <a:lnB>
+                      <a:noFill/>
+                    </a:lnB>
+                    <a:noFill/>
+                  </a:tcPr>
+                </a:tc>
+                <a:tc>
+                  <a:txBody>
+                    <a:bodyPr/>
+                    <a:lstStyle/>
+                    <a:p>
+                      <a:pPr>
+                        <a:buNone/>
+                      </a:pPr>
+                      <a:r>
+                        <a:rPr lang="en-GB" sz="600"/>
+                        <a:t>Entry→Exit while rolling</a:t>
+                      </a:r>
+                    </a:p>
+                  </a:txBody>
+                  <a:tcPr marL="30429" marR="30429" marT="15214" marB="15214" anchor="ctr">
+                    <a:lnL>
+                      <a:noFill/>
+                    </a:lnL>
+                    <a:lnR>
+                      <a:noFill/>
+                    </a:lnR>
+                    <a:lnT>
+                      <a:noFill/>
+                    </a:lnT>
+                    <a:lnB>
+                      <a:noFill/>
+                    </a:lnB>
+                    <a:noFill/>
+                  </a:tcPr>
+                </a:tc>
+                <a:extLst>
+                  <a:ext uri="{0D108BD9-81ED-4DB2-BD59-A6C34878D82A}">
+                    <a16:rowId xmlns:a16="http://schemas.microsoft.com/office/drawing/2014/main" val="1069049613"/>
+                  </a:ext>
+                </a:extLst>
+              </a:tr>
+              <a:tr h="326912">
+                <a:tc>
+                  <a:txBody>
+                    <a:bodyPr/>
+                    <a:lstStyle/>
+                    <a:p>
+                      <a:pPr>
+                        <a:buNone/>
+                      </a:pPr>
+                      <a:r>
+                        <a:rPr lang="en-GB" sz="600">
+                          <a:latin typeface="Courier New" panose="02070309020205020404" pitchFamily="49" charset="0"/>
+                        </a:rPr>
+                        <a:t>LalaLaunch.Lala.Pit.StopSeconds</a:t>
+                      </a:r>
+                      <a:endParaRPr lang="en-GB" sz="600"/>
+                    </a:p>
+                  </a:txBody>
+                  <a:tcPr marL="30429" marR="30429" marT="15214" marB="15214" anchor="ctr">
+                    <a:lnL>
+                      <a:noFill/>
+                    </a:lnL>
+                    <a:lnR>
+                      <a:noFill/>
+                    </a:lnR>
+                    <a:lnT>
+                      <a:noFill/>
+                    </a:lnT>
+                    <a:lnB>
+                      <a:noFill/>
+                    </a:lnB>
+                    <a:noFill/>
+                  </a:tcPr>
+                </a:tc>
+                <a:tc>
+                  <a:txBody>
+                    <a:bodyPr/>
+                    <a:lstStyle/>
+                    <a:p>
+                      <a:pPr>
+                        <a:buNone/>
+                      </a:pPr>
+                      <a:r>
+                        <a:rPr lang="en-GB" sz="600">
+                          <a:latin typeface="Courier New" panose="02070309020205020404" pitchFamily="49" charset="0"/>
+                        </a:rPr>
+                        <a:t>LalaLaunch.Pit.StopSeconds</a:t>
+                      </a:r>
+                      <a:endParaRPr lang="en-GB" sz="600"/>
+                    </a:p>
+                  </a:txBody>
+                  <a:tcPr marL="30429" marR="30429" marT="15214" marB="15214" anchor="ctr">
+                    <a:lnL>
+                      <a:noFill/>
+                    </a:lnL>
+                    <a:lnR>
+                      <a:noFill/>
+                    </a:lnR>
+                    <a:lnT>
+                      <a:noFill/>
+                    </a:lnT>
+                    <a:lnB>
+                      <a:noFill/>
+                    </a:lnB>
+                    <a:noFill/>
+                  </a:tcPr>
+                </a:tc>
+                <a:tc>
+                  <a:txBody>
+                    <a:bodyPr/>
+                    <a:lstStyle/>
+                    <a:p>
+                      <a:pPr>
+                        <a:buNone/>
+                      </a:pPr>
+                      <a:r>
+                        <a:rPr lang="en-GB" sz="600"/>
+                        <a:t>Stationary box time</a:t>
+                      </a:r>
+                    </a:p>
+                  </a:txBody>
+                  <a:tcPr marL="30429" marR="30429" marT="15214" marB="15214" anchor="ctr">
+                    <a:lnL>
+                      <a:noFill/>
+                    </a:lnL>
+                    <a:lnR>
+                      <a:noFill/>
+                    </a:lnR>
+                    <a:lnT>
+                      <a:noFill/>
+                    </a:lnT>
+                    <a:lnB>
+                      <a:noFill/>
+                    </a:lnB>
+                    <a:noFill/>
+                  </a:tcPr>
+                </a:tc>
+                <a:extLst>
+                  <a:ext uri="{0D108BD9-81ED-4DB2-BD59-A6C34878D82A}">
+                    <a16:rowId xmlns:a16="http://schemas.microsoft.com/office/drawing/2014/main" val="893219200"/>
+                  </a:ext>
+                </a:extLst>
+              </a:tr>
+              <a:tr h="326912">
+                <a:tc>
+                  <a:txBody>
+                    <a:bodyPr/>
+                    <a:lstStyle/>
+                    <a:p>
+                      <a:pPr>
+                        <a:buNone/>
+                      </a:pPr>
+                      <a:r>
+                        <a:rPr lang="en-GB" sz="600">
+                          <a:latin typeface="Courier New" panose="02070309020205020404" pitchFamily="49" charset="0"/>
+                        </a:rPr>
+                        <a:t>LalaLaunch.Lala.Pit.DriveThroughLossSec</a:t>
+                      </a:r>
+                      <a:endParaRPr lang="en-GB" sz="600"/>
+                    </a:p>
+                  </a:txBody>
+                  <a:tcPr marL="30429" marR="30429" marT="15214" marB="15214" anchor="ctr">
+                    <a:lnL>
+                      <a:noFill/>
+                    </a:lnL>
+                    <a:lnR>
+                      <a:noFill/>
+                    </a:lnR>
+                    <a:lnT>
+                      <a:noFill/>
+                    </a:lnT>
+                    <a:lnB>
+                      <a:noFill/>
+                    </a:lnB>
+                    <a:noFill/>
+                  </a:tcPr>
+                </a:tc>
+                <a:tc>
+                  <a:txBody>
+                    <a:bodyPr/>
+                    <a:lstStyle/>
+                    <a:p>
+                      <a:pPr>
+                        <a:buNone/>
+                      </a:pPr>
+                      <a:r>
+                        <a:rPr lang="en-GB" sz="600">
+                          <a:latin typeface="Courier New" panose="02070309020205020404" pitchFamily="49" charset="0"/>
+                        </a:rPr>
+                        <a:t>LalaLaunch.Pit.DriveThroughLossSec</a:t>
+                      </a:r>
+                      <a:endParaRPr lang="en-GB" sz="600"/>
+                    </a:p>
+                  </a:txBody>
+                  <a:tcPr marL="30429" marR="30429" marT="15214" marB="15214" anchor="ctr">
+                    <a:lnL>
+                      <a:noFill/>
+                    </a:lnL>
+                    <a:lnR>
+                      <a:noFill/>
+                    </a:lnR>
+                    <a:lnT>
+                      <a:noFill/>
+                    </a:lnT>
+                    <a:lnB>
+                      <a:noFill/>
+                    </a:lnB>
+                    <a:noFill/>
+                  </a:tcPr>
+                </a:tc>
+                <a:tc>
+                  <a:txBody>
+                    <a:bodyPr/>
+                    <a:lstStyle/>
+                    <a:p>
+                      <a:pPr>
+                        <a:buNone/>
+                      </a:pPr>
+                      <a:r>
+                        <a:rPr lang="en-GB" sz="600" b="1"/>
+                        <a:t>DTL</a:t>
+                      </a:r>
+                      <a:r>
+                        <a:rPr lang="en-GB" sz="600"/>
+                        <a:t> saved to profile</a:t>
+                      </a:r>
+                    </a:p>
+                  </a:txBody>
+                  <a:tcPr marL="30429" marR="30429" marT="15214" marB="15214" anchor="ctr">
+                    <a:lnL>
+                      <a:noFill/>
+                    </a:lnL>
+                    <a:lnR>
+                      <a:noFill/>
+                    </a:lnR>
+                    <a:lnT>
+                      <a:noFill/>
+                    </a:lnT>
+                    <a:lnB>
+                      <a:noFill/>
+                    </a:lnB>
+                    <a:noFill/>
+                  </a:tcPr>
+                </a:tc>
+                <a:extLst>
+                  <a:ext uri="{0D108BD9-81ED-4DB2-BD59-A6C34878D82A}">
+                    <a16:rowId xmlns:a16="http://schemas.microsoft.com/office/drawing/2014/main" val="844023288"/>
+                  </a:ext>
+                </a:extLst>
+              </a:tr>
+              <a:tr h="326912">
+                <a:tc>
+                  <a:txBody>
+                    <a:bodyPr/>
+                    <a:lstStyle/>
+                    <a:p>
+                      <a:pPr>
+                        <a:buNone/>
+                      </a:pPr>
+                      <a:r>
+                        <a:rPr lang="en-GB" sz="600">
+                          <a:latin typeface="Courier New" panose="02070309020205020404" pitchFamily="49" charset="0"/>
+                        </a:rPr>
+                        <a:t>LalaLaunch.Lala.Pit.ServiceStopLossSec</a:t>
+                      </a:r>
+                      <a:endParaRPr lang="en-GB" sz="600"/>
+                    </a:p>
+                  </a:txBody>
+                  <a:tcPr marL="30429" marR="30429" marT="15214" marB="15214" anchor="ctr">
+                    <a:lnL>
+                      <a:noFill/>
+                    </a:lnL>
+                    <a:lnR>
+                      <a:noFill/>
+                    </a:lnR>
+                    <a:lnT>
+                      <a:noFill/>
+                    </a:lnT>
+                    <a:lnB>
+                      <a:noFill/>
+                    </a:lnB>
+                    <a:noFill/>
+                  </a:tcPr>
+                </a:tc>
+                <a:tc>
+                  <a:txBody>
+                    <a:bodyPr/>
+                    <a:lstStyle/>
+                    <a:p>
+                      <a:pPr>
+                        <a:buNone/>
+                      </a:pPr>
+                      <a:r>
+                        <a:rPr lang="en-GB" sz="600">
+                          <a:latin typeface="Courier New" panose="02070309020205020404" pitchFamily="49" charset="0"/>
+                        </a:rPr>
+                        <a:t>LalaLaunch.Pit.ServiceStopLossSec</a:t>
+                      </a:r>
+                      <a:endParaRPr lang="en-GB" sz="600"/>
+                    </a:p>
+                  </a:txBody>
+                  <a:tcPr marL="30429" marR="30429" marT="15214" marB="15214" anchor="ctr">
+                    <a:lnL>
+                      <a:noFill/>
+                    </a:lnL>
+                    <a:lnR>
+                      <a:noFill/>
+                    </a:lnR>
+                    <a:lnT>
+                      <a:noFill/>
+                    </a:lnT>
+                    <a:lnB>
+                      <a:noFill/>
+                    </a:lnB>
+                    <a:noFill/>
+                  </a:tcPr>
+                </a:tc>
+                <a:tc>
+                  <a:txBody>
+                    <a:bodyPr/>
+                    <a:lstStyle/>
+                    <a:p>
+                      <a:pPr>
+                        <a:buNone/>
+                      </a:pPr>
+                      <a:r>
+                        <a:rPr lang="en-GB" sz="600"/>
+                        <a:t>DTL + Stop (gap estimate)</a:t>
+                      </a:r>
+                    </a:p>
+                  </a:txBody>
+                  <a:tcPr marL="30429" marR="30429" marT="15214" marB="15214" anchor="ctr">
+                    <a:lnL>
+                      <a:noFill/>
+                    </a:lnL>
+                    <a:lnR>
+                      <a:noFill/>
+                    </a:lnR>
+                    <a:lnT>
+                      <a:noFill/>
+                    </a:lnT>
+                    <a:lnB>
+                      <a:noFill/>
+                    </a:lnB>
+                    <a:noFill/>
+                  </a:tcPr>
+                </a:tc>
+                <a:extLst>
+                  <a:ext uri="{0D108BD9-81ED-4DB2-BD59-A6C34878D82A}">
+                    <a16:rowId xmlns:a16="http://schemas.microsoft.com/office/drawing/2014/main" val="1458213427"/>
+                  </a:ext>
+                </a:extLst>
+              </a:tr>
+              <a:tr h="326912">
+                <a:tc>
+                  <a:txBody>
+                    <a:bodyPr/>
+                    <a:lstStyle/>
+                    <a:p>
+                      <a:pPr>
+                        <a:buNone/>
+                      </a:pPr>
+                      <a:r>
+                        <a:rPr lang="en-GB" sz="600">
+                          <a:latin typeface="Courier New" panose="02070309020205020404" pitchFamily="49" charset="0"/>
+                        </a:rPr>
+                        <a:t>LalaLaunch.Lala.Pit.Profile.PitLaneLossSec</a:t>
+                      </a:r>
+                      <a:endParaRPr lang="en-GB" sz="600"/>
+                    </a:p>
+                  </a:txBody>
+                  <a:tcPr marL="30429" marR="30429" marT="15214" marB="15214" anchor="ctr">
+                    <a:lnL>
+                      <a:noFill/>
+                    </a:lnL>
+                    <a:lnR>
+                      <a:noFill/>
+                    </a:lnR>
+                    <a:lnT>
+                      <a:noFill/>
+                    </a:lnT>
+                    <a:lnB>
+                      <a:noFill/>
+                    </a:lnB>
+                    <a:noFill/>
+                  </a:tcPr>
+                </a:tc>
+                <a:tc>
+                  <a:txBody>
+                    <a:bodyPr/>
+                    <a:lstStyle/>
+                    <a:p>
+                      <a:pPr>
+                        <a:buNone/>
+                      </a:pPr>
+                      <a:r>
+                        <a:rPr lang="en-GB" sz="600">
+                          <a:latin typeface="Courier New" panose="02070309020205020404" pitchFamily="49" charset="0"/>
+                        </a:rPr>
+                        <a:t>LalaLaunch.Pit.Profile.PitLaneLossSec</a:t>
+                      </a:r>
+                      <a:endParaRPr lang="en-GB" sz="600"/>
+                    </a:p>
+                  </a:txBody>
+                  <a:tcPr marL="30429" marR="30429" marT="15214" marB="15214" anchor="ctr">
+                    <a:lnL>
+                      <a:noFill/>
+                    </a:lnL>
+                    <a:lnR>
+                      <a:noFill/>
+                    </a:lnR>
+                    <a:lnT>
+                      <a:noFill/>
+                    </a:lnT>
+                    <a:lnB>
+                      <a:noFill/>
+                    </a:lnB>
+                    <a:noFill/>
+                  </a:tcPr>
+                </a:tc>
+                <a:tc>
+                  <a:txBody>
+                    <a:bodyPr/>
+                    <a:lstStyle/>
+                    <a:p>
+                      <a:pPr>
+                        <a:buNone/>
+                      </a:pPr>
+                      <a:r>
+                        <a:rPr lang="en-GB" sz="600"/>
+                        <a:t>From profile JSON</a:t>
+                      </a:r>
+                    </a:p>
+                  </a:txBody>
+                  <a:tcPr marL="30429" marR="30429" marT="15214" marB="15214" anchor="ctr">
+                    <a:lnL>
+                      <a:noFill/>
+                    </a:lnL>
+                    <a:lnR>
+                      <a:noFill/>
+                    </a:lnR>
+                    <a:lnT>
+                      <a:noFill/>
+                    </a:lnT>
+                    <a:lnB>
+                      <a:noFill/>
+                    </a:lnB>
+                    <a:noFill/>
+                  </a:tcPr>
+                </a:tc>
+                <a:extLst>
+                  <a:ext uri="{0D108BD9-81ED-4DB2-BD59-A6C34878D82A}">
+                    <a16:rowId xmlns:a16="http://schemas.microsoft.com/office/drawing/2014/main" val="3011418365"/>
+                  </a:ext>
+                </a:extLst>
+              </a:tr>
+              <a:tr h="326912">
+                <a:tc>
+                  <a:txBody>
+                    <a:bodyPr/>
+                    <a:lstStyle/>
+                    <a:p>
+                      <a:pPr>
+                        <a:buNone/>
+                      </a:pPr>
+                      <a:r>
+                        <a:rPr lang="en-GB" sz="600">
+                          <a:latin typeface="Courier New" panose="02070309020205020404" pitchFamily="49" charset="0"/>
+                        </a:rPr>
+                        <a:t>LalaLaunch.Lala.Pit.LastSavedValueSec</a:t>
+                      </a:r>
+                      <a:endParaRPr lang="en-GB" sz="600"/>
+                    </a:p>
+                  </a:txBody>
+                  <a:tcPr marL="30429" marR="30429" marT="15214" marB="15214" anchor="ctr">
+                    <a:lnL>
+                      <a:noFill/>
+                    </a:lnL>
+                    <a:lnR>
+                      <a:noFill/>
+                    </a:lnR>
+                    <a:lnT>
+                      <a:noFill/>
+                    </a:lnT>
+                    <a:lnB>
+                      <a:noFill/>
+                    </a:lnB>
+                    <a:noFill/>
+                  </a:tcPr>
+                </a:tc>
+                <a:tc>
+                  <a:txBody>
+                    <a:bodyPr/>
+                    <a:lstStyle/>
+                    <a:p>
+                      <a:pPr>
+                        <a:buNone/>
+                      </a:pPr>
+                      <a:r>
+                        <a:rPr lang="en-GB" sz="600">
+                          <a:latin typeface="Courier New" panose="02070309020205020404" pitchFamily="49" charset="0"/>
+                        </a:rPr>
+                        <a:t>LalaLaunch.Pit.LastSavedValueSec</a:t>
+                      </a:r>
+                      <a:endParaRPr lang="en-GB" sz="600"/>
+                    </a:p>
+                  </a:txBody>
+                  <a:tcPr marL="30429" marR="30429" marT="15214" marB="15214" anchor="ctr">
+                    <a:lnL>
+                      <a:noFill/>
+                    </a:lnL>
+                    <a:lnR>
+                      <a:noFill/>
+                    </a:lnR>
+                    <a:lnT>
+                      <a:noFill/>
+                    </a:lnT>
+                    <a:lnB>
+                      <a:noFill/>
+                    </a:lnB>
+                    <a:noFill/>
+                  </a:tcPr>
+                </a:tc>
+                <a:tc>
+                  <a:txBody>
+                    <a:bodyPr/>
+                    <a:lstStyle/>
+                    <a:p>
+                      <a:pPr>
+                        <a:buNone/>
+                      </a:pPr>
+                      <a:r>
+                        <a:rPr lang="en-GB" sz="600"/>
+                        <a:t>Latest persisted value</a:t>
+                      </a:r>
+                    </a:p>
+                  </a:txBody>
+                  <a:tcPr marL="30429" marR="30429" marT="15214" marB="15214" anchor="ctr">
+                    <a:lnL>
+                      <a:noFill/>
+                    </a:lnL>
+                    <a:lnR>
+                      <a:noFill/>
+                    </a:lnR>
+                    <a:lnT>
+                      <a:noFill/>
+                    </a:lnT>
+                    <a:lnB>
+                      <a:noFill/>
+                    </a:lnB>
+                    <a:noFill/>
+                  </a:tcPr>
+                </a:tc>
+                <a:extLst>
+                  <a:ext uri="{0D108BD9-81ED-4DB2-BD59-A6C34878D82A}">
+                    <a16:rowId xmlns:a16="http://schemas.microsoft.com/office/drawing/2014/main" val="367012711"/>
+                  </a:ext>
+                </a:extLst>
+              </a:tr>
+              <a:tr h="326912">
+                <a:tc>
+                  <a:txBody>
+                    <a:bodyPr/>
+                    <a:lstStyle/>
+                    <a:p>
+                      <a:pPr>
+                        <a:buNone/>
+                      </a:pPr>
+                      <a:r>
+                        <a:rPr lang="en-GB" sz="600">
+                          <a:latin typeface="Courier New" panose="02070309020205020404" pitchFamily="49" charset="0"/>
+                        </a:rPr>
+                        <a:t>LalaLaunch.Lala.Pit.LastSavedSource</a:t>
+                      </a:r>
+                      <a:endParaRPr lang="en-GB" sz="600"/>
+                    </a:p>
+                  </a:txBody>
+                  <a:tcPr marL="30429" marR="30429" marT="15214" marB="15214" anchor="ctr">
+                    <a:lnL>
+                      <a:noFill/>
+                    </a:lnL>
+                    <a:lnR>
+                      <a:noFill/>
+                    </a:lnR>
+                    <a:lnT>
+                      <a:noFill/>
+                    </a:lnT>
+                    <a:lnB>
+                      <a:noFill/>
+                    </a:lnB>
+                    <a:noFill/>
+                  </a:tcPr>
+                </a:tc>
+                <a:tc>
+                  <a:txBody>
+                    <a:bodyPr/>
+                    <a:lstStyle/>
+                    <a:p>
+                      <a:pPr>
+                        <a:buNone/>
+                      </a:pPr>
+                      <a:r>
+                        <a:rPr lang="en-GB" sz="600">
+                          <a:latin typeface="Courier New" panose="02070309020205020404" pitchFamily="49" charset="0"/>
+                        </a:rPr>
+                        <a:t>LalaLaunch.Pit.LastSavedSource</a:t>
+                      </a:r>
+                      <a:endParaRPr lang="en-GB" sz="600"/>
+                    </a:p>
+                  </a:txBody>
+                  <a:tcPr marL="30429" marR="30429" marT="15214" marB="15214" anchor="ctr">
+                    <a:lnL>
+                      <a:noFill/>
+                    </a:lnL>
+                    <a:lnR>
+                      <a:noFill/>
+                    </a:lnR>
+                    <a:lnT>
+                      <a:noFill/>
+                    </a:lnT>
+                    <a:lnB>
+                      <a:noFill/>
+                    </a:lnB>
+                    <a:noFill/>
+                  </a:tcPr>
+                </a:tc>
+                <a:tc>
+                  <a:txBody>
+                    <a:bodyPr/>
+                    <a:lstStyle/>
+                    <a:p>
+                      <a:pPr>
+                        <a:buNone/>
+                      </a:pPr>
+                      <a:r>
+                        <a:rPr lang="en-GB" sz="600">
+                          <a:latin typeface="Courier New" panose="02070309020205020404" pitchFamily="49" charset="0"/>
+                        </a:rPr>
+                        <a:t>"total"</a:t>
+                      </a:r>
+                      <a:r>
+                        <a:rPr lang="en-GB" sz="600"/>
+                        <a:t> or </a:t>
+                      </a:r>
+                      <a:r>
+                        <a:rPr lang="en-GB" sz="600">
+                          <a:latin typeface="Courier New" panose="02070309020205020404" pitchFamily="49" charset="0"/>
+                        </a:rPr>
+                        <a:t>"direct"</a:t>
+                      </a:r>
+                      <a:endParaRPr lang="en-GB" sz="600"/>
+                    </a:p>
+                  </a:txBody>
+                  <a:tcPr marL="30429" marR="30429" marT="15214" marB="15214" anchor="ctr">
+                    <a:lnL>
+                      <a:noFill/>
+                    </a:lnL>
+                    <a:lnR>
+                      <a:noFill/>
+                    </a:lnR>
+                    <a:lnT>
+                      <a:noFill/>
+                    </a:lnT>
+                    <a:lnB>
+                      <a:noFill/>
+                    </a:lnB>
+                    <a:noFill/>
+                  </a:tcPr>
+                </a:tc>
+                <a:extLst>
+                  <a:ext uri="{0D108BD9-81ED-4DB2-BD59-A6C34878D82A}">
+                    <a16:rowId xmlns:a16="http://schemas.microsoft.com/office/drawing/2014/main" val="752032359"/>
+                  </a:ext>
+                </a:extLst>
+              </a:tr>
+              <a:tr h="326912">
+                <a:tc>
+                  <a:txBody>
+                    <a:bodyPr/>
+                    <a:lstStyle/>
+                    <a:p>
+                      <a:pPr>
+                        <a:buNone/>
+                      </a:pPr>
+                      <a:r>
+                        <a:rPr lang="en-GB" sz="600">
+                          <a:latin typeface="Courier New" panose="02070309020205020404" pitchFamily="49" charset="0"/>
+                        </a:rPr>
+                        <a:t>LalaLaunch.Lala.Pit.CandidateSavedSec</a:t>
+                      </a:r>
+                      <a:endParaRPr lang="en-GB" sz="600"/>
+                    </a:p>
+                  </a:txBody>
+                  <a:tcPr marL="30429" marR="30429" marT="15214" marB="15214" anchor="ctr">
+                    <a:lnL>
+                      <a:noFill/>
+                    </a:lnL>
+                    <a:lnR>
+                      <a:noFill/>
+                    </a:lnR>
+                    <a:lnT>
+                      <a:noFill/>
+                    </a:lnT>
+                    <a:lnB>
+                      <a:noFill/>
+                    </a:lnB>
+                    <a:noFill/>
+                  </a:tcPr>
+                </a:tc>
+                <a:tc>
+                  <a:txBody>
+                    <a:bodyPr/>
+                    <a:lstStyle/>
+                    <a:p>
+                      <a:pPr>
+                        <a:buNone/>
+                      </a:pPr>
+                      <a:r>
+                        <a:rPr lang="en-GB" sz="600">
+                          <a:latin typeface="Courier New" panose="02070309020205020404" pitchFamily="49" charset="0"/>
+                        </a:rPr>
+                        <a:t>LalaLaunch.Pit.CandidateSavedSec</a:t>
+                      </a:r>
+                      <a:endParaRPr lang="en-GB" sz="600"/>
+                    </a:p>
+                  </a:txBody>
+                  <a:tcPr marL="30429" marR="30429" marT="15214" marB="15214" anchor="ctr">
+                    <a:lnL>
+                      <a:noFill/>
+                    </a:lnL>
+                    <a:lnR>
+                      <a:noFill/>
+                    </a:lnR>
+                    <a:lnT>
+                      <a:noFill/>
+                    </a:lnT>
+                    <a:lnB>
+                      <a:noFill/>
+                    </a:lnB>
+                    <a:noFill/>
+                  </a:tcPr>
+                </a:tc>
+                <a:tc>
+                  <a:txBody>
+                    <a:bodyPr/>
+                    <a:lstStyle/>
+                    <a:p>
+                      <a:pPr>
+                        <a:buNone/>
+                      </a:pPr>
+                      <a:r>
+                        <a:rPr lang="en-GB" sz="600"/>
+                        <a:t>When we introduce candidate-apply</a:t>
+                      </a:r>
+                    </a:p>
+                  </a:txBody>
+                  <a:tcPr marL="30429" marR="30429" marT="15214" marB="15214" anchor="ctr">
+                    <a:lnL>
+                      <a:noFill/>
+                    </a:lnL>
+                    <a:lnR>
+                      <a:noFill/>
+                    </a:lnR>
+                    <a:lnT>
+                      <a:noFill/>
+                    </a:lnT>
+                    <a:lnB>
+                      <a:noFill/>
+                    </a:lnB>
+                    <a:noFill/>
+                  </a:tcPr>
+                </a:tc>
+                <a:extLst>
+                  <a:ext uri="{0D108BD9-81ED-4DB2-BD59-A6C34878D82A}">
+                    <a16:rowId xmlns:a16="http://schemas.microsoft.com/office/drawing/2014/main" val="1536951079"/>
+                  </a:ext>
+                </a:extLst>
+              </a:tr>
+              <a:tr h="326912">
+                <a:tc>
+                  <a:txBody>
+                    <a:bodyPr/>
+                    <a:lstStyle/>
+                    <a:p>
+                      <a:pPr>
+                        <a:buNone/>
+                      </a:pPr>
+                      <a:r>
+                        <a:rPr lang="en-GB" sz="600">
+                          <a:latin typeface="Courier New" panose="02070309020205020404" pitchFamily="49" charset="0"/>
+                        </a:rPr>
+                        <a:t>LalaLaunch.Lala.Pit.CandidateSource</a:t>
+                      </a:r>
+                      <a:endParaRPr lang="en-GB" sz="600"/>
+                    </a:p>
+                  </a:txBody>
+                  <a:tcPr marL="30429" marR="30429" marT="15214" marB="15214" anchor="ctr">
+                    <a:lnL>
+                      <a:noFill/>
+                    </a:lnL>
+                    <a:lnR>
+                      <a:noFill/>
+                    </a:lnR>
+                    <a:lnT>
+                      <a:noFill/>
+                    </a:lnT>
+                    <a:lnB>
+                      <a:noFill/>
+                    </a:lnB>
+                    <a:noFill/>
+                  </a:tcPr>
+                </a:tc>
+                <a:tc>
+                  <a:txBody>
+                    <a:bodyPr/>
+                    <a:lstStyle/>
+                    <a:p>
+                      <a:pPr>
+                        <a:buNone/>
+                      </a:pPr>
+                      <a:r>
+                        <a:rPr lang="en-GB" sz="600">
+                          <a:latin typeface="Courier New" panose="02070309020205020404" pitchFamily="49" charset="0"/>
+                        </a:rPr>
+                        <a:t>LalaLaunch.Pit.CandidateSource</a:t>
+                      </a:r>
+                      <a:endParaRPr lang="en-GB" sz="600"/>
+                    </a:p>
+                  </a:txBody>
+                  <a:tcPr marL="30429" marR="30429" marT="15214" marB="15214" anchor="ctr">
+                    <a:lnL>
+                      <a:noFill/>
+                    </a:lnL>
+                    <a:lnR>
+                      <a:noFill/>
+                    </a:lnR>
+                    <a:lnT>
+                      <a:noFill/>
+                    </a:lnT>
+                    <a:lnB>
+                      <a:noFill/>
+                    </a:lnB>
+                    <a:noFill/>
+                  </a:tcPr>
+                </a:tc>
+                <a:tc>
+                  <a:txBody>
+                    <a:bodyPr/>
+                    <a:lstStyle/>
+                    <a:p>
+                      <a:pPr>
+                        <a:buNone/>
+                      </a:pPr>
+                      <a:r>
+                        <a:rPr lang="en-GB" sz="600"/>
+                        <a:t>〃</a:t>
+                      </a:r>
+                    </a:p>
+                  </a:txBody>
+                  <a:tcPr marL="30429" marR="30429" marT="15214" marB="15214" anchor="ctr">
+                    <a:lnL>
+                      <a:noFill/>
+                    </a:lnL>
+                    <a:lnR>
+                      <a:noFill/>
+                    </a:lnR>
+                    <a:lnT>
+                      <a:noFill/>
+                    </a:lnT>
+                    <a:lnB>
+                      <a:noFill/>
+                    </a:lnB>
+                    <a:noFill/>
+                  </a:tcPr>
+                </a:tc>
+                <a:extLst>
+                  <a:ext uri="{0D108BD9-81ED-4DB2-BD59-A6C34878D82A}">
+                    <a16:rowId xmlns:a16="http://schemas.microsoft.com/office/drawing/2014/main" val="2137224240"/>
+                  </a:ext>
+                </a:extLst>
+              </a:tr>
+              <a:tr h="326912">
+                <a:tc>
+                  <a:txBody>
+                    <a:bodyPr/>
+                    <a:lstStyle/>
+                    <a:p>
+                      <a:pPr>
+                        <a:buNone/>
+                      </a:pPr>
+                      <a:r>
+                        <a:rPr lang="en-GB" sz="600">
+                          <a:latin typeface="Courier New" panose="02070309020205020404" pitchFamily="49" charset="0"/>
+                        </a:rPr>
+                        <a:t>LalaLaunch.Lala.Pit.FormulaTopSec</a:t>
+                      </a:r>
+                      <a:endParaRPr lang="en-GB" sz="600"/>
+                    </a:p>
+                  </a:txBody>
+                  <a:tcPr marL="30429" marR="30429" marT="15214" marB="15214" anchor="ctr">
+                    <a:lnL>
+                      <a:noFill/>
+                    </a:lnL>
+                    <a:lnR>
+                      <a:noFill/>
+                    </a:lnR>
+                    <a:lnT>
+                      <a:noFill/>
+                    </a:lnT>
+                    <a:lnB>
+                      <a:noFill/>
+                    </a:lnB>
+                    <a:noFill/>
+                  </a:tcPr>
+                </a:tc>
+                <a:tc>
+                  <a:txBody>
+                    <a:bodyPr/>
+                    <a:lstStyle/>
+                    <a:p>
+                      <a:pPr>
+                        <a:buNone/>
+                      </a:pPr>
+                      <a:r>
+                        <a:rPr lang="en-GB" sz="600">
+                          <a:latin typeface="Courier New" panose="02070309020205020404" pitchFamily="49" charset="0"/>
+                        </a:rPr>
+                        <a:t>LalaLaunch.Pit.FormulaTopSec</a:t>
+                      </a:r>
+                      <a:endParaRPr lang="en-GB" sz="600"/>
+                    </a:p>
+                  </a:txBody>
+                  <a:tcPr marL="30429" marR="30429" marT="15214" marB="15214" anchor="ctr">
+                    <a:lnL>
+                      <a:noFill/>
+                    </a:lnL>
+                    <a:lnR>
+                      <a:noFill/>
+                    </a:lnR>
+                    <a:lnT>
+                      <a:noFill/>
+                    </a:lnT>
+                    <a:lnB>
+                      <a:noFill/>
+                    </a:lnB>
+                    <a:noFill/>
+                  </a:tcPr>
+                </a:tc>
+                <a:tc>
+                  <a:txBody>
+                    <a:bodyPr/>
+                    <a:lstStyle/>
+                    <a:p>
+                      <a:pPr>
+                        <a:buNone/>
+                      </a:pPr>
+                      <a:r>
+                        <a:rPr lang="en-GB" sz="600"/>
+                        <a:t>PitLap − Stop + OutLap</a:t>
+                      </a:r>
+                    </a:p>
+                  </a:txBody>
+                  <a:tcPr marL="30429" marR="30429" marT="15214" marB="15214" anchor="ctr">
+                    <a:lnL>
+                      <a:noFill/>
+                    </a:lnL>
+                    <a:lnR>
+                      <a:noFill/>
+                    </a:lnR>
+                    <a:lnT>
+                      <a:noFill/>
+                    </a:lnT>
+                    <a:lnB>
+                      <a:noFill/>
+                    </a:lnB>
+                    <a:noFill/>
+                  </a:tcPr>
+                </a:tc>
+                <a:extLst>
+                  <a:ext uri="{0D108BD9-81ED-4DB2-BD59-A6C34878D82A}">
+                    <a16:rowId xmlns:a16="http://schemas.microsoft.com/office/drawing/2014/main" val="2214205159"/>
+                  </a:ext>
+                </a:extLst>
+              </a:tr>
+              <a:tr h="326912">
+                <a:tc>
+                  <a:txBody>
+                    <a:bodyPr/>
+                    <a:lstStyle/>
+                    <a:p>
+                      <a:pPr>
+                        <a:buNone/>
+                      </a:pPr>
+                      <a:r>
+                        <a:rPr lang="en-GB" sz="600">
+                          <a:latin typeface="Courier New" panose="02070309020205020404" pitchFamily="49" charset="0"/>
+                        </a:rPr>
+                        <a:t>LalaLaunch.Lala.Pit.Phase</a:t>
+                      </a:r>
+                      <a:endParaRPr lang="en-GB" sz="600"/>
+                    </a:p>
+                  </a:txBody>
+                  <a:tcPr marL="30429" marR="30429" marT="15214" marB="15214" anchor="ctr">
+                    <a:lnL>
+                      <a:noFill/>
+                    </a:lnL>
+                    <a:lnR>
+                      <a:noFill/>
+                    </a:lnR>
+                    <a:lnT>
+                      <a:noFill/>
+                    </a:lnT>
+                    <a:lnB>
+                      <a:noFill/>
+                    </a:lnB>
+                    <a:noFill/>
+                  </a:tcPr>
+                </a:tc>
+                <a:tc>
+                  <a:txBody>
+                    <a:bodyPr/>
+                    <a:lstStyle/>
+                    <a:p>
+                      <a:pPr>
+                        <a:buNone/>
+                      </a:pPr>
+                      <a:r>
+                        <a:rPr lang="en-GB" sz="600">
+                          <a:latin typeface="Courier New" panose="02070309020205020404" pitchFamily="49" charset="0"/>
+                        </a:rPr>
+                        <a:t>LalaLaunch.Pit.Phase</a:t>
+                      </a:r>
+                      <a:endParaRPr lang="en-GB" sz="600"/>
+                    </a:p>
+                  </a:txBody>
+                  <a:tcPr marL="30429" marR="30429" marT="15214" marB="15214" anchor="ctr">
+                    <a:lnL>
+                      <a:noFill/>
+                    </a:lnL>
+                    <a:lnR>
+                      <a:noFill/>
+                    </a:lnR>
+                    <a:lnT>
+                      <a:noFill/>
+                    </a:lnT>
+                    <a:lnB>
+                      <a:noFill/>
+                    </a:lnB>
+                    <a:noFill/>
+                  </a:tcPr>
+                </a:tc>
+                <a:tc>
+                  <a:txBody>
+                    <a:bodyPr/>
+                    <a:lstStyle/>
+                    <a:p>
+                      <a:pPr>
+                        <a:buNone/>
+                      </a:pPr>
+                      <a:r>
+                        <a:rPr lang="en-GB" sz="600"/>
+                        <a:t>`idle</a:t>
+                      </a:r>
+                    </a:p>
+                  </a:txBody>
+                  <a:tcPr marL="30429" marR="30429" marT="15214" marB="15214" anchor="ctr">
+                    <a:lnL>
+                      <a:noFill/>
+                    </a:lnL>
+                    <a:lnR>
+                      <a:noFill/>
+                    </a:lnR>
+                    <a:lnT>
+                      <a:noFill/>
+                    </a:lnT>
+                    <a:lnB>
+                      <a:noFill/>
+                    </a:lnB>
+                    <a:noFill/>
+                  </a:tcPr>
+                </a:tc>
+                <a:extLst>
+                  <a:ext uri="{0D108BD9-81ED-4DB2-BD59-A6C34878D82A}">
+                    <a16:rowId xmlns:a16="http://schemas.microsoft.com/office/drawing/2014/main" val="2496340092"/>
+                  </a:ext>
+                </a:extLst>
+              </a:tr>
+              <a:tr h="326912">
+                <a:tc>
+                  <a:txBody>
+                    <a:bodyPr/>
+                    <a:lstStyle/>
+                    <a:p>
+                      <a:pPr>
+                        <a:buNone/>
+                      </a:pPr>
+                      <a:r>
+                        <a:rPr lang="en-GB" sz="600">
+                          <a:latin typeface="Courier New" panose="02070309020205020404" pitchFamily="49" charset="0"/>
+                        </a:rPr>
+                        <a:t>LalaLaunch.Lala.Pit.PanelVisible</a:t>
+                      </a:r>
+                      <a:endParaRPr lang="en-GB" sz="600"/>
+                    </a:p>
+                  </a:txBody>
+                  <a:tcPr marL="30429" marR="30429" marT="15214" marB="15214" anchor="ctr">
+                    <a:lnL>
+                      <a:noFill/>
+                    </a:lnL>
+                    <a:lnR>
+                      <a:noFill/>
+                    </a:lnR>
+                    <a:lnT>
+                      <a:noFill/>
+                    </a:lnT>
+                    <a:lnB>
+                      <a:noFill/>
+                    </a:lnB>
+                    <a:noFill/>
+                  </a:tcPr>
+                </a:tc>
+                <a:tc>
+                  <a:txBody>
+                    <a:bodyPr/>
+                    <a:lstStyle/>
+                    <a:p>
+                      <a:pPr>
+                        <a:buNone/>
+                      </a:pPr>
+                      <a:r>
+                        <a:rPr lang="en-GB" sz="600">
+                          <a:latin typeface="Courier New" panose="02070309020205020404" pitchFamily="49" charset="0"/>
+                        </a:rPr>
+                        <a:t>LalaLaunch.Pit.PanelVisible</a:t>
+                      </a:r>
+                      <a:endParaRPr lang="en-GB" sz="600"/>
+                    </a:p>
+                  </a:txBody>
+                  <a:tcPr marL="30429" marR="30429" marT="15214" marB="15214" anchor="ctr">
+                    <a:lnL>
+                      <a:noFill/>
+                    </a:lnL>
+                    <a:lnR>
+                      <a:noFill/>
+                    </a:lnR>
+                    <a:lnT>
+                      <a:noFill/>
+                    </a:lnT>
+                    <a:lnB>
+                      <a:noFill/>
+                    </a:lnB>
+                    <a:noFill/>
+                  </a:tcPr>
+                </a:tc>
+                <a:tc>
+                  <a:txBody>
+                    <a:bodyPr/>
+                    <a:lstStyle/>
+                    <a:p>
+                      <a:pPr>
+                        <a:buNone/>
+                      </a:pPr>
+                      <a:r>
+                        <a:rPr lang="en-US" sz="600"/>
+                        <a:t>Optional; you said not needed</a:t>
+                      </a:r>
+                    </a:p>
+                  </a:txBody>
+                  <a:tcPr marL="30429" marR="30429" marT="15214" marB="15214" anchor="ctr">
+                    <a:lnL>
+                      <a:noFill/>
+                    </a:lnL>
+                    <a:lnR>
+                      <a:noFill/>
+                    </a:lnR>
+                    <a:lnT>
+                      <a:noFill/>
+                    </a:lnT>
+                    <a:lnB>
+                      <a:noFill/>
+                    </a:lnB>
+                    <a:noFill/>
+                  </a:tcPr>
+                </a:tc>
+                <a:extLst>
+                  <a:ext uri="{0D108BD9-81ED-4DB2-BD59-A6C34878D82A}">
+                    <a16:rowId xmlns:a16="http://schemas.microsoft.com/office/drawing/2014/main" val="583261734"/>
+                  </a:ext>
+                </a:extLst>
+              </a:tr>
+              <a:tr h="467053">
+                <a:tc>
+                  <a:txBody>
+                    <a:bodyPr/>
+                    <a:lstStyle/>
+                    <a:p>
+                      <a:pPr>
+                        <a:buNone/>
+                      </a:pPr>
+                      <a:r>
+                        <a:rPr lang="en-GB" sz="600">
+                          <a:latin typeface="Courier New" panose="02070309020205020404" pitchFamily="49" charset="0"/>
+                        </a:rPr>
+                        <a:t>LalaLaunch.Lala.Pit.NetMinusStopSec</a:t>
+                      </a:r>
+                      <a:endParaRPr lang="en-GB" sz="600"/>
+                    </a:p>
+                  </a:txBody>
+                  <a:tcPr marL="30429" marR="30429" marT="15214" marB="15214" anchor="ctr">
+                    <a:lnL>
+                      <a:noFill/>
+                    </a:lnL>
+                    <a:lnR>
+                      <a:noFill/>
+                    </a:lnR>
+                    <a:lnT>
+                      <a:noFill/>
+                    </a:lnT>
+                    <a:lnB>
+                      <a:noFill/>
+                    </a:lnB>
+                    <a:noFill/>
+                  </a:tcPr>
+                </a:tc>
+                <a:tc>
+                  <a:txBody>
+                    <a:bodyPr/>
+                    <a:lstStyle/>
+                    <a:p>
+                      <a:pPr>
+                        <a:buNone/>
+                      </a:pPr>
+                      <a:r>
+                        <a:rPr lang="en-GB" sz="600" b="1"/>
+                        <a:t>Deprecated</a:t>
+                      </a:r>
+                      <a:r>
+                        <a:rPr lang="en-GB" sz="600"/>
+                        <a:t> → use </a:t>
+                      </a:r>
+                      <a:r>
+                        <a:rPr lang="en-GB" sz="600">
+                          <a:latin typeface="Courier New" panose="02070309020205020404" pitchFamily="49" charset="0"/>
+                        </a:rPr>
+                        <a:t>LalaLaunch.Pit.ServiceStopLossSec</a:t>
+                      </a:r>
+                      <a:endParaRPr lang="en-GB" sz="600"/>
+                    </a:p>
+                  </a:txBody>
+                  <a:tcPr marL="30429" marR="30429" marT="15214" marB="15214" anchor="ctr">
+                    <a:lnL>
+                      <a:noFill/>
+                    </a:lnL>
+                    <a:lnR>
+                      <a:noFill/>
+                    </a:lnR>
+                    <a:lnT>
+                      <a:noFill/>
+                    </a:lnT>
+                    <a:lnB>
+                      <a:noFill/>
+                    </a:lnB>
+                    <a:noFill/>
+                  </a:tcPr>
+                </a:tc>
+                <a:tc>
+                  <a:txBody>
+                    <a:bodyPr/>
+                    <a:lstStyle/>
+                    <a:p>
+                      <a:pPr>
+                        <a:buNone/>
+                      </a:pPr>
+                      <a:r>
+                        <a:rPr lang="en-GB" sz="600" dirty="0"/>
+                        <a:t>We removed this</a:t>
+                      </a:r>
+                    </a:p>
+                  </a:txBody>
+                  <a:tcPr marL="30429" marR="30429" marT="15214" marB="15214" anchor="ctr">
+                    <a:lnL>
+                      <a:noFill/>
+                    </a:lnL>
+                    <a:lnR>
+                      <a:noFill/>
+                    </a:lnR>
+                    <a:lnT>
+                      <a:noFill/>
+                    </a:lnT>
+                    <a:lnB>
+                      <a:noFill/>
+                    </a:lnB>
+                    <a:noFill/>
+                  </a:tcPr>
+                </a:tc>
+                <a:extLst>
+                  <a:ext uri="{0D108BD9-81ED-4DB2-BD59-A6C34878D82A}">
+                    <a16:rowId xmlns:a16="http://schemas.microsoft.com/office/drawing/2014/main" val="3124743659"/>
+                  </a:ext>
+                </a:extLst>
+              </a:tr>
+            </a:tbl>
+          </a:graphicData>
+        </a:graphic>
+      </p:graphicFrame>
     </p:spTree>
     <p:extLst>
       <p:ext uri="{BB962C8B-B14F-4D97-AF65-F5344CB8AC3E}">
@@ -4805,7 +7551,7 @@
 </p:sld>
 </file>
 
-<file path=ppt/slides/slide25.xml><?xml version="1.0" encoding="utf-8"?>
+<file path=ppt/slides/slide26.xml><?xml version="1.0" encoding="utf-8"?>
 <p:sld xmlns:a="http://schemas.openxmlformats.org/drawingml/2006/main" xmlns:r="http://schemas.openxmlformats.org/officeDocument/2006/relationships" xmlns:p="http://schemas.openxmlformats.org/presentationml/2006/main">
   <p:cSld>
     <p:spTree>
@@ -4841,7 +7587,7 @@
 </p:sld>
 </file>
 
-<file path=ppt/slides/slide26.xml><?xml version="1.0" encoding="utf-8"?>
+<file path=ppt/slides/slide27.xml><?xml version="1.0" encoding="utf-8"?>
 <p:sld xmlns:a="http://schemas.openxmlformats.org/drawingml/2006/main" xmlns:r="http://schemas.openxmlformats.org/officeDocument/2006/relationships" xmlns:p="http://schemas.openxmlformats.org/presentationml/2006/main">
   <p:cSld>
     <p:spTree>
@@ -4877,7 +7623,7 @@
 </p:sld>
 </file>
 
-<file path=ppt/slides/slide27.xml><?xml version="1.0" encoding="utf-8"?>
+<file path=ppt/slides/slide28.xml><?xml version="1.0" encoding="utf-8"?>
 <p:sld xmlns:a="http://schemas.openxmlformats.org/drawingml/2006/main" xmlns:r="http://schemas.openxmlformats.org/officeDocument/2006/relationships" xmlns:p="http://schemas.openxmlformats.org/presentationml/2006/main">
   <p:cSld>
     <p:spTree>
@@ -4913,7 +7659,7 @@
 </p:sld>
 </file>
 
-<file path=ppt/slides/slide28.xml><?xml version="1.0" encoding="utf-8"?>
+<file path=ppt/slides/slide29.xml><?xml version="1.0" encoding="utf-8"?>
 <p:sld xmlns:a="http://schemas.openxmlformats.org/drawingml/2006/main" xmlns:r="http://schemas.openxmlformats.org/officeDocument/2006/relationships" xmlns:p="http://schemas.openxmlformats.org/presentationml/2006/main">
   <p:cSld>
     <p:spTree>
@@ -4949,7 +7695,73 @@
 </p:sld>
 </file>
 
-<file path=ppt/slides/slide29.xml><?xml version="1.0" encoding="utf-8"?>
+<file path=ppt/slides/slide3.xml><?xml version="1.0" encoding="utf-8"?>
+<p:sld xmlns:a="http://schemas.openxmlformats.org/drawingml/2006/main" xmlns:r="http://schemas.openxmlformats.org/officeDocument/2006/relationships" xmlns:p="http://schemas.openxmlformats.org/presentationml/2006/main">
+  <p:cSld>
+    <p:spTree>
+      <p:nvGrpSpPr>
+        <p:cNvPr id="1" name="">
+          <a:extLst>
+            <a:ext uri="{FF2B5EF4-FFF2-40B4-BE49-F238E27FC236}">
+              <a16:creationId xmlns:a16="http://schemas.microsoft.com/office/drawing/2014/main" id="{F4AC0AA2-7E56-A0AB-4A2F-6B8D015C4B8A}"/>
+            </a:ext>
+          </a:extLst>
+        </p:cNvPr>
+        <p:cNvGrpSpPr/>
+        <p:nvPr/>
+      </p:nvGrpSpPr>
+      <p:grpSpPr>
+        <a:xfrm>
+          <a:off x="0" y="0"/>
+          <a:ext cx="0" cy="0"/>
+          <a:chOff x="0" y="0"/>
+          <a:chExt cx="0" cy="0"/>
+        </a:xfrm>
+      </p:grpSpPr>
+      <p:pic>
+        <p:nvPicPr>
+          <p:cNvPr id="4" name="Picture 3">
+            <a:extLst>
+              <a:ext uri="{FF2B5EF4-FFF2-40B4-BE49-F238E27FC236}">
+                <a16:creationId xmlns:a16="http://schemas.microsoft.com/office/drawing/2014/main" id="{A7054FC2-341F-695C-3769-53718D087C25}"/>
+              </a:ext>
+            </a:extLst>
+          </p:cNvPr>
+          <p:cNvPicPr>
+            <a:picLocks noChangeAspect="1"/>
+          </p:cNvPicPr>
+          <p:nvPr/>
+        </p:nvPicPr>
+        <p:blipFill>
+          <a:blip r:embed="rId2"/>
+          <a:stretch>
+            <a:fillRect/>
+          </a:stretch>
+        </p:blipFill>
+        <p:spPr>
+          <a:xfrm>
+            <a:off x="733985" y="0"/>
+            <a:ext cx="10724029" cy="6858000"/>
+          </a:xfrm>
+          <a:prstGeom prst="rect">
+            <a:avLst/>
+          </a:prstGeom>
+        </p:spPr>
+      </p:pic>
+    </p:spTree>
+    <p:extLst>
+      <p:ext uri="{BB962C8B-B14F-4D97-AF65-F5344CB8AC3E}">
+        <p14:creationId xmlns:p14="http://schemas.microsoft.com/office/powerpoint/2010/main" val="277392067"/>
+      </p:ext>
+    </p:extLst>
+  </p:cSld>
+  <p:clrMapOvr>
+    <a:masterClrMapping/>
+  </p:clrMapOvr>
+</p:sld>
+</file>
+
+<file path=ppt/slides/slide30.xml><?xml version="1.0" encoding="utf-8"?>
 <p:sld xmlns:a="http://schemas.openxmlformats.org/drawingml/2006/main" xmlns:r="http://schemas.openxmlformats.org/officeDocument/2006/relationships" xmlns:p="http://schemas.openxmlformats.org/presentationml/2006/main">
   <p:cSld>
     <p:spTree>
@@ -4985,73 +7797,7 @@
 </p:sld>
 </file>
 
-<file path=ppt/slides/slide3.xml><?xml version="1.0" encoding="utf-8"?>
-<p:sld xmlns:a="http://schemas.openxmlformats.org/drawingml/2006/main" xmlns:r="http://schemas.openxmlformats.org/officeDocument/2006/relationships" xmlns:p="http://schemas.openxmlformats.org/presentationml/2006/main">
-  <p:cSld>
-    <p:spTree>
-      <p:nvGrpSpPr>
-        <p:cNvPr id="1" name="">
-          <a:extLst>
-            <a:ext uri="{FF2B5EF4-FFF2-40B4-BE49-F238E27FC236}">
-              <a16:creationId xmlns:a16="http://schemas.microsoft.com/office/drawing/2014/main" id="{F4AC0AA2-7E56-A0AB-4A2F-6B8D015C4B8A}"/>
-            </a:ext>
-          </a:extLst>
-        </p:cNvPr>
-        <p:cNvGrpSpPr/>
-        <p:nvPr/>
-      </p:nvGrpSpPr>
-      <p:grpSpPr>
-        <a:xfrm>
-          <a:off x="0" y="0"/>
-          <a:ext cx="0" cy="0"/>
-          <a:chOff x="0" y="0"/>
-          <a:chExt cx="0" cy="0"/>
-        </a:xfrm>
-      </p:grpSpPr>
-      <p:pic>
-        <p:nvPicPr>
-          <p:cNvPr id="4" name="Picture 3">
-            <a:extLst>
-              <a:ext uri="{FF2B5EF4-FFF2-40B4-BE49-F238E27FC236}">
-                <a16:creationId xmlns:a16="http://schemas.microsoft.com/office/drawing/2014/main" id="{A7054FC2-341F-695C-3769-53718D087C25}"/>
-              </a:ext>
-            </a:extLst>
-          </p:cNvPr>
-          <p:cNvPicPr>
-            <a:picLocks noChangeAspect="1"/>
-          </p:cNvPicPr>
-          <p:nvPr/>
-        </p:nvPicPr>
-        <p:blipFill>
-          <a:blip r:embed="rId2"/>
-          <a:stretch>
-            <a:fillRect/>
-          </a:stretch>
-        </p:blipFill>
-        <p:spPr>
-          <a:xfrm>
-            <a:off x="733985" y="0"/>
-            <a:ext cx="10724029" cy="6858000"/>
-          </a:xfrm>
-          <a:prstGeom prst="rect">
-            <a:avLst/>
-          </a:prstGeom>
-        </p:spPr>
-      </p:pic>
-    </p:spTree>
-    <p:extLst>
-      <p:ext uri="{BB962C8B-B14F-4D97-AF65-F5344CB8AC3E}">
-        <p14:creationId xmlns:p14="http://schemas.microsoft.com/office/powerpoint/2010/main" val="277392067"/>
-      </p:ext>
-    </p:extLst>
-  </p:cSld>
-  <p:clrMapOvr>
-    <a:masterClrMapping/>
-  </p:clrMapOvr>
-</p:sld>
-</file>
-
-<file path=ppt/slides/slide30.xml><?xml version="1.0" encoding="utf-8"?>
+<file path=ppt/slides/slide31.xml><?xml version="1.0" encoding="utf-8"?>
 <p:sld xmlns:a="http://schemas.openxmlformats.org/drawingml/2006/main" xmlns:r="http://schemas.openxmlformats.org/officeDocument/2006/relationships" xmlns:p="http://schemas.openxmlformats.org/presentationml/2006/main">
   <p:cSld>
     <p:spTree>

</xml_diff>

<commit_message>
Update UI Work presentation
Revised the UI Work.pptx file with new or updated content.
</commit_message>
<xml_diff>
--- a/Docs/UI Work.pptx
+++ b/Docs/UI Work.pptx
@@ -675,7 +675,7 @@
           <a:p>
             <a:fld id="{55FA135A-769C-438D-9AC0-5CFB87EA78F4}" type="datetimeFigureOut">
               <a:rPr lang="en-GB" smtClean="0"/>
-              <a:t>19/11/2025</a:t>
+              <a:t>26/11/2025</a:t>
             </a:fld>
             <a:endParaRPr lang="en-GB"/>
           </a:p>
@@ -875,7 +875,7 @@
           <a:p>
             <a:fld id="{55FA135A-769C-438D-9AC0-5CFB87EA78F4}" type="datetimeFigureOut">
               <a:rPr lang="en-GB" smtClean="0"/>
-              <a:t>19/11/2025</a:t>
+              <a:t>26/11/2025</a:t>
             </a:fld>
             <a:endParaRPr lang="en-GB"/>
           </a:p>
@@ -1085,7 +1085,7 @@
           <a:p>
             <a:fld id="{55FA135A-769C-438D-9AC0-5CFB87EA78F4}" type="datetimeFigureOut">
               <a:rPr lang="en-GB" smtClean="0"/>
-              <a:t>19/11/2025</a:t>
+              <a:t>26/11/2025</a:t>
             </a:fld>
             <a:endParaRPr lang="en-GB"/>
           </a:p>
@@ -1285,7 +1285,7 @@
           <a:p>
             <a:fld id="{55FA135A-769C-438D-9AC0-5CFB87EA78F4}" type="datetimeFigureOut">
               <a:rPr lang="en-GB" smtClean="0"/>
-              <a:t>19/11/2025</a:t>
+              <a:t>26/11/2025</a:t>
             </a:fld>
             <a:endParaRPr lang="en-GB"/>
           </a:p>
@@ -1561,7 +1561,7 @@
           <a:p>
             <a:fld id="{55FA135A-769C-438D-9AC0-5CFB87EA78F4}" type="datetimeFigureOut">
               <a:rPr lang="en-GB" smtClean="0"/>
-              <a:t>19/11/2025</a:t>
+              <a:t>26/11/2025</a:t>
             </a:fld>
             <a:endParaRPr lang="en-GB"/>
           </a:p>
@@ -1829,7 +1829,7 @@
           <a:p>
             <a:fld id="{55FA135A-769C-438D-9AC0-5CFB87EA78F4}" type="datetimeFigureOut">
               <a:rPr lang="en-GB" smtClean="0"/>
-              <a:t>19/11/2025</a:t>
+              <a:t>26/11/2025</a:t>
             </a:fld>
             <a:endParaRPr lang="en-GB"/>
           </a:p>
@@ -2244,7 +2244,7 @@
           <a:p>
             <a:fld id="{55FA135A-769C-438D-9AC0-5CFB87EA78F4}" type="datetimeFigureOut">
               <a:rPr lang="en-GB" smtClean="0"/>
-              <a:t>19/11/2025</a:t>
+              <a:t>26/11/2025</a:t>
             </a:fld>
             <a:endParaRPr lang="en-GB"/>
           </a:p>
@@ -2386,7 +2386,7 @@
           <a:p>
             <a:fld id="{55FA135A-769C-438D-9AC0-5CFB87EA78F4}" type="datetimeFigureOut">
               <a:rPr lang="en-GB" smtClean="0"/>
-              <a:t>19/11/2025</a:t>
+              <a:t>26/11/2025</a:t>
             </a:fld>
             <a:endParaRPr lang="en-GB"/>
           </a:p>
@@ -2499,7 +2499,7 @@
           <a:p>
             <a:fld id="{55FA135A-769C-438D-9AC0-5CFB87EA78F4}" type="datetimeFigureOut">
               <a:rPr lang="en-GB" smtClean="0"/>
-              <a:t>19/11/2025</a:t>
+              <a:t>26/11/2025</a:t>
             </a:fld>
             <a:endParaRPr lang="en-GB"/>
           </a:p>
@@ -2812,7 +2812,7 @@
           <a:p>
             <a:fld id="{55FA135A-769C-438D-9AC0-5CFB87EA78F4}" type="datetimeFigureOut">
               <a:rPr lang="en-GB" smtClean="0"/>
-              <a:t>19/11/2025</a:t>
+              <a:t>26/11/2025</a:t>
             </a:fld>
             <a:endParaRPr lang="en-GB"/>
           </a:p>
@@ -3101,7 +3101,7 @@
           <a:p>
             <a:fld id="{55FA135A-769C-438D-9AC0-5CFB87EA78F4}" type="datetimeFigureOut">
               <a:rPr lang="en-GB" smtClean="0"/>
-              <a:t>19/11/2025</a:t>
+              <a:t>26/11/2025</a:t>
             </a:fld>
             <a:endParaRPr lang="en-GB"/>
           </a:p>
@@ -3344,7 +3344,7 @@
           <a:p>
             <a:fld id="{55FA135A-769C-438D-9AC0-5CFB87EA78F4}" type="datetimeFigureOut">
               <a:rPr lang="en-GB" smtClean="0"/>
-              <a:t>19/11/2025</a:t>
+              <a:t>26/11/2025</a:t>
             </a:fld>
             <a:endParaRPr lang="en-GB"/>
           </a:p>
@@ -4295,6 +4295,36 @@
           <a:chExt cx="0" cy="0"/>
         </a:xfrm>
       </p:grpSpPr>
+      <p:pic>
+        <p:nvPicPr>
+          <p:cNvPr id="3" name="Picture 2" descr="A screenshot of a computer&#10;&#10;AI-generated content may be incorrect.">
+            <a:extLst>
+              <a:ext uri="{FF2B5EF4-FFF2-40B4-BE49-F238E27FC236}">
+                <a16:creationId xmlns:a16="http://schemas.microsoft.com/office/drawing/2014/main" id="{F8DB19D3-1A4C-980A-2BB3-2C4FBD7F8A94}"/>
+              </a:ext>
+            </a:extLst>
+          </p:cNvPr>
+          <p:cNvPicPr>
+            <a:picLocks noChangeAspect="1"/>
+          </p:cNvPicPr>
+          <p:nvPr/>
+        </p:nvPicPr>
+        <p:blipFill>
+          <a:blip r:embed="rId2"/>
+          <a:stretch>
+            <a:fillRect/>
+          </a:stretch>
+        </p:blipFill>
+        <p:spPr>
+          <a:xfrm>
+            <a:off x="137325" y="125632"/>
+            <a:ext cx="5477639" cy="3143689"/>
+          </a:xfrm>
+          <a:prstGeom prst="rect">
+            <a:avLst/>
+          </a:prstGeom>
+        </p:spPr>
+      </p:pic>
     </p:spTree>
     <p:extLst>
       <p:ext uri="{BB962C8B-B14F-4D97-AF65-F5344CB8AC3E}">

</xml_diff>

<commit_message>
Improve fuel tab alignment and live fuel buttons (#86)
* Improve fuel tab alignment and live fuel buttons

* Tidy fuel tab layout

* Refine lap and fuel alignment

* Update UI Work presentation

Revised the UI Work.pptx file with new or updated content.
</commit_message>
<xml_diff>
--- a/Docs/UI Work.pptx
+++ b/Docs/UI Work.pptx
@@ -675,7 +675,7 @@
           <a:p>
             <a:fld id="{55FA135A-769C-438D-9AC0-5CFB87EA78F4}" type="datetimeFigureOut">
               <a:rPr lang="en-GB" smtClean="0"/>
-              <a:t>19/11/2025</a:t>
+              <a:t>26/11/2025</a:t>
             </a:fld>
             <a:endParaRPr lang="en-GB"/>
           </a:p>
@@ -875,7 +875,7 @@
           <a:p>
             <a:fld id="{55FA135A-769C-438D-9AC0-5CFB87EA78F4}" type="datetimeFigureOut">
               <a:rPr lang="en-GB" smtClean="0"/>
-              <a:t>19/11/2025</a:t>
+              <a:t>26/11/2025</a:t>
             </a:fld>
             <a:endParaRPr lang="en-GB"/>
           </a:p>
@@ -1085,7 +1085,7 @@
           <a:p>
             <a:fld id="{55FA135A-769C-438D-9AC0-5CFB87EA78F4}" type="datetimeFigureOut">
               <a:rPr lang="en-GB" smtClean="0"/>
-              <a:t>19/11/2025</a:t>
+              <a:t>26/11/2025</a:t>
             </a:fld>
             <a:endParaRPr lang="en-GB"/>
           </a:p>
@@ -1285,7 +1285,7 @@
           <a:p>
             <a:fld id="{55FA135A-769C-438D-9AC0-5CFB87EA78F4}" type="datetimeFigureOut">
               <a:rPr lang="en-GB" smtClean="0"/>
-              <a:t>19/11/2025</a:t>
+              <a:t>26/11/2025</a:t>
             </a:fld>
             <a:endParaRPr lang="en-GB"/>
           </a:p>
@@ -1561,7 +1561,7 @@
           <a:p>
             <a:fld id="{55FA135A-769C-438D-9AC0-5CFB87EA78F4}" type="datetimeFigureOut">
               <a:rPr lang="en-GB" smtClean="0"/>
-              <a:t>19/11/2025</a:t>
+              <a:t>26/11/2025</a:t>
             </a:fld>
             <a:endParaRPr lang="en-GB"/>
           </a:p>
@@ -1829,7 +1829,7 @@
           <a:p>
             <a:fld id="{55FA135A-769C-438D-9AC0-5CFB87EA78F4}" type="datetimeFigureOut">
               <a:rPr lang="en-GB" smtClean="0"/>
-              <a:t>19/11/2025</a:t>
+              <a:t>26/11/2025</a:t>
             </a:fld>
             <a:endParaRPr lang="en-GB"/>
           </a:p>
@@ -2244,7 +2244,7 @@
           <a:p>
             <a:fld id="{55FA135A-769C-438D-9AC0-5CFB87EA78F4}" type="datetimeFigureOut">
               <a:rPr lang="en-GB" smtClean="0"/>
-              <a:t>19/11/2025</a:t>
+              <a:t>26/11/2025</a:t>
             </a:fld>
             <a:endParaRPr lang="en-GB"/>
           </a:p>
@@ -2386,7 +2386,7 @@
           <a:p>
             <a:fld id="{55FA135A-769C-438D-9AC0-5CFB87EA78F4}" type="datetimeFigureOut">
               <a:rPr lang="en-GB" smtClean="0"/>
-              <a:t>19/11/2025</a:t>
+              <a:t>26/11/2025</a:t>
             </a:fld>
             <a:endParaRPr lang="en-GB"/>
           </a:p>
@@ -2499,7 +2499,7 @@
           <a:p>
             <a:fld id="{55FA135A-769C-438D-9AC0-5CFB87EA78F4}" type="datetimeFigureOut">
               <a:rPr lang="en-GB" smtClean="0"/>
-              <a:t>19/11/2025</a:t>
+              <a:t>26/11/2025</a:t>
             </a:fld>
             <a:endParaRPr lang="en-GB"/>
           </a:p>
@@ -2812,7 +2812,7 @@
           <a:p>
             <a:fld id="{55FA135A-769C-438D-9AC0-5CFB87EA78F4}" type="datetimeFigureOut">
               <a:rPr lang="en-GB" smtClean="0"/>
-              <a:t>19/11/2025</a:t>
+              <a:t>26/11/2025</a:t>
             </a:fld>
             <a:endParaRPr lang="en-GB"/>
           </a:p>
@@ -3101,7 +3101,7 @@
           <a:p>
             <a:fld id="{55FA135A-769C-438D-9AC0-5CFB87EA78F4}" type="datetimeFigureOut">
               <a:rPr lang="en-GB" smtClean="0"/>
-              <a:t>19/11/2025</a:t>
+              <a:t>26/11/2025</a:t>
             </a:fld>
             <a:endParaRPr lang="en-GB"/>
           </a:p>
@@ -3344,7 +3344,7 @@
           <a:p>
             <a:fld id="{55FA135A-769C-438D-9AC0-5CFB87EA78F4}" type="datetimeFigureOut">
               <a:rPr lang="en-GB" smtClean="0"/>
-              <a:t>19/11/2025</a:t>
+              <a:t>26/11/2025</a:t>
             </a:fld>
             <a:endParaRPr lang="en-GB"/>
           </a:p>
@@ -4295,6 +4295,36 @@
           <a:chExt cx="0" cy="0"/>
         </a:xfrm>
       </p:grpSpPr>
+      <p:pic>
+        <p:nvPicPr>
+          <p:cNvPr id="3" name="Picture 2" descr="A screenshot of a computer&#10;&#10;AI-generated content may be incorrect.">
+            <a:extLst>
+              <a:ext uri="{FF2B5EF4-FFF2-40B4-BE49-F238E27FC236}">
+                <a16:creationId xmlns:a16="http://schemas.microsoft.com/office/drawing/2014/main" id="{F8DB19D3-1A4C-980A-2BB3-2C4FBD7F8A94}"/>
+              </a:ext>
+            </a:extLst>
+          </p:cNvPr>
+          <p:cNvPicPr>
+            <a:picLocks noChangeAspect="1"/>
+          </p:cNvPicPr>
+          <p:nvPr/>
+        </p:nvPicPr>
+        <p:blipFill>
+          <a:blip r:embed="rId2"/>
+          <a:stretch>
+            <a:fillRect/>
+          </a:stretch>
+        </p:blipFill>
+        <p:spPr>
+          <a:xfrm>
+            <a:off x="137325" y="125632"/>
+            <a:ext cx="5477639" cy="3143689"/>
+          </a:xfrm>
+          <a:prstGeom prst="rect">
+            <a:avLst/>
+          </a:prstGeom>
+        </p:spPr>
+      </p:pic>
     </p:spTree>
     <p:extLst>
       <p:ext uri="{BB962C8B-B14F-4D97-AF65-F5344CB8AC3E}">

</xml_diff>